<commit_message>
Improved propagation time results
</commit_message>
<xml_diff>
--- a/thesis/oral_qual/Oral Qual Presentation.pptx
+++ b/thesis/oral_qual/Oral Qual Presentation.pptx
@@ -144,7 +144,7 @@
           <p:cNvPr id="2" name="Title 1">
             <a:extLst>
               <a:ext uri="{FF2B5EF4-FFF2-40B4-BE49-F238E27FC236}">
-                <a16:creationId xmlns:a16="http://schemas.microsoft.com/office/drawing/2014/main" id="{D48AE58E-B4D3-499D-AF00-902031FB3873}"/>
+                <a16:creationId xmlns:a16="http://schemas.microsoft.com/office/drawing/2014/main" xmlns="" id="{D48AE58E-B4D3-499D-AF00-902031FB3873}"/>
               </a:ext>
             </a:extLst>
           </p:cNvPr>
@@ -181,7 +181,7 @@
           <p:cNvPr id="3" name="Subtitle 2">
             <a:extLst>
               <a:ext uri="{FF2B5EF4-FFF2-40B4-BE49-F238E27FC236}">
-                <a16:creationId xmlns:a16="http://schemas.microsoft.com/office/drawing/2014/main" id="{D70AD230-EADF-4FF4-A0C7-BE89B838DA33}"/>
+                <a16:creationId xmlns:a16="http://schemas.microsoft.com/office/drawing/2014/main" xmlns="" id="{D70AD230-EADF-4FF4-A0C7-BE89B838DA33}"/>
               </a:ext>
             </a:extLst>
           </p:cNvPr>
@@ -251,7 +251,7 @@
           <p:cNvPr id="5" name="Footer Placeholder 4">
             <a:extLst>
               <a:ext uri="{FF2B5EF4-FFF2-40B4-BE49-F238E27FC236}">
-                <a16:creationId xmlns:a16="http://schemas.microsoft.com/office/drawing/2014/main" id="{8C13B935-2DB8-4089-A42B-7C0798A411B9}"/>
+                <a16:creationId xmlns:a16="http://schemas.microsoft.com/office/drawing/2014/main" xmlns="" id="{8C13B935-2DB8-4089-A42B-7C0798A411B9}"/>
               </a:ext>
             </a:extLst>
           </p:cNvPr>
@@ -276,7 +276,7 @@
           <p:cNvPr id="6" name="Slide Number Placeholder 5">
             <a:extLst>
               <a:ext uri="{FF2B5EF4-FFF2-40B4-BE49-F238E27FC236}">
-                <a16:creationId xmlns:a16="http://schemas.microsoft.com/office/drawing/2014/main" id="{011121C7-87D2-4196-9E47-A5F56F3576CD}"/>
+                <a16:creationId xmlns:a16="http://schemas.microsoft.com/office/drawing/2014/main" xmlns="" id="{011121C7-87D2-4196-9E47-A5F56F3576CD}"/>
               </a:ext>
             </a:extLst>
           </p:cNvPr>
@@ -335,7 +335,7 @@
           <p:cNvPr id="2" name="Title 1">
             <a:extLst>
               <a:ext uri="{FF2B5EF4-FFF2-40B4-BE49-F238E27FC236}">
-                <a16:creationId xmlns:a16="http://schemas.microsoft.com/office/drawing/2014/main" id="{3D1E3946-DBED-4B34-A87C-28C15C2CDDE2}"/>
+                <a16:creationId xmlns:a16="http://schemas.microsoft.com/office/drawing/2014/main" xmlns="" id="{3D1E3946-DBED-4B34-A87C-28C15C2CDDE2}"/>
               </a:ext>
             </a:extLst>
           </p:cNvPr>
@@ -363,7 +363,7 @@
           <p:cNvPr id="3" name="Vertical Text Placeholder 2">
             <a:extLst>
               <a:ext uri="{FF2B5EF4-FFF2-40B4-BE49-F238E27FC236}">
-                <a16:creationId xmlns:a16="http://schemas.microsoft.com/office/drawing/2014/main" id="{29120869-ACE9-4CDE-BB96-76AA470EC512}"/>
+                <a16:creationId xmlns:a16="http://schemas.microsoft.com/office/drawing/2014/main" xmlns="" id="{29120869-ACE9-4CDE-BB96-76AA470EC512}"/>
               </a:ext>
             </a:extLst>
           </p:cNvPr>
@@ -420,7 +420,7 @@
           <p:cNvPr id="4" name="Date Placeholder 3">
             <a:extLst>
               <a:ext uri="{FF2B5EF4-FFF2-40B4-BE49-F238E27FC236}">
-                <a16:creationId xmlns:a16="http://schemas.microsoft.com/office/drawing/2014/main" id="{8F791962-F17D-4BA2-900B-C9155AE0E138}"/>
+                <a16:creationId xmlns:a16="http://schemas.microsoft.com/office/drawing/2014/main" xmlns="" id="{8F791962-F17D-4BA2-900B-C9155AE0E138}"/>
               </a:ext>
             </a:extLst>
           </p:cNvPr>
@@ -446,7 +446,7 @@
           <a:p>
             <a:fld id="{0BC610E4-0AD4-4B2C-A1AF-CEC06808CA2D}" type="datetimeFigureOut">
               <a:rPr lang="en-US" smtClean="0"/>
-              <a:t>5/14/2018</a:t>
+              <a:t>5/15/2018</a:t>
             </a:fld>
             <a:endParaRPr lang="en-US"/>
           </a:p>
@@ -457,7 +457,7 @@
           <p:cNvPr id="5" name="Footer Placeholder 4">
             <a:extLst>
               <a:ext uri="{FF2B5EF4-FFF2-40B4-BE49-F238E27FC236}">
-                <a16:creationId xmlns:a16="http://schemas.microsoft.com/office/drawing/2014/main" id="{15627E01-677E-4DFD-9557-959CDF6D9305}"/>
+                <a16:creationId xmlns:a16="http://schemas.microsoft.com/office/drawing/2014/main" xmlns="" id="{15627E01-677E-4DFD-9557-959CDF6D9305}"/>
               </a:ext>
             </a:extLst>
           </p:cNvPr>
@@ -482,7 +482,7 @@
           <p:cNvPr id="6" name="Slide Number Placeholder 5">
             <a:extLst>
               <a:ext uri="{FF2B5EF4-FFF2-40B4-BE49-F238E27FC236}">
-                <a16:creationId xmlns:a16="http://schemas.microsoft.com/office/drawing/2014/main" id="{458D1248-2022-4B0D-9D07-2B8D5532C600}"/>
+                <a16:creationId xmlns:a16="http://schemas.microsoft.com/office/drawing/2014/main" xmlns="" id="{458D1248-2022-4B0D-9D07-2B8D5532C600}"/>
               </a:ext>
             </a:extLst>
           </p:cNvPr>
@@ -541,7 +541,7 @@
           <p:cNvPr id="2" name="Vertical Title 1">
             <a:extLst>
               <a:ext uri="{FF2B5EF4-FFF2-40B4-BE49-F238E27FC236}">
-                <a16:creationId xmlns:a16="http://schemas.microsoft.com/office/drawing/2014/main" id="{90981319-6D3A-435F-BD52-641FEF816E07}"/>
+                <a16:creationId xmlns:a16="http://schemas.microsoft.com/office/drawing/2014/main" xmlns="" id="{90981319-6D3A-435F-BD52-641FEF816E07}"/>
               </a:ext>
             </a:extLst>
           </p:cNvPr>
@@ -574,7 +574,7 @@
           <p:cNvPr id="3" name="Vertical Text Placeholder 2">
             <a:extLst>
               <a:ext uri="{FF2B5EF4-FFF2-40B4-BE49-F238E27FC236}">
-                <a16:creationId xmlns:a16="http://schemas.microsoft.com/office/drawing/2014/main" id="{2D1215FE-FD3D-4E6A-AB2A-7B8C2BA9B3A5}"/>
+                <a16:creationId xmlns:a16="http://schemas.microsoft.com/office/drawing/2014/main" xmlns="" id="{2D1215FE-FD3D-4E6A-AB2A-7B8C2BA9B3A5}"/>
               </a:ext>
             </a:extLst>
           </p:cNvPr>
@@ -636,7 +636,7 @@
           <p:cNvPr id="4" name="Date Placeholder 3">
             <a:extLst>
               <a:ext uri="{FF2B5EF4-FFF2-40B4-BE49-F238E27FC236}">
-                <a16:creationId xmlns:a16="http://schemas.microsoft.com/office/drawing/2014/main" id="{342E5807-819B-456D-9817-F7A2F7AA7A64}"/>
+                <a16:creationId xmlns:a16="http://schemas.microsoft.com/office/drawing/2014/main" xmlns="" id="{342E5807-819B-456D-9817-F7A2F7AA7A64}"/>
               </a:ext>
             </a:extLst>
           </p:cNvPr>
@@ -662,7 +662,7 @@
           <a:p>
             <a:fld id="{0BC610E4-0AD4-4B2C-A1AF-CEC06808CA2D}" type="datetimeFigureOut">
               <a:rPr lang="en-US" smtClean="0"/>
-              <a:t>5/14/2018</a:t>
+              <a:t>5/15/2018</a:t>
             </a:fld>
             <a:endParaRPr lang="en-US"/>
           </a:p>
@@ -673,7 +673,7 @@
           <p:cNvPr id="5" name="Footer Placeholder 4">
             <a:extLst>
               <a:ext uri="{FF2B5EF4-FFF2-40B4-BE49-F238E27FC236}">
-                <a16:creationId xmlns:a16="http://schemas.microsoft.com/office/drawing/2014/main" id="{D34CCDCF-37CB-4045-BBBB-0A4919D848DD}"/>
+                <a16:creationId xmlns:a16="http://schemas.microsoft.com/office/drawing/2014/main" xmlns="" id="{D34CCDCF-37CB-4045-BBBB-0A4919D848DD}"/>
               </a:ext>
             </a:extLst>
           </p:cNvPr>
@@ -698,7 +698,7 @@
           <p:cNvPr id="6" name="Slide Number Placeholder 5">
             <a:extLst>
               <a:ext uri="{FF2B5EF4-FFF2-40B4-BE49-F238E27FC236}">
-                <a16:creationId xmlns:a16="http://schemas.microsoft.com/office/drawing/2014/main" id="{12411FDE-278C-4C46-909D-1FB8C5D8A9CF}"/>
+                <a16:creationId xmlns:a16="http://schemas.microsoft.com/office/drawing/2014/main" xmlns="" id="{12411FDE-278C-4C46-909D-1FB8C5D8A9CF}"/>
               </a:ext>
             </a:extLst>
           </p:cNvPr>
@@ -757,7 +757,7 @@
           <p:cNvPr id="2" name="Title 1">
             <a:extLst>
               <a:ext uri="{FF2B5EF4-FFF2-40B4-BE49-F238E27FC236}">
-                <a16:creationId xmlns:a16="http://schemas.microsoft.com/office/drawing/2014/main" id="{64A0C4FC-EE08-46E5-89EE-EF56F3585112}"/>
+                <a16:creationId xmlns:a16="http://schemas.microsoft.com/office/drawing/2014/main" xmlns="" id="{64A0C4FC-EE08-46E5-89EE-EF56F3585112}"/>
               </a:ext>
             </a:extLst>
           </p:cNvPr>
@@ -785,7 +785,7 @@
           <p:cNvPr id="3" name="Content Placeholder 2">
             <a:extLst>
               <a:ext uri="{FF2B5EF4-FFF2-40B4-BE49-F238E27FC236}">
-                <a16:creationId xmlns:a16="http://schemas.microsoft.com/office/drawing/2014/main" id="{6414819E-66C3-4BC7-B396-922F8D543B23}"/>
+                <a16:creationId xmlns:a16="http://schemas.microsoft.com/office/drawing/2014/main" xmlns="" id="{6414819E-66C3-4BC7-B396-922F8D543B23}"/>
               </a:ext>
             </a:extLst>
           </p:cNvPr>
@@ -842,7 +842,7 @@
           <p:cNvPr id="4" name="Date Placeholder 3">
             <a:extLst>
               <a:ext uri="{FF2B5EF4-FFF2-40B4-BE49-F238E27FC236}">
-                <a16:creationId xmlns:a16="http://schemas.microsoft.com/office/drawing/2014/main" id="{3CC8ED31-6110-4E27-8C38-87889B7103C0}"/>
+                <a16:creationId xmlns:a16="http://schemas.microsoft.com/office/drawing/2014/main" xmlns="" id="{3CC8ED31-6110-4E27-8C38-87889B7103C0}"/>
               </a:ext>
             </a:extLst>
           </p:cNvPr>
@@ -868,7 +868,7 @@
           <a:p>
             <a:fld id="{0BC610E4-0AD4-4B2C-A1AF-CEC06808CA2D}" type="datetimeFigureOut">
               <a:rPr lang="en-US" smtClean="0"/>
-              <a:t>5/14/2018</a:t>
+              <a:t>5/15/2018</a:t>
             </a:fld>
             <a:endParaRPr lang="en-US"/>
           </a:p>
@@ -879,7 +879,7 @@
           <p:cNvPr id="5" name="Footer Placeholder 4">
             <a:extLst>
               <a:ext uri="{FF2B5EF4-FFF2-40B4-BE49-F238E27FC236}">
-                <a16:creationId xmlns:a16="http://schemas.microsoft.com/office/drawing/2014/main" id="{BA4AA30D-45CE-44FD-BCF1-4BAAB7597910}"/>
+                <a16:creationId xmlns:a16="http://schemas.microsoft.com/office/drawing/2014/main" xmlns="" id="{BA4AA30D-45CE-44FD-BCF1-4BAAB7597910}"/>
               </a:ext>
             </a:extLst>
           </p:cNvPr>
@@ -904,7 +904,7 @@
           <p:cNvPr id="6" name="Slide Number Placeholder 5">
             <a:extLst>
               <a:ext uri="{FF2B5EF4-FFF2-40B4-BE49-F238E27FC236}">
-                <a16:creationId xmlns:a16="http://schemas.microsoft.com/office/drawing/2014/main" id="{B24FB4A4-F400-4774-BDC0-ED1BCA1F076F}"/>
+                <a16:creationId xmlns:a16="http://schemas.microsoft.com/office/drawing/2014/main" xmlns="" id="{B24FB4A4-F400-4774-BDC0-ED1BCA1F076F}"/>
               </a:ext>
             </a:extLst>
           </p:cNvPr>
@@ -963,7 +963,7 @@
           <p:cNvPr id="2" name="Title 1">
             <a:extLst>
               <a:ext uri="{FF2B5EF4-FFF2-40B4-BE49-F238E27FC236}">
-                <a16:creationId xmlns:a16="http://schemas.microsoft.com/office/drawing/2014/main" id="{4FBFDFDF-867F-4A7F-B104-CEF29ED59DA9}"/>
+                <a16:creationId xmlns:a16="http://schemas.microsoft.com/office/drawing/2014/main" xmlns="" id="{4FBFDFDF-867F-4A7F-B104-CEF29ED59DA9}"/>
               </a:ext>
             </a:extLst>
           </p:cNvPr>
@@ -991,7 +991,7 @@
           <p:cNvPr id="3" name="Content Placeholder 2">
             <a:extLst>
               <a:ext uri="{FF2B5EF4-FFF2-40B4-BE49-F238E27FC236}">
-                <a16:creationId xmlns:a16="http://schemas.microsoft.com/office/drawing/2014/main" id="{DBD77589-FD12-48B8-B3B7-3148530837A6}"/>
+                <a16:creationId xmlns:a16="http://schemas.microsoft.com/office/drawing/2014/main" xmlns="" id="{DBD77589-FD12-48B8-B3B7-3148530837A6}"/>
               </a:ext>
             </a:extLst>
           </p:cNvPr>
@@ -1053,7 +1053,7 @@
           <p:cNvPr id="4" name="Content Placeholder 3">
             <a:extLst>
               <a:ext uri="{FF2B5EF4-FFF2-40B4-BE49-F238E27FC236}">
-                <a16:creationId xmlns:a16="http://schemas.microsoft.com/office/drawing/2014/main" id="{049AC300-581F-4D03-AC18-9837131EB6B7}"/>
+                <a16:creationId xmlns:a16="http://schemas.microsoft.com/office/drawing/2014/main" xmlns="" id="{049AC300-581F-4D03-AC18-9837131EB6B7}"/>
               </a:ext>
             </a:extLst>
           </p:cNvPr>
@@ -1115,7 +1115,7 @@
           <p:cNvPr id="5" name="Date Placeholder 4">
             <a:extLst>
               <a:ext uri="{FF2B5EF4-FFF2-40B4-BE49-F238E27FC236}">
-                <a16:creationId xmlns:a16="http://schemas.microsoft.com/office/drawing/2014/main" id="{B0706C96-8181-4A8F-8601-9636E5B33CAE}"/>
+                <a16:creationId xmlns:a16="http://schemas.microsoft.com/office/drawing/2014/main" xmlns="" id="{B0706C96-8181-4A8F-8601-9636E5B33CAE}"/>
               </a:ext>
             </a:extLst>
           </p:cNvPr>
@@ -1141,7 +1141,7 @@
           <a:p>
             <a:fld id="{0BC610E4-0AD4-4B2C-A1AF-CEC06808CA2D}" type="datetimeFigureOut">
               <a:rPr lang="en-US" smtClean="0"/>
-              <a:t>5/14/2018</a:t>
+              <a:t>5/15/2018</a:t>
             </a:fld>
             <a:endParaRPr lang="en-US"/>
           </a:p>
@@ -1152,7 +1152,7 @@
           <p:cNvPr id="6" name="Footer Placeholder 5">
             <a:extLst>
               <a:ext uri="{FF2B5EF4-FFF2-40B4-BE49-F238E27FC236}">
-                <a16:creationId xmlns:a16="http://schemas.microsoft.com/office/drawing/2014/main" id="{A815A459-3700-4F71-A2FC-0277C9A970D7}"/>
+                <a16:creationId xmlns:a16="http://schemas.microsoft.com/office/drawing/2014/main" xmlns="" id="{A815A459-3700-4F71-A2FC-0277C9A970D7}"/>
               </a:ext>
             </a:extLst>
           </p:cNvPr>
@@ -1177,7 +1177,7 @@
           <p:cNvPr id="7" name="Slide Number Placeholder 6">
             <a:extLst>
               <a:ext uri="{FF2B5EF4-FFF2-40B4-BE49-F238E27FC236}">
-                <a16:creationId xmlns:a16="http://schemas.microsoft.com/office/drawing/2014/main" id="{DB22AAA9-57CD-49D3-887B-D513D8153241}"/>
+                <a16:creationId xmlns:a16="http://schemas.microsoft.com/office/drawing/2014/main" xmlns="" id="{DB22AAA9-57CD-49D3-887B-D513D8153241}"/>
               </a:ext>
             </a:extLst>
           </p:cNvPr>
@@ -1236,7 +1236,7 @@
           <p:cNvPr id="2" name="Title 1">
             <a:extLst>
               <a:ext uri="{FF2B5EF4-FFF2-40B4-BE49-F238E27FC236}">
-                <a16:creationId xmlns:a16="http://schemas.microsoft.com/office/drawing/2014/main" id="{4975E3EE-23C7-4D82-A8A2-3C8ABB6993E1}"/>
+                <a16:creationId xmlns:a16="http://schemas.microsoft.com/office/drawing/2014/main" xmlns="" id="{4975E3EE-23C7-4D82-A8A2-3C8ABB6993E1}"/>
               </a:ext>
             </a:extLst>
           </p:cNvPr>
@@ -1273,7 +1273,7 @@
           <p:cNvPr id="3" name="Text Placeholder 2">
             <a:extLst>
               <a:ext uri="{FF2B5EF4-FFF2-40B4-BE49-F238E27FC236}">
-                <a16:creationId xmlns:a16="http://schemas.microsoft.com/office/drawing/2014/main" id="{57391D18-9376-4798-925D-0CE6B949EF65}"/>
+                <a16:creationId xmlns:a16="http://schemas.microsoft.com/office/drawing/2014/main" xmlns="" id="{57391D18-9376-4798-925D-0CE6B949EF65}"/>
               </a:ext>
             </a:extLst>
           </p:cNvPr>
@@ -1398,7 +1398,7 @@
           <p:cNvPr id="4" name="Date Placeholder 3">
             <a:extLst>
               <a:ext uri="{FF2B5EF4-FFF2-40B4-BE49-F238E27FC236}">
-                <a16:creationId xmlns:a16="http://schemas.microsoft.com/office/drawing/2014/main" id="{5872B000-F1D5-4CF6-A3EE-C9B06762C286}"/>
+                <a16:creationId xmlns:a16="http://schemas.microsoft.com/office/drawing/2014/main" xmlns="" id="{5872B000-F1D5-4CF6-A3EE-C9B06762C286}"/>
               </a:ext>
             </a:extLst>
           </p:cNvPr>
@@ -1424,7 +1424,7 @@
           <a:p>
             <a:fld id="{0BC610E4-0AD4-4B2C-A1AF-CEC06808CA2D}" type="datetimeFigureOut">
               <a:rPr lang="en-US" smtClean="0"/>
-              <a:t>5/14/2018</a:t>
+              <a:t>5/15/2018</a:t>
             </a:fld>
             <a:endParaRPr lang="en-US"/>
           </a:p>
@@ -1435,7 +1435,7 @@
           <p:cNvPr id="5" name="Footer Placeholder 4">
             <a:extLst>
               <a:ext uri="{FF2B5EF4-FFF2-40B4-BE49-F238E27FC236}">
-                <a16:creationId xmlns:a16="http://schemas.microsoft.com/office/drawing/2014/main" id="{7564322F-E87C-47D6-B2CA-4C204F9C6B41}"/>
+                <a16:creationId xmlns:a16="http://schemas.microsoft.com/office/drawing/2014/main" xmlns="" id="{7564322F-E87C-47D6-B2CA-4C204F9C6B41}"/>
               </a:ext>
             </a:extLst>
           </p:cNvPr>
@@ -1460,7 +1460,7 @@
           <p:cNvPr id="6" name="Slide Number Placeholder 5">
             <a:extLst>
               <a:ext uri="{FF2B5EF4-FFF2-40B4-BE49-F238E27FC236}">
-                <a16:creationId xmlns:a16="http://schemas.microsoft.com/office/drawing/2014/main" id="{265778E9-B30F-4C8B-AC20-E5E7C2043F51}"/>
+                <a16:creationId xmlns:a16="http://schemas.microsoft.com/office/drawing/2014/main" xmlns="" id="{265778E9-B30F-4C8B-AC20-E5E7C2043F51}"/>
               </a:ext>
             </a:extLst>
           </p:cNvPr>
@@ -1519,7 +1519,7 @@
           <p:cNvPr id="2" name="Title 1">
             <a:extLst>
               <a:ext uri="{FF2B5EF4-FFF2-40B4-BE49-F238E27FC236}">
-                <a16:creationId xmlns:a16="http://schemas.microsoft.com/office/drawing/2014/main" id="{91BA0C87-5716-4AF6-8A29-499CC64142F9}"/>
+                <a16:creationId xmlns:a16="http://schemas.microsoft.com/office/drawing/2014/main" xmlns="" id="{91BA0C87-5716-4AF6-8A29-499CC64142F9}"/>
               </a:ext>
             </a:extLst>
           </p:cNvPr>
@@ -1552,7 +1552,7 @@
           <p:cNvPr id="3" name="Text Placeholder 2">
             <a:extLst>
               <a:ext uri="{FF2B5EF4-FFF2-40B4-BE49-F238E27FC236}">
-                <a16:creationId xmlns:a16="http://schemas.microsoft.com/office/drawing/2014/main" id="{CB1444A3-FE25-4B7B-8020-CDFB6737EB73}"/>
+                <a16:creationId xmlns:a16="http://schemas.microsoft.com/office/drawing/2014/main" xmlns="" id="{CB1444A3-FE25-4B7B-8020-CDFB6737EB73}"/>
               </a:ext>
             </a:extLst>
           </p:cNvPr>
@@ -1623,7 +1623,7 @@
           <p:cNvPr id="4" name="Content Placeholder 3">
             <a:extLst>
               <a:ext uri="{FF2B5EF4-FFF2-40B4-BE49-F238E27FC236}">
-                <a16:creationId xmlns:a16="http://schemas.microsoft.com/office/drawing/2014/main" id="{D717BE78-C767-488B-A79C-752A7FBFBBF6}"/>
+                <a16:creationId xmlns:a16="http://schemas.microsoft.com/office/drawing/2014/main" xmlns="" id="{D717BE78-C767-488B-A79C-752A7FBFBBF6}"/>
               </a:ext>
             </a:extLst>
           </p:cNvPr>
@@ -1685,7 +1685,7 @@
           <p:cNvPr id="5" name="Text Placeholder 4">
             <a:extLst>
               <a:ext uri="{FF2B5EF4-FFF2-40B4-BE49-F238E27FC236}">
-                <a16:creationId xmlns:a16="http://schemas.microsoft.com/office/drawing/2014/main" id="{7DF8B9E4-C609-4F09-A5E3-AB21914CF0EA}"/>
+                <a16:creationId xmlns:a16="http://schemas.microsoft.com/office/drawing/2014/main" xmlns="" id="{7DF8B9E4-C609-4F09-A5E3-AB21914CF0EA}"/>
               </a:ext>
             </a:extLst>
           </p:cNvPr>
@@ -1756,7 +1756,7 @@
           <p:cNvPr id="6" name="Content Placeholder 5">
             <a:extLst>
               <a:ext uri="{FF2B5EF4-FFF2-40B4-BE49-F238E27FC236}">
-                <a16:creationId xmlns:a16="http://schemas.microsoft.com/office/drawing/2014/main" id="{5E5C8D56-2F8B-4913-B974-96B66C86841F}"/>
+                <a16:creationId xmlns:a16="http://schemas.microsoft.com/office/drawing/2014/main" xmlns="" id="{5E5C8D56-2F8B-4913-B974-96B66C86841F}"/>
               </a:ext>
             </a:extLst>
           </p:cNvPr>
@@ -1818,7 +1818,7 @@
           <p:cNvPr id="7" name="Date Placeholder 6">
             <a:extLst>
               <a:ext uri="{FF2B5EF4-FFF2-40B4-BE49-F238E27FC236}">
-                <a16:creationId xmlns:a16="http://schemas.microsoft.com/office/drawing/2014/main" id="{E5C1747E-F46B-40C8-A6D2-B842B6F817C6}"/>
+                <a16:creationId xmlns:a16="http://schemas.microsoft.com/office/drawing/2014/main" xmlns="" id="{E5C1747E-F46B-40C8-A6D2-B842B6F817C6}"/>
               </a:ext>
             </a:extLst>
           </p:cNvPr>
@@ -1844,7 +1844,7 @@
           <a:p>
             <a:fld id="{0BC610E4-0AD4-4B2C-A1AF-CEC06808CA2D}" type="datetimeFigureOut">
               <a:rPr lang="en-US" smtClean="0"/>
-              <a:t>5/14/2018</a:t>
+              <a:t>5/15/2018</a:t>
             </a:fld>
             <a:endParaRPr lang="en-US"/>
           </a:p>
@@ -1855,7 +1855,7 @@
           <p:cNvPr id="8" name="Footer Placeholder 7">
             <a:extLst>
               <a:ext uri="{FF2B5EF4-FFF2-40B4-BE49-F238E27FC236}">
-                <a16:creationId xmlns:a16="http://schemas.microsoft.com/office/drawing/2014/main" id="{86436956-F2CF-41E1-8DB0-791ACC56D916}"/>
+                <a16:creationId xmlns:a16="http://schemas.microsoft.com/office/drawing/2014/main" xmlns="" id="{86436956-F2CF-41E1-8DB0-791ACC56D916}"/>
               </a:ext>
             </a:extLst>
           </p:cNvPr>
@@ -1880,7 +1880,7 @@
           <p:cNvPr id="9" name="Slide Number Placeholder 8">
             <a:extLst>
               <a:ext uri="{FF2B5EF4-FFF2-40B4-BE49-F238E27FC236}">
-                <a16:creationId xmlns:a16="http://schemas.microsoft.com/office/drawing/2014/main" id="{E0F99B8F-AF06-4B7F-A7A9-3A52E5DCE11E}"/>
+                <a16:creationId xmlns:a16="http://schemas.microsoft.com/office/drawing/2014/main" xmlns="" id="{E0F99B8F-AF06-4B7F-A7A9-3A52E5DCE11E}"/>
               </a:ext>
             </a:extLst>
           </p:cNvPr>
@@ -1939,7 +1939,7 @@
           <p:cNvPr id="2" name="Title 1">
             <a:extLst>
               <a:ext uri="{FF2B5EF4-FFF2-40B4-BE49-F238E27FC236}">
-                <a16:creationId xmlns:a16="http://schemas.microsoft.com/office/drawing/2014/main" id="{92A3493A-0700-42F7-8A2D-301C1B0F0BD2}"/>
+                <a16:creationId xmlns:a16="http://schemas.microsoft.com/office/drawing/2014/main" xmlns="" id="{92A3493A-0700-42F7-8A2D-301C1B0F0BD2}"/>
               </a:ext>
             </a:extLst>
           </p:cNvPr>
@@ -1967,7 +1967,7 @@
           <p:cNvPr id="3" name="Date Placeholder 2">
             <a:extLst>
               <a:ext uri="{FF2B5EF4-FFF2-40B4-BE49-F238E27FC236}">
-                <a16:creationId xmlns:a16="http://schemas.microsoft.com/office/drawing/2014/main" id="{CECAD3F7-FCD6-4041-8887-FF7BF8D9D9A1}"/>
+                <a16:creationId xmlns:a16="http://schemas.microsoft.com/office/drawing/2014/main" xmlns="" id="{CECAD3F7-FCD6-4041-8887-FF7BF8D9D9A1}"/>
               </a:ext>
             </a:extLst>
           </p:cNvPr>
@@ -1993,7 +1993,7 @@
           <a:p>
             <a:fld id="{0BC610E4-0AD4-4B2C-A1AF-CEC06808CA2D}" type="datetimeFigureOut">
               <a:rPr lang="en-US" smtClean="0"/>
-              <a:t>5/14/2018</a:t>
+              <a:t>5/15/2018</a:t>
             </a:fld>
             <a:endParaRPr lang="en-US"/>
           </a:p>
@@ -2004,7 +2004,7 @@
           <p:cNvPr id="4" name="Footer Placeholder 3">
             <a:extLst>
               <a:ext uri="{FF2B5EF4-FFF2-40B4-BE49-F238E27FC236}">
-                <a16:creationId xmlns:a16="http://schemas.microsoft.com/office/drawing/2014/main" id="{0241C060-96CB-4C74-A5DA-649C354F4F4D}"/>
+                <a16:creationId xmlns:a16="http://schemas.microsoft.com/office/drawing/2014/main" xmlns="" id="{0241C060-96CB-4C74-A5DA-649C354F4F4D}"/>
               </a:ext>
             </a:extLst>
           </p:cNvPr>
@@ -2029,7 +2029,7 @@
           <p:cNvPr id="5" name="Slide Number Placeholder 4">
             <a:extLst>
               <a:ext uri="{FF2B5EF4-FFF2-40B4-BE49-F238E27FC236}">
-                <a16:creationId xmlns:a16="http://schemas.microsoft.com/office/drawing/2014/main" id="{3DA5F7D5-86CC-40DE-B92B-2826A28119DD}"/>
+                <a16:creationId xmlns:a16="http://schemas.microsoft.com/office/drawing/2014/main" xmlns="" id="{3DA5F7D5-86CC-40DE-B92B-2826A28119DD}"/>
               </a:ext>
             </a:extLst>
           </p:cNvPr>
@@ -2088,7 +2088,7 @@
           <p:cNvPr id="2" name="Date Placeholder 1">
             <a:extLst>
               <a:ext uri="{FF2B5EF4-FFF2-40B4-BE49-F238E27FC236}">
-                <a16:creationId xmlns:a16="http://schemas.microsoft.com/office/drawing/2014/main" id="{EE6897F0-1DC7-4517-B992-65E38012A752}"/>
+                <a16:creationId xmlns:a16="http://schemas.microsoft.com/office/drawing/2014/main" xmlns="" id="{EE6897F0-1DC7-4517-B992-65E38012A752}"/>
               </a:ext>
             </a:extLst>
           </p:cNvPr>
@@ -2114,7 +2114,7 @@
           <a:p>
             <a:fld id="{0BC610E4-0AD4-4B2C-A1AF-CEC06808CA2D}" type="datetimeFigureOut">
               <a:rPr lang="en-US" smtClean="0"/>
-              <a:t>5/14/2018</a:t>
+              <a:t>5/15/2018</a:t>
             </a:fld>
             <a:endParaRPr lang="en-US"/>
           </a:p>
@@ -2125,7 +2125,7 @@
           <p:cNvPr id="3" name="Footer Placeholder 2">
             <a:extLst>
               <a:ext uri="{FF2B5EF4-FFF2-40B4-BE49-F238E27FC236}">
-                <a16:creationId xmlns:a16="http://schemas.microsoft.com/office/drawing/2014/main" id="{1F105C99-3113-4C00-B4DB-CFF321BD73B4}"/>
+                <a16:creationId xmlns:a16="http://schemas.microsoft.com/office/drawing/2014/main" xmlns="" id="{1F105C99-3113-4C00-B4DB-CFF321BD73B4}"/>
               </a:ext>
             </a:extLst>
           </p:cNvPr>
@@ -2150,7 +2150,7 @@
           <p:cNvPr id="4" name="Slide Number Placeholder 3">
             <a:extLst>
               <a:ext uri="{FF2B5EF4-FFF2-40B4-BE49-F238E27FC236}">
-                <a16:creationId xmlns:a16="http://schemas.microsoft.com/office/drawing/2014/main" id="{B48378FF-F73B-43DF-9B10-54344E429286}"/>
+                <a16:creationId xmlns:a16="http://schemas.microsoft.com/office/drawing/2014/main" xmlns="" id="{B48378FF-F73B-43DF-9B10-54344E429286}"/>
               </a:ext>
             </a:extLst>
           </p:cNvPr>
@@ -2209,7 +2209,7 @@
           <p:cNvPr id="2" name="Title 1">
             <a:extLst>
               <a:ext uri="{FF2B5EF4-FFF2-40B4-BE49-F238E27FC236}">
-                <a16:creationId xmlns:a16="http://schemas.microsoft.com/office/drawing/2014/main" id="{F5202D90-ABC7-478C-AF60-BFE36E0FAD37}"/>
+                <a16:creationId xmlns:a16="http://schemas.microsoft.com/office/drawing/2014/main" xmlns="" id="{F5202D90-ABC7-478C-AF60-BFE36E0FAD37}"/>
               </a:ext>
             </a:extLst>
           </p:cNvPr>
@@ -2246,7 +2246,7 @@
           <p:cNvPr id="3" name="Content Placeholder 2">
             <a:extLst>
               <a:ext uri="{FF2B5EF4-FFF2-40B4-BE49-F238E27FC236}">
-                <a16:creationId xmlns:a16="http://schemas.microsoft.com/office/drawing/2014/main" id="{1258DF43-FC87-4E8C-8569-51488F714C20}"/>
+                <a16:creationId xmlns:a16="http://schemas.microsoft.com/office/drawing/2014/main" xmlns="" id="{1258DF43-FC87-4E8C-8569-51488F714C20}"/>
               </a:ext>
             </a:extLst>
           </p:cNvPr>
@@ -2336,7 +2336,7 @@
           <p:cNvPr id="4" name="Text Placeholder 3">
             <a:extLst>
               <a:ext uri="{FF2B5EF4-FFF2-40B4-BE49-F238E27FC236}">
-                <a16:creationId xmlns:a16="http://schemas.microsoft.com/office/drawing/2014/main" id="{AE14BBA8-8F86-4751-B787-80B9F4A7AC7C}"/>
+                <a16:creationId xmlns:a16="http://schemas.microsoft.com/office/drawing/2014/main" xmlns="" id="{AE14BBA8-8F86-4751-B787-80B9F4A7AC7C}"/>
               </a:ext>
             </a:extLst>
           </p:cNvPr>
@@ -2407,7 +2407,7 @@
           <p:cNvPr id="5" name="Date Placeholder 4">
             <a:extLst>
               <a:ext uri="{FF2B5EF4-FFF2-40B4-BE49-F238E27FC236}">
-                <a16:creationId xmlns:a16="http://schemas.microsoft.com/office/drawing/2014/main" id="{4312051D-C122-47C8-8E9B-380ABA7DD79D}"/>
+                <a16:creationId xmlns:a16="http://schemas.microsoft.com/office/drawing/2014/main" xmlns="" id="{4312051D-C122-47C8-8E9B-380ABA7DD79D}"/>
               </a:ext>
             </a:extLst>
           </p:cNvPr>
@@ -2433,7 +2433,7 @@
           <a:p>
             <a:fld id="{0BC610E4-0AD4-4B2C-A1AF-CEC06808CA2D}" type="datetimeFigureOut">
               <a:rPr lang="en-US" smtClean="0"/>
-              <a:t>5/14/2018</a:t>
+              <a:t>5/15/2018</a:t>
             </a:fld>
             <a:endParaRPr lang="en-US"/>
           </a:p>
@@ -2444,7 +2444,7 @@
           <p:cNvPr id="6" name="Footer Placeholder 5">
             <a:extLst>
               <a:ext uri="{FF2B5EF4-FFF2-40B4-BE49-F238E27FC236}">
-                <a16:creationId xmlns:a16="http://schemas.microsoft.com/office/drawing/2014/main" id="{BB147928-E159-41FF-B0A3-8641E0B9DB12}"/>
+                <a16:creationId xmlns:a16="http://schemas.microsoft.com/office/drawing/2014/main" xmlns="" id="{BB147928-E159-41FF-B0A3-8641E0B9DB12}"/>
               </a:ext>
             </a:extLst>
           </p:cNvPr>
@@ -2469,7 +2469,7 @@
           <p:cNvPr id="7" name="Slide Number Placeholder 6">
             <a:extLst>
               <a:ext uri="{FF2B5EF4-FFF2-40B4-BE49-F238E27FC236}">
-                <a16:creationId xmlns:a16="http://schemas.microsoft.com/office/drawing/2014/main" id="{BAFF39D3-DBEB-42D4-ABB2-819E15DC0C72}"/>
+                <a16:creationId xmlns:a16="http://schemas.microsoft.com/office/drawing/2014/main" xmlns="" id="{BAFF39D3-DBEB-42D4-ABB2-819E15DC0C72}"/>
               </a:ext>
             </a:extLst>
           </p:cNvPr>
@@ -2528,7 +2528,7 @@
           <p:cNvPr id="2" name="Title 1">
             <a:extLst>
               <a:ext uri="{FF2B5EF4-FFF2-40B4-BE49-F238E27FC236}">
-                <a16:creationId xmlns:a16="http://schemas.microsoft.com/office/drawing/2014/main" id="{E45F858E-015C-4A2E-A82E-7F0E429B9F98}"/>
+                <a16:creationId xmlns:a16="http://schemas.microsoft.com/office/drawing/2014/main" xmlns="" id="{E45F858E-015C-4A2E-A82E-7F0E429B9F98}"/>
               </a:ext>
             </a:extLst>
           </p:cNvPr>
@@ -2565,7 +2565,7 @@
           <p:cNvPr id="3" name="Picture Placeholder 2">
             <a:extLst>
               <a:ext uri="{FF2B5EF4-FFF2-40B4-BE49-F238E27FC236}">
-                <a16:creationId xmlns:a16="http://schemas.microsoft.com/office/drawing/2014/main" id="{254D136D-5BA6-4BAA-8DFA-4604091BA665}"/>
+                <a16:creationId xmlns:a16="http://schemas.microsoft.com/office/drawing/2014/main" xmlns="" id="{254D136D-5BA6-4BAA-8DFA-4604091BA665}"/>
               </a:ext>
             </a:extLst>
           </p:cNvPr>
@@ -2632,7 +2632,7 @@
           <p:cNvPr id="4" name="Text Placeholder 3">
             <a:extLst>
               <a:ext uri="{FF2B5EF4-FFF2-40B4-BE49-F238E27FC236}">
-                <a16:creationId xmlns:a16="http://schemas.microsoft.com/office/drawing/2014/main" id="{158C80A8-CC0B-4970-B0F6-E1836ABC0E6A}"/>
+                <a16:creationId xmlns:a16="http://schemas.microsoft.com/office/drawing/2014/main" xmlns="" id="{158C80A8-CC0B-4970-B0F6-E1836ABC0E6A}"/>
               </a:ext>
             </a:extLst>
           </p:cNvPr>
@@ -2703,7 +2703,7 @@
           <p:cNvPr id="5" name="Date Placeholder 4">
             <a:extLst>
               <a:ext uri="{FF2B5EF4-FFF2-40B4-BE49-F238E27FC236}">
-                <a16:creationId xmlns:a16="http://schemas.microsoft.com/office/drawing/2014/main" id="{616C773F-8C04-4316-BE23-BA327197BC0B}"/>
+                <a16:creationId xmlns:a16="http://schemas.microsoft.com/office/drawing/2014/main" xmlns="" id="{616C773F-8C04-4316-BE23-BA327197BC0B}"/>
               </a:ext>
             </a:extLst>
           </p:cNvPr>
@@ -2729,7 +2729,7 @@
           <a:p>
             <a:fld id="{0BC610E4-0AD4-4B2C-A1AF-CEC06808CA2D}" type="datetimeFigureOut">
               <a:rPr lang="en-US" smtClean="0"/>
-              <a:t>5/14/2018</a:t>
+              <a:t>5/15/2018</a:t>
             </a:fld>
             <a:endParaRPr lang="en-US"/>
           </a:p>
@@ -2740,7 +2740,7 @@
           <p:cNvPr id="6" name="Footer Placeholder 5">
             <a:extLst>
               <a:ext uri="{FF2B5EF4-FFF2-40B4-BE49-F238E27FC236}">
-                <a16:creationId xmlns:a16="http://schemas.microsoft.com/office/drawing/2014/main" id="{C363504E-E990-45C4-BC03-6A7D9A835E1C}"/>
+                <a16:creationId xmlns:a16="http://schemas.microsoft.com/office/drawing/2014/main" xmlns="" id="{C363504E-E990-45C4-BC03-6A7D9A835E1C}"/>
               </a:ext>
             </a:extLst>
           </p:cNvPr>
@@ -2765,7 +2765,7 @@
           <p:cNvPr id="7" name="Slide Number Placeholder 6">
             <a:extLst>
               <a:ext uri="{FF2B5EF4-FFF2-40B4-BE49-F238E27FC236}">
-                <a16:creationId xmlns:a16="http://schemas.microsoft.com/office/drawing/2014/main" id="{8F3EF50B-F8AB-4CBC-8186-94473F782308}"/>
+                <a16:creationId xmlns:a16="http://schemas.microsoft.com/office/drawing/2014/main" xmlns="" id="{8F3EF50B-F8AB-4CBC-8186-94473F782308}"/>
               </a:ext>
             </a:extLst>
           </p:cNvPr>
@@ -2829,7 +2829,7 @@
           <p:cNvPr id="2" name="Title Placeholder 1">
             <a:extLst>
               <a:ext uri="{FF2B5EF4-FFF2-40B4-BE49-F238E27FC236}">
-                <a16:creationId xmlns:a16="http://schemas.microsoft.com/office/drawing/2014/main" id="{E31275B7-B1B5-47DC-A87E-6256DE7AF7DC}"/>
+                <a16:creationId xmlns:a16="http://schemas.microsoft.com/office/drawing/2014/main" xmlns="" id="{E31275B7-B1B5-47DC-A87E-6256DE7AF7DC}"/>
               </a:ext>
             </a:extLst>
           </p:cNvPr>
@@ -2867,7 +2867,7 @@
           <p:cNvPr id="3" name="Text Placeholder 2">
             <a:extLst>
               <a:ext uri="{FF2B5EF4-FFF2-40B4-BE49-F238E27FC236}">
-                <a16:creationId xmlns:a16="http://schemas.microsoft.com/office/drawing/2014/main" id="{8A6AFE6E-CF4D-44BF-8E28-18B1E6A1CD33}"/>
+                <a16:creationId xmlns:a16="http://schemas.microsoft.com/office/drawing/2014/main" xmlns="" id="{8A6AFE6E-CF4D-44BF-8E28-18B1E6A1CD33}"/>
               </a:ext>
             </a:extLst>
           </p:cNvPr>
@@ -2934,7 +2934,7 @@
           <p:cNvPr id="5" name="Footer Placeholder 4">
             <a:extLst>
               <a:ext uri="{FF2B5EF4-FFF2-40B4-BE49-F238E27FC236}">
-                <a16:creationId xmlns:a16="http://schemas.microsoft.com/office/drawing/2014/main" id="{FCC0C2A8-B5CF-4120-9C5B-68B5483F6617}"/>
+                <a16:creationId xmlns:a16="http://schemas.microsoft.com/office/drawing/2014/main" xmlns="" id="{FCC0C2A8-B5CF-4120-9C5B-68B5483F6617}"/>
               </a:ext>
             </a:extLst>
           </p:cNvPr>
@@ -2977,7 +2977,7 @@
           <p:cNvPr id="6" name="Slide Number Placeholder 5">
             <a:extLst>
               <a:ext uri="{FF2B5EF4-FFF2-40B4-BE49-F238E27FC236}">
-                <a16:creationId xmlns:a16="http://schemas.microsoft.com/office/drawing/2014/main" id="{BD2141BC-6B43-4B36-9B73-D1B1B881776D}"/>
+                <a16:creationId xmlns:a16="http://schemas.microsoft.com/office/drawing/2014/main" xmlns="" id="{BD2141BC-6B43-4B36-9B73-D1B1B881776D}"/>
               </a:ext>
             </a:extLst>
           </p:cNvPr>
@@ -3024,7 +3024,7 @@
           <p:cNvPr id="9" name="Picture 8">
             <a:extLst>
               <a:ext uri="{FF2B5EF4-FFF2-40B4-BE49-F238E27FC236}">
-                <a16:creationId xmlns:a16="http://schemas.microsoft.com/office/drawing/2014/main" id="{22E37073-2B21-4CFB-BEF3-C015946096F2}"/>
+                <a16:creationId xmlns:a16="http://schemas.microsoft.com/office/drawing/2014/main" xmlns="" id="{22E37073-2B21-4CFB-BEF3-C015946096F2}"/>
               </a:ext>
             </a:extLst>
           </p:cNvPr>
@@ -3034,7 +3034,7 @@
           <p:nvPr userDrawn="1"/>
         </p:nvPicPr>
         <p:blipFill>
-          <a:blip r:embed="rId13">
+          <a:blip r:embed="rId13" cstate="print">
             <a:extLst>
               <a:ext uri="{28A0092B-C50C-407E-A947-70E740481C1C}">
                 <a14:useLocalDpi xmlns:a14="http://schemas.microsoft.com/office/drawing/2010/main" val="0"/>
@@ -3381,7 +3381,7 @@
           <p:cNvPr id="2" name="Title 1">
             <a:extLst>
               <a:ext uri="{FF2B5EF4-FFF2-40B4-BE49-F238E27FC236}">
-                <a16:creationId xmlns:a16="http://schemas.microsoft.com/office/drawing/2014/main" id="{D1A7E329-1945-44B6-9937-B396D162D6E6}"/>
+                <a16:creationId xmlns:a16="http://schemas.microsoft.com/office/drawing/2014/main" xmlns="" id="{D1A7E329-1945-44B6-9937-B396D162D6E6}"/>
               </a:ext>
             </a:extLst>
           </p:cNvPr>
@@ -3416,7 +3416,7 @@
           <p:cNvPr id="3" name="Subtitle 2">
             <a:extLst>
               <a:ext uri="{FF2B5EF4-FFF2-40B4-BE49-F238E27FC236}">
-                <a16:creationId xmlns:a16="http://schemas.microsoft.com/office/drawing/2014/main" id="{DB75C531-1D75-46D5-A5A9-47885FDA319D}"/>
+                <a16:creationId xmlns:a16="http://schemas.microsoft.com/office/drawing/2014/main" xmlns="" id="{DB75C531-1D75-46D5-A5A9-47885FDA319D}"/>
               </a:ext>
             </a:extLst>
           </p:cNvPr>
@@ -3485,7 +3485,7 @@
           <p:cNvPr id="2" name="Title 1">
             <a:extLst>
               <a:ext uri="{FF2B5EF4-FFF2-40B4-BE49-F238E27FC236}">
-                <a16:creationId xmlns:a16="http://schemas.microsoft.com/office/drawing/2014/main" id="{77757203-94A7-4004-A2A3-B20DFB274FDA}"/>
+                <a16:creationId xmlns:a16="http://schemas.microsoft.com/office/drawing/2014/main" xmlns="" id="{77757203-94A7-4004-A2A3-B20DFB274FDA}"/>
               </a:ext>
             </a:extLst>
           </p:cNvPr>
@@ -3513,7 +3513,7 @@
           <p:cNvPr id="7" name="Content Placeholder 6">
             <a:extLst>
               <a:ext uri="{FF2B5EF4-FFF2-40B4-BE49-F238E27FC236}">
-                <a16:creationId xmlns:a16="http://schemas.microsoft.com/office/drawing/2014/main" id="{06B71117-7636-4241-B375-820BF5BB74EF}"/>
+                <a16:creationId xmlns:a16="http://schemas.microsoft.com/office/drawing/2014/main" xmlns="" id="{06B71117-7636-4241-B375-820BF5BB74EF}"/>
               </a:ext>
             </a:extLst>
           </p:cNvPr>
@@ -3559,7 +3559,7 @@
             <a:hlinkClick r:id="" action="ppaction://media"/>
             <a:extLst>
               <a:ext uri="{FF2B5EF4-FFF2-40B4-BE49-F238E27FC236}">
-                <a16:creationId xmlns:a16="http://schemas.microsoft.com/office/drawing/2014/main" id="{9569281C-1D22-47E2-93CF-1221AD792733}"/>
+                <a16:creationId xmlns:a16="http://schemas.microsoft.com/office/drawing/2014/main" xmlns="" id="{9569281C-1D22-47E2-93CF-1221AD792733}"/>
               </a:ext>
             </a:extLst>
           </p:cNvPr>
@@ -3596,7 +3596,7 @@
           <p:cNvPr id="4" name="Picture 3">
             <a:extLst>
               <a:ext uri="{FF2B5EF4-FFF2-40B4-BE49-F238E27FC236}">
-                <a16:creationId xmlns:a16="http://schemas.microsoft.com/office/drawing/2014/main" id="{C33D05C6-2A9E-4505-B106-0244E437B165}"/>
+                <a16:creationId xmlns:a16="http://schemas.microsoft.com/office/drawing/2014/main" xmlns="" id="{C33D05C6-2A9E-4505-B106-0244E437B165}"/>
               </a:ext>
             </a:extLst>
           </p:cNvPr>
@@ -3632,7 +3632,7 @@
           <p:cNvPr id="5" name="TextBox 4">
             <a:extLst>
               <a:ext uri="{FF2B5EF4-FFF2-40B4-BE49-F238E27FC236}">
-                <a16:creationId xmlns:a16="http://schemas.microsoft.com/office/drawing/2014/main" id="{11F03BD8-3EAE-4C1E-821B-2A0065236F05}"/>
+                <a16:creationId xmlns:a16="http://schemas.microsoft.com/office/drawing/2014/main" xmlns="" id="{11F03BD8-3EAE-4C1E-821B-2A0065236F05}"/>
               </a:ext>
             </a:extLst>
           </p:cNvPr>
@@ -3667,7 +3667,7 @@
           <p:cNvPr id="6" name="TextBox 5">
             <a:extLst>
               <a:ext uri="{FF2B5EF4-FFF2-40B4-BE49-F238E27FC236}">
-                <a16:creationId xmlns:a16="http://schemas.microsoft.com/office/drawing/2014/main" id="{84B62FB5-4C6F-4683-880C-73DE15A1113D}"/>
+                <a16:creationId xmlns:a16="http://schemas.microsoft.com/office/drawing/2014/main" xmlns="" id="{84B62FB5-4C6F-4683-880C-73DE15A1113D}"/>
               </a:ext>
             </a:extLst>
           </p:cNvPr>
@@ -3867,7 +3867,7 @@
           <p:cNvPr id="2" name="Title 1">
             <a:extLst>
               <a:ext uri="{FF2B5EF4-FFF2-40B4-BE49-F238E27FC236}">
-                <a16:creationId xmlns:a16="http://schemas.microsoft.com/office/drawing/2014/main" id="{FABF0F4E-B9AE-4446-883F-DE3CB06B7560}"/>
+                <a16:creationId xmlns:a16="http://schemas.microsoft.com/office/drawing/2014/main" xmlns="" id="{FABF0F4E-B9AE-4446-883F-DE3CB06B7560}"/>
               </a:ext>
             </a:extLst>
           </p:cNvPr>
@@ -3895,7 +3895,7 @@
           <p:cNvPr id="3" name="Content Placeholder 2">
             <a:extLst>
               <a:ext uri="{FF2B5EF4-FFF2-40B4-BE49-F238E27FC236}">
-                <a16:creationId xmlns:a16="http://schemas.microsoft.com/office/drawing/2014/main" id="{2574168F-51F4-49A4-B7B6-FCFC156CD676}"/>
+                <a16:creationId xmlns:a16="http://schemas.microsoft.com/office/drawing/2014/main" xmlns="" id="{2574168F-51F4-49A4-B7B6-FCFC156CD676}"/>
               </a:ext>
             </a:extLst>
           </p:cNvPr>
@@ -3926,10 +3926,10 @@
       </p:sp>
       <p:pic>
         <p:nvPicPr>
-          <p:cNvPr id="5" name="Picture 4">
-            <a:extLst>
-              <a:ext uri="{FF2B5EF4-FFF2-40B4-BE49-F238E27FC236}">
-                <a16:creationId xmlns:a16="http://schemas.microsoft.com/office/drawing/2014/main" id="{8AB70A36-4DB0-4BC4-B22C-5FE2076E9793}"/>
+          <p:cNvPr id="6" name="Picture 5">
+            <a:extLst>
+              <a:ext uri="{FF2B5EF4-FFF2-40B4-BE49-F238E27FC236}">
+                <a16:creationId xmlns:a16="http://schemas.microsoft.com/office/drawing/2014/main" xmlns="" id="{A1F7AC49-2C48-402C-B878-35AD5F1C88E8}"/>
               </a:ext>
             </a:extLst>
           </p:cNvPr>
@@ -3940,42 +3940,6 @@
         </p:nvPicPr>
         <p:blipFill>
           <a:blip r:embed="rId2">
-            <a:extLst>
-              <a:ext uri="{28A0092B-C50C-407E-A947-70E740481C1C}">
-                <a14:useLocalDpi xmlns:a14="http://schemas.microsoft.com/office/drawing/2010/main" val="0"/>
-              </a:ext>
-            </a:extLst>
-          </a:blip>
-          <a:stretch>
-            <a:fillRect/>
-          </a:stretch>
-        </p:blipFill>
-        <p:spPr>
-          <a:xfrm>
-            <a:off x="1058509" y="3244373"/>
-            <a:ext cx="4543221" cy="3221556"/>
-          </a:xfrm>
-          <a:prstGeom prst="rect">
-            <a:avLst/>
-          </a:prstGeom>
-        </p:spPr>
-      </p:pic>
-      <p:pic>
-        <p:nvPicPr>
-          <p:cNvPr id="6" name="Picture 5">
-            <a:extLst>
-              <a:ext uri="{FF2B5EF4-FFF2-40B4-BE49-F238E27FC236}">
-                <a16:creationId xmlns:a16="http://schemas.microsoft.com/office/drawing/2014/main" id="{A1F7AC49-2C48-402C-B878-35AD5F1C88E8}"/>
-              </a:ext>
-            </a:extLst>
-          </p:cNvPr>
-          <p:cNvPicPr>
-            <a:picLocks noChangeAspect="1"/>
-          </p:cNvPicPr>
-          <p:nvPr/>
-        </p:nvPicPr>
-        <p:blipFill>
-          <a:blip r:embed="rId3">
             <a:extLst>
               <a:ext uri="{28A0092B-C50C-407E-A947-70E740481C1C}">
                 <a14:useLocalDpi xmlns:a14="http://schemas.microsoft.com/office/drawing/2010/main" val="0"/>
@@ -3990,6 +3954,35 @@
           <a:xfrm>
             <a:off x="5677534" y="3244373"/>
             <a:ext cx="4265535" cy="3204303"/>
+          </a:xfrm>
+          <a:prstGeom prst="rect">
+            <a:avLst/>
+          </a:prstGeom>
+        </p:spPr>
+      </p:pic>
+      <p:pic>
+        <p:nvPicPr>
+          <p:cNvPr id="4" name="Picture 3"/>
+          <p:cNvPicPr>
+            <a:picLocks noChangeAspect="1"/>
+          </p:cNvPicPr>
+          <p:nvPr/>
+        </p:nvPicPr>
+        <p:blipFill rotWithShape="1">
+          <a:blip r:embed="rId3">
+            <a:extLst>
+              <a:ext uri="{28A0092B-C50C-407E-A947-70E740481C1C}">
+                <a14:useLocalDpi xmlns:a14="http://schemas.microsoft.com/office/drawing/2010/main" val="0"/>
+              </a:ext>
+            </a:extLst>
+          </a:blip>
+          <a:srcRect r="7165"/>
+          <a:stretch/>
+        </p:blipFill>
+        <p:spPr>
+          <a:xfrm>
+            <a:off x="1166444" y="3244373"/>
+            <a:ext cx="3986002" cy="3323404"/>
           </a:xfrm>
           <a:prstGeom prst="rect">
             <a:avLst/>
@@ -4031,7 +4024,7 @@
           <p:cNvPr id="2" name="Title 1">
             <a:extLst>
               <a:ext uri="{FF2B5EF4-FFF2-40B4-BE49-F238E27FC236}">
-                <a16:creationId xmlns:a16="http://schemas.microsoft.com/office/drawing/2014/main" id="{6F5182C3-7734-4537-92BC-2453EB827EDA}"/>
+                <a16:creationId xmlns:a16="http://schemas.microsoft.com/office/drawing/2014/main" xmlns="" id="{6F5182C3-7734-4537-92BC-2453EB827EDA}"/>
               </a:ext>
             </a:extLst>
           </p:cNvPr>
@@ -4059,7 +4052,7 @@
           <p:cNvPr id="3" name="Content Placeholder 2">
             <a:extLst>
               <a:ext uri="{FF2B5EF4-FFF2-40B4-BE49-F238E27FC236}">
-                <a16:creationId xmlns:a16="http://schemas.microsoft.com/office/drawing/2014/main" id="{5893C26D-C3F3-43F0-91DF-F02497A699EF}"/>
+                <a16:creationId xmlns:a16="http://schemas.microsoft.com/office/drawing/2014/main" xmlns="" id="{5893C26D-C3F3-43F0-91DF-F02497A699EF}"/>
               </a:ext>
             </a:extLst>
           </p:cNvPr>
@@ -4141,7 +4134,7 @@
           <p:cNvPr id="2" name="Title 1">
             <a:extLst>
               <a:ext uri="{FF2B5EF4-FFF2-40B4-BE49-F238E27FC236}">
-                <a16:creationId xmlns:a16="http://schemas.microsoft.com/office/drawing/2014/main" id="{E26B021A-EED9-436A-A0DE-2465435F540B}"/>
+                <a16:creationId xmlns:a16="http://schemas.microsoft.com/office/drawing/2014/main" xmlns="" id="{E26B021A-EED9-436A-A0DE-2465435F540B}"/>
               </a:ext>
             </a:extLst>
           </p:cNvPr>
@@ -4169,7 +4162,7 @@
           <p:cNvPr id="3" name="Content Placeholder 2">
             <a:extLst>
               <a:ext uri="{FF2B5EF4-FFF2-40B4-BE49-F238E27FC236}">
-                <a16:creationId xmlns:a16="http://schemas.microsoft.com/office/drawing/2014/main" id="{A12394C0-40B2-4333-8604-D0F03675FDF1}"/>
+                <a16:creationId xmlns:a16="http://schemas.microsoft.com/office/drawing/2014/main" xmlns="" id="{A12394C0-40B2-4333-8604-D0F03675FDF1}"/>
               </a:ext>
             </a:extLst>
           </p:cNvPr>
@@ -4220,7 +4213,7 @@
           <p:cNvPr id="4" name="Picture 3">
             <a:extLst>
               <a:ext uri="{FF2B5EF4-FFF2-40B4-BE49-F238E27FC236}">
-                <a16:creationId xmlns:a16="http://schemas.microsoft.com/office/drawing/2014/main" id="{CF740A40-3F2D-48AF-906D-7DB8DD6458B1}"/>
+                <a16:creationId xmlns:a16="http://schemas.microsoft.com/office/drawing/2014/main" xmlns="" id="{CF740A40-3F2D-48AF-906D-7DB8DD6458B1}"/>
               </a:ext>
             </a:extLst>
           </p:cNvPr>
@@ -4249,7 +4242,7 @@
           <p:cNvPr id="5" name="TextBox 4">
             <a:extLst>
               <a:ext uri="{FF2B5EF4-FFF2-40B4-BE49-F238E27FC236}">
-                <a16:creationId xmlns:a16="http://schemas.microsoft.com/office/drawing/2014/main" id="{4D37DA81-C6A4-44FC-A631-E3C82791D1B6}"/>
+                <a16:creationId xmlns:a16="http://schemas.microsoft.com/office/drawing/2014/main" xmlns="" id="{4D37DA81-C6A4-44FC-A631-E3C82791D1B6}"/>
               </a:ext>
             </a:extLst>
           </p:cNvPr>
@@ -4318,7 +4311,7 @@
           <p:cNvPr id="2" name="Title 1">
             <a:extLst>
               <a:ext uri="{FF2B5EF4-FFF2-40B4-BE49-F238E27FC236}">
-                <a16:creationId xmlns:a16="http://schemas.microsoft.com/office/drawing/2014/main" id="{287C7871-7EAB-498D-A07B-8A690D612FDD}"/>
+                <a16:creationId xmlns:a16="http://schemas.microsoft.com/office/drawing/2014/main" xmlns="" id="{287C7871-7EAB-498D-A07B-8A690D612FDD}"/>
               </a:ext>
             </a:extLst>
           </p:cNvPr>
@@ -4346,7 +4339,7 @@
           <p:cNvPr id="3" name="Content Placeholder 2">
             <a:extLst>
               <a:ext uri="{FF2B5EF4-FFF2-40B4-BE49-F238E27FC236}">
-                <a16:creationId xmlns:a16="http://schemas.microsoft.com/office/drawing/2014/main" id="{5F6D47C8-A8A0-4D56-87C4-965976FE8911}"/>
+                <a16:creationId xmlns:a16="http://schemas.microsoft.com/office/drawing/2014/main" xmlns="" id="{5F6D47C8-A8A0-4D56-87C4-965976FE8911}"/>
               </a:ext>
             </a:extLst>
           </p:cNvPr>
@@ -4391,7 +4384,7 @@
           <p:cNvPr id="5" name="TextBox 4">
             <a:extLst>
               <a:ext uri="{FF2B5EF4-FFF2-40B4-BE49-F238E27FC236}">
-                <a16:creationId xmlns:a16="http://schemas.microsoft.com/office/drawing/2014/main" id="{502CC89A-7DB2-4E47-9A57-AF20541BECFA}"/>
+                <a16:creationId xmlns:a16="http://schemas.microsoft.com/office/drawing/2014/main" xmlns="" id="{502CC89A-7DB2-4E47-9A57-AF20541BECFA}"/>
               </a:ext>
             </a:extLst>
           </p:cNvPr>
@@ -4400,7 +4393,7 @@
         </p:nvSpPr>
         <p:spPr>
           <a:xfrm>
-            <a:off x="1939826" y="6325749"/>
+            <a:off x="1969916" y="6192833"/>
             <a:ext cx="7161375" cy="461665"/>
           </a:xfrm>
           <a:prstGeom prst="rect">
@@ -4416,8 +4409,37 @@
           <a:p>
             <a:r>
               <a:rPr lang="en-US" sz="1200" dirty="0"/>
-              <a:t>Maas2002 demonstrated that dynamic synapses (right, top) provided better classification on a four-element characterization problem compared to static synapses (right, bottom) </a:t>
-            </a:r>
+              <a:t>Maas2002 demonstrated that </a:t>
+            </a:r>
+            <a:r>
+              <a:rPr lang="en-US" sz="1200" dirty="0" smtClean="0"/>
+              <a:t>fading memory created by dynamic </a:t>
+            </a:r>
+            <a:r>
+              <a:rPr lang="en-US" sz="1200" dirty="0"/>
+              <a:t>synapses (right, top) </a:t>
+            </a:r>
+            <a:r>
+              <a:rPr lang="en-US" sz="1200" dirty="0" smtClean="0"/>
+              <a:t>can recognize past events in a time series. The network with </a:t>
+            </a:r>
+            <a:r>
+              <a:rPr lang="en-US" sz="1200" dirty="0"/>
+              <a:t>s</a:t>
+            </a:r>
+            <a:r>
+              <a:rPr lang="en-US" sz="1200" dirty="0" smtClean="0"/>
+              <a:t>tatic </a:t>
+            </a:r>
+            <a:r>
+              <a:rPr lang="en-US" sz="1200" dirty="0"/>
+              <a:t>synapses (right, bottom) </a:t>
+            </a:r>
+            <a:r>
+              <a:rPr lang="en-US" sz="1200" dirty="0" smtClean="0"/>
+              <a:t>showed limited memory.</a:t>
+            </a:r>
+            <a:endParaRPr lang="en-US" sz="1200" dirty="0"/>
           </a:p>
         </p:txBody>
       </p:sp>
@@ -4426,7 +4448,7 @@
           <p:cNvPr id="6" name="Group 5">
             <a:extLst>
               <a:ext uri="{FF2B5EF4-FFF2-40B4-BE49-F238E27FC236}">
-                <a16:creationId xmlns:a16="http://schemas.microsoft.com/office/drawing/2014/main" id="{5F2529EB-45AC-42AE-A179-8B0EC3770042}"/>
+                <a16:creationId xmlns:a16="http://schemas.microsoft.com/office/drawing/2014/main" xmlns="" id="{5F2529EB-45AC-42AE-A179-8B0EC3770042}"/>
               </a:ext>
             </a:extLst>
           </p:cNvPr>
@@ -4446,7 +4468,7 @@
             <p:cNvPr id="4" name="Picture 3">
               <a:extLst>
                 <a:ext uri="{FF2B5EF4-FFF2-40B4-BE49-F238E27FC236}">
-                  <a16:creationId xmlns:a16="http://schemas.microsoft.com/office/drawing/2014/main" id="{F73BE7D2-1DCD-44E3-A7A3-77B608AC8E06}"/>
+                  <a16:creationId xmlns:a16="http://schemas.microsoft.com/office/drawing/2014/main" xmlns="" id="{F73BE7D2-1DCD-44E3-A7A3-77B608AC8E06}"/>
                 </a:ext>
               </a:extLst>
             </p:cNvPr>
@@ -4475,7 +4497,7 @@
             <p:cNvPr id="8" name="Picture 7">
               <a:extLst>
                 <a:ext uri="{FF2B5EF4-FFF2-40B4-BE49-F238E27FC236}">
-                  <a16:creationId xmlns:a16="http://schemas.microsoft.com/office/drawing/2014/main" id="{A5DFC503-0B69-4A1E-80AE-A2273686A16D}"/>
+                  <a16:creationId xmlns:a16="http://schemas.microsoft.com/office/drawing/2014/main" xmlns="" id="{A5DFC503-0B69-4A1E-80AE-A2273686A16D}"/>
                 </a:ext>
               </a:extLst>
             </p:cNvPr>
@@ -4541,7 +4563,7 @@
           <p:cNvPr id="2" name="Title 1">
             <a:extLst>
               <a:ext uri="{FF2B5EF4-FFF2-40B4-BE49-F238E27FC236}">
-                <a16:creationId xmlns:a16="http://schemas.microsoft.com/office/drawing/2014/main" id="{2B4589EA-8981-4D8B-BFF9-EF6B5CEB43F6}"/>
+                <a16:creationId xmlns:a16="http://schemas.microsoft.com/office/drawing/2014/main" xmlns="" id="{2B4589EA-8981-4D8B-BFF9-EF6B5CEB43F6}"/>
               </a:ext>
             </a:extLst>
           </p:cNvPr>
@@ -4564,14 +4586,14 @@
           </a:p>
         </p:txBody>
       </p:sp>
-      <mc:AlternateContent xmlns:mc="http://schemas.openxmlformats.org/markup-compatibility/2006">
-        <mc:Choice xmlns:a14="http://schemas.microsoft.com/office/drawing/2010/main" Requires="a14">
+      <mc:AlternateContent xmlns:mc="http://schemas.openxmlformats.org/markup-compatibility/2006" xmlns:a14="http://schemas.microsoft.com/office/drawing/2010/main">
+        <mc:Choice Requires="a14">
           <p:sp>
             <p:nvSpPr>
               <p:cNvPr id="3" name="Content Placeholder 2">
                 <a:extLst>
                   <a:ext uri="{FF2B5EF4-FFF2-40B4-BE49-F238E27FC236}">
-                    <a16:creationId xmlns:a16="http://schemas.microsoft.com/office/drawing/2014/main" id="{CEFBA1D3-8DC0-42EF-8053-6E8020733836}"/>
+                    <a16:creationId xmlns:a16="http://schemas.microsoft.com/office/drawing/2014/main" xmlns="" id="{CEFBA1D3-8DC0-42EF-8053-6E8020733836}"/>
                   </a:ext>
                 </a:extLst>
               </p:cNvPr>
@@ -4730,7 +4752,7 @@
             </p:txBody>
           </p:sp>
         </mc:Choice>
-        <mc:Fallback>
+        <mc:Fallback xmlns="">
           <p:sp>
             <p:nvSpPr>
               <p:cNvPr id="3" name="Content Placeholder 2">
@@ -4779,7 +4801,7 @@
           <p:cNvPr id="11" name="Group 10">
             <a:extLst>
               <a:ext uri="{FF2B5EF4-FFF2-40B4-BE49-F238E27FC236}">
-                <a16:creationId xmlns:a16="http://schemas.microsoft.com/office/drawing/2014/main" id="{C27BBC6F-3490-477E-8494-21469B69C214}"/>
+                <a16:creationId xmlns:a16="http://schemas.microsoft.com/office/drawing/2014/main" xmlns="" id="{C27BBC6F-3490-477E-8494-21469B69C214}"/>
               </a:ext>
             </a:extLst>
           </p:cNvPr>
@@ -4788,8 +4810,8 @@
         </p:nvGrpSpPr>
         <p:grpSpPr>
           <a:xfrm>
-            <a:off x="1859693" y="3215888"/>
-            <a:ext cx="7356738" cy="3405691"/>
+            <a:off x="838200" y="3080951"/>
+            <a:ext cx="6465323" cy="3083249"/>
             <a:chOff x="167802" y="2659872"/>
             <a:chExt cx="8838725" cy="4019952"/>
           </a:xfrm>
@@ -4799,7 +4821,7 @@
             <p:cNvPr id="4" name="Picture 3">
               <a:extLst>
                 <a:ext uri="{FF2B5EF4-FFF2-40B4-BE49-F238E27FC236}">
-                  <a16:creationId xmlns:a16="http://schemas.microsoft.com/office/drawing/2014/main" id="{2586738C-618A-4C35-98F4-DE8DD67C07DC}"/>
+                  <a16:creationId xmlns:a16="http://schemas.microsoft.com/office/drawing/2014/main" xmlns="" id="{2586738C-618A-4C35-98F4-DE8DD67C07DC}"/>
                 </a:ext>
               </a:extLst>
             </p:cNvPr>
@@ -4809,7 +4831,7 @@
             <p:nvPr/>
           </p:nvPicPr>
           <p:blipFill>
-            <a:blip r:embed="rId3">
+            <a:blip r:embed="rId3" cstate="print">
               <a:extLst>
                 <a:ext uri="{28A0092B-C50C-407E-A947-70E740481C1C}">
                   <a14:useLocalDpi xmlns:a14="http://schemas.microsoft.com/office/drawing/2010/main" val="0"/>
@@ -4835,7 +4857,7 @@
             <p:cNvPr id="6" name="Picture 5">
               <a:extLst>
                 <a:ext uri="{FF2B5EF4-FFF2-40B4-BE49-F238E27FC236}">
-                  <a16:creationId xmlns:a16="http://schemas.microsoft.com/office/drawing/2014/main" id="{6FDD1A8E-7A14-4A69-A89F-C48D23E58495}"/>
+                  <a16:creationId xmlns:a16="http://schemas.microsoft.com/office/drawing/2014/main" xmlns="" id="{6FDD1A8E-7A14-4A69-A89F-C48D23E58495}"/>
                 </a:ext>
               </a:extLst>
             </p:cNvPr>
@@ -4845,7 +4867,7 @@
             <p:nvPr/>
           </p:nvPicPr>
           <p:blipFill>
-            <a:blip r:embed="rId4">
+            <a:blip r:embed="rId4" cstate="print">
               <a:extLst>
                 <a:ext uri="{28A0092B-C50C-407E-A947-70E740481C1C}">
                   <a14:useLocalDpi xmlns:a14="http://schemas.microsoft.com/office/drawing/2010/main" val="0"/>
@@ -4871,7 +4893,7 @@
             <p:cNvPr id="8" name="Picture 7">
               <a:extLst>
                 <a:ext uri="{FF2B5EF4-FFF2-40B4-BE49-F238E27FC236}">
-                  <a16:creationId xmlns:a16="http://schemas.microsoft.com/office/drawing/2014/main" id="{10EB060F-ED99-45D3-9BB2-BF5E00DF35DD}"/>
+                  <a16:creationId xmlns:a16="http://schemas.microsoft.com/office/drawing/2014/main" xmlns="" id="{10EB060F-ED99-45D3-9BB2-BF5E00DF35DD}"/>
                 </a:ext>
               </a:extLst>
             </p:cNvPr>
@@ -4881,7 +4903,7 @@
             <p:nvPr/>
           </p:nvPicPr>
           <p:blipFill>
-            <a:blip r:embed="rId5">
+            <a:blip r:embed="rId5" cstate="print">
               <a:extLst>
                 <a:ext uri="{28A0092B-C50C-407E-A947-70E740481C1C}">
                   <a14:useLocalDpi xmlns:a14="http://schemas.microsoft.com/office/drawing/2010/main" val="0"/>
@@ -4903,6 +4925,35 @@
           </p:spPr>
         </p:pic>
       </p:grpSp>
+      <p:pic>
+        <p:nvPicPr>
+          <p:cNvPr id="5" name="Picture 4"/>
+          <p:cNvPicPr>
+            <a:picLocks noChangeAspect="1"/>
+          </p:cNvPicPr>
+          <p:nvPr/>
+        </p:nvPicPr>
+        <p:blipFill rotWithShape="1">
+          <a:blip r:embed="rId6">
+            <a:extLst>
+              <a:ext uri="{28A0092B-C50C-407E-A947-70E740481C1C}">
+                <a14:useLocalDpi xmlns:a14="http://schemas.microsoft.com/office/drawing/2010/main" val="0"/>
+              </a:ext>
+            </a:extLst>
+          </a:blip>
+          <a:srcRect l="3272" r="5623"/>
+          <a:stretch/>
+        </p:blipFill>
+        <p:spPr>
+          <a:xfrm>
+            <a:off x="7582819" y="3215888"/>
+            <a:ext cx="3954524" cy="2927103"/>
+          </a:xfrm>
+          <a:prstGeom prst="rect">
+            <a:avLst/>
+          </a:prstGeom>
+        </p:spPr>
+      </p:pic>
     </p:spTree>
     <p:extLst>
       <p:ext uri="{BB962C8B-B14F-4D97-AF65-F5344CB8AC3E}">
@@ -4938,7 +4989,7 @@
           <p:cNvPr id="2" name="Title 1">
             <a:extLst>
               <a:ext uri="{FF2B5EF4-FFF2-40B4-BE49-F238E27FC236}">
-                <a16:creationId xmlns:a16="http://schemas.microsoft.com/office/drawing/2014/main" id="{62B12E8E-4104-45CA-BF80-CCAE1A31ACF7}"/>
+                <a16:creationId xmlns:a16="http://schemas.microsoft.com/office/drawing/2014/main" xmlns="" id="{62B12E8E-4104-45CA-BF80-CCAE1A31ACF7}"/>
               </a:ext>
             </a:extLst>
           </p:cNvPr>
@@ -4966,7 +5017,7 @@
           <p:cNvPr id="3" name="Content Placeholder 2">
             <a:extLst>
               <a:ext uri="{FF2B5EF4-FFF2-40B4-BE49-F238E27FC236}">
-                <a16:creationId xmlns:a16="http://schemas.microsoft.com/office/drawing/2014/main" id="{1ECC2F40-9D0A-4B2B-8EBC-6C6B50E3F5E7}"/>
+                <a16:creationId xmlns:a16="http://schemas.microsoft.com/office/drawing/2014/main" xmlns="" id="{1ECC2F40-9D0A-4B2B-8EBC-6C6B50E3F5E7}"/>
               </a:ext>
             </a:extLst>
           </p:cNvPr>
@@ -5016,7 +5067,7 @@
           <p:cNvPr id="16" name="Picture 15">
             <a:extLst>
               <a:ext uri="{FF2B5EF4-FFF2-40B4-BE49-F238E27FC236}">
-                <a16:creationId xmlns:a16="http://schemas.microsoft.com/office/drawing/2014/main" id="{5927E8A9-79EC-4192-BA10-E750069FCBEA}"/>
+                <a16:creationId xmlns:a16="http://schemas.microsoft.com/office/drawing/2014/main" xmlns="" id="{5927E8A9-79EC-4192-BA10-E750069FCBEA}"/>
               </a:ext>
             </a:extLst>
           </p:cNvPr>
@@ -5075,7 +5126,7 @@
           <p:cNvPr id="2" name="Title 1">
             <a:extLst>
               <a:ext uri="{FF2B5EF4-FFF2-40B4-BE49-F238E27FC236}">
-                <a16:creationId xmlns:a16="http://schemas.microsoft.com/office/drawing/2014/main" id="{0B2F3FFF-8E2C-4B7F-9726-3B4DE9C5C9F2}"/>
+                <a16:creationId xmlns:a16="http://schemas.microsoft.com/office/drawing/2014/main" xmlns="" id="{0B2F3FFF-8E2C-4B7F-9726-3B4DE9C5C9F2}"/>
               </a:ext>
             </a:extLst>
           </p:cNvPr>
@@ -5103,7 +5154,7 @@
           <p:cNvPr id="5" name="Content Placeholder 4">
             <a:extLst>
               <a:ext uri="{FF2B5EF4-FFF2-40B4-BE49-F238E27FC236}">
-                <a16:creationId xmlns:a16="http://schemas.microsoft.com/office/drawing/2014/main" id="{D8CB21F4-1B9F-436B-BEBC-ADD994CCABDF}"/>
+                <a16:creationId xmlns:a16="http://schemas.microsoft.com/office/drawing/2014/main" xmlns="" id="{D8CB21F4-1B9F-436B-BEBC-ADD994CCABDF}"/>
               </a:ext>
             </a:extLst>
           </p:cNvPr>
@@ -5146,7 +5197,7 @@
           <p:cNvPr id="4" name="Picture 3">
             <a:extLst>
               <a:ext uri="{FF2B5EF4-FFF2-40B4-BE49-F238E27FC236}">
-                <a16:creationId xmlns:a16="http://schemas.microsoft.com/office/drawing/2014/main" id="{B21A92C4-9CFA-4F73-BAD1-C3E8C6DB2BCA}"/>
+                <a16:creationId xmlns:a16="http://schemas.microsoft.com/office/drawing/2014/main" xmlns="" id="{B21A92C4-9CFA-4F73-BAD1-C3E8C6DB2BCA}"/>
               </a:ext>
             </a:extLst>
           </p:cNvPr>
@@ -5206,7 +5257,7 @@
           <p:cNvPr id="2" name="Title 1">
             <a:extLst>
               <a:ext uri="{FF2B5EF4-FFF2-40B4-BE49-F238E27FC236}">
-                <a16:creationId xmlns:a16="http://schemas.microsoft.com/office/drawing/2014/main" id="{03536115-048F-4F60-B353-3AEE9BB69F11}"/>
+                <a16:creationId xmlns:a16="http://schemas.microsoft.com/office/drawing/2014/main" xmlns="" id="{03536115-048F-4F60-B353-3AEE9BB69F11}"/>
               </a:ext>
             </a:extLst>
           </p:cNvPr>
@@ -5234,7 +5285,7 @@
           <p:cNvPr id="3" name="Content Placeholder 2">
             <a:extLst>
               <a:ext uri="{FF2B5EF4-FFF2-40B4-BE49-F238E27FC236}">
-                <a16:creationId xmlns:a16="http://schemas.microsoft.com/office/drawing/2014/main" id="{C16B18B1-8E66-4478-AF65-BE72EA7F4CBD}"/>
+                <a16:creationId xmlns:a16="http://schemas.microsoft.com/office/drawing/2014/main" xmlns="" id="{C16B18B1-8E66-4478-AF65-BE72EA7F4CBD}"/>
               </a:ext>
             </a:extLst>
           </p:cNvPr>
@@ -5268,7 +5319,7 @@
           <p:cNvPr id="5" name="Picture 4">
             <a:extLst>
               <a:ext uri="{FF2B5EF4-FFF2-40B4-BE49-F238E27FC236}">
-                <a16:creationId xmlns:a16="http://schemas.microsoft.com/office/drawing/2014/main" id="{B1A82E9A-EA27-40E8-AD4F-BFB478797B41}"/>
+                <a16:creationId xmlns:a16="http://schemas.microsoft.com/office/drawing/2014/main" xmlns="" id="{B1A82E9A-EA27-40E8-AD4F-BFB478797B41}"/>
               </a:ext>
             </a:extLst>
           </p:cNvPr>
@@ -5304,7 +5355,7 @@
           <p:cNvPr id="7" name="Picture 6">
             <a:extLst>
               <a:ext uri="{FF2B5EF4-FFF2-40B4-BE49-F238E27FC236}">
-                <a16:creationId xmlns:a16="http://schemas.microsoft.com/office/drawing/2014/main" id="{CC26EFDE-91EF-41FB-8EEE-22A802F51C21}"/>
+                <a16:creationId xmlns:a16="http://schemas.microsoft.com/office/drawing/2014/main" xmlns="" id="{CC26EFDE-91EF-41FB-8EEE-22A802F51C21}"/>
               </a:ext>
             </a:extLst>
           </p:cNvPr>
@@ -5340,7 +5391,7 @@
           <p:cNvPr id="8" name="TextBox 7">
             <a:extLst>
               <a:ext uri="{FF2B5EF4-FFF2-40B4-BE49-F238E27FC236}">
-                <a16:creationId xmlns:a16="http://schemas.microsoft.com/office/drawing/2014/main" id="{51B686F4-A933-4AB7-89BE-72C1BCE4F7F0}"/>
+                <a16:creationId xmlns:a16="http://schemas.microsoft.com/office/drawing/2014/main" xmlns="" id="{51B686F4-A933-4AB7-89BE-72C1BCE4F7F0}"/>
               </a:ext>
             </a:extLst>
           </p:cNvPr>
@@ -5405,7 +5456,7 @@
           <p:cNvPr id="2" name="Title 1">
             <a:extLst>
               <a:ext uri="{FF2B5EF4-FFF2-40B4-BE49-F238E27FC236}">
-                <a16:creationId xmlns:a16="http://schemas.microsoft.com/office/drawing/2014/main" id="{DD49139E-AFFE-46F8-B928-3AB424E80F71}"/>
+                <a16:creationId xmlns:a16="http://schemas.microsoft.com/office/drawing/2014/main" xmlns="" id="{DD49139E-AFFE-46F8-B928-3AB424E80F71}"/>
               </a:ext>
             </a:extLst>
           </p:cNvPr>
@@ -5433,7 +5484,7 @@
           <p:cNvPr id="3" name="Text Placeholder 2">
             <a:extLst>
               <a:ext uri="{FF2B5EF4-FFF2-40B4-BE49-F238E27FC236}">
-                <a16:creationId xmlns:a16="http://schemas.microsoft.com/office/drawing/2014/main" id="{E1DC7A49-D55C-4745-A092-1B3307C9D230}"/>
+                <a16:creationId xmlns:a16="http://schemas.microsoft.com/office/drawing/2014/main" xmlns="" id="{E1DC7A49-D55C-4745-A092-1B3307C9D230}"/>
               </a:ext>
             </a:extLst>
           </p:cNvPr>

</xml_diff>

<commit_message>
Oral qual presentation with new distance figures
</commit_message>
<xml_diff>
--- a/thesis/oral_qual/Oral Qual Presentation.pptx
+++ b/thesis/oral_qual/Oral Qual Presentation.pptx
@@ -7,15 +7,23 @@
   <p:sldIdLst>
     <p:sldId id="256" r:id="rId2"/>
     <p:sldId id="257" r:id="rId3"/>
-    <p:sldId id="260" r:id="rId4"/>
-    <p:sldId id="269" r:id="rId5"/>
-    <p:sldId id="264" r:id="rId6"/>
-    <p:sldId id="273" r:id="rId7"/>
-    <p:sldId id="274" r:id="rId8"/>
-    <p:sldId id="275" r:id="rId9"/>
+    <p:sldId id="277" r:id="rId4"/>
+    <p:sldId id="260" r:id="rId5"/>
+    <p:sldId id="269" r:id="rId6"/>
+    <p:sldId id="284" r:id="rId7"/>
+    <p:sldId id="286" r:id="rId8"/>
+    <p:sldId id="283" r:id="rId9"/>
     <p:sldId id="276" r:id="rId10"/>
-    <p:sldId id="272" r:id="rId11"/>
-    <p:sldId id="271" r:id="rId12"/>
+    <p:sldId id="279" r:id="rId11"/>
+    <p:sldId id="264" r:id="rId12"/>
+    <p:sldId id="273" r:id="rId13"/>
+    <p:sldId id="278" r:id="rId14"/>
+    <p:sldId id="272" r:id="rId15"/>
+    <p:sldId id="271" r:id="rId16"/>
+    <p:sldId id="280" r:id="rId17"/>
+    <p:sldId id="281" r:id="rId18"/>
+    <p:sldId id="282" r:id="rId19"/>
+    <p:sldId id="285" r:id="rId20"/>
   </p:sldIdLst>
   <p:sldSz cx="12192000" cy="6858000"/>
   <p:notesSz cx="6858000" cy="9144000"/>
@@ -446,7 +454,7 @@
           <a:p>
             <a:fld id="{0BC610E4-0AD4-4B2C-A1AF-CEC06808CA2D}" type="datetimeFigureOut">
               <a:rPr lang="en-US" smtClean="0"/>
-              <a:t>5/15/2018</a:t>
+              <a:t>5/18/2018</a:t>
             </a:fld>
             <a:endParaRPr lang="en-US"/>
           </a:p>
@@ -662,7 +670,7 @@
           <a:p>
             <a:fld id="{0BC610E4-0AD4-4B2C-A1AF-CEC06808CA2D}" type="datetimeFigureOut">
               <a:rPr lang="en-US" smtClean="0"/>
-              <a:t>5/15/2018</a:t>
+              <a:t>5/18/2018</a:t>
             </a:fld>
             <a:endParaRPr lang="en-US"/>
           </a:p>
@@ -868,7 +876,7 @@
           <a:p>
             <a:fld id="{0BC610E4-0AD4-4B2C-A1AF-CEC06808CA2D}" type="datetimeFigureOut">
               <a:rPr lang="en-US" smtClean="0"/>
-              <a:t>5/15/2018</a:t>
+              <a:t>5/18/2018</a:t>
             </a:fld>
             <a:endParaRPr lang="en-US"/>
           </a:p>
@@ -1141,7 +1149,7 @@
           <a:p>
             <a:fld id="{0BC610E4-0AD4-4B2C-A1AF-CEC06808CA2D}" type="datetimeFigureOut">
               <a:rPr lang="en-US" smtClean="0"/>
-              <a:t>5/15/2018</a:t>
+              <a:t>5/18/2018</a:t>
             </a:fld>
             <a:endParaRPr lang="en-US"/>
           </a:p>
@@ -1424,7 +1432,7 @@
           <a:p>
             <a:fld id="{0BC610E4-0AD4-4B2C-A1AF-CEC06808CA2D}" type="datetimeFigureOut">
               <a:rPr lang="en-US" smtClean="0"/>
-              <a:t>5/15/2018</a:t>
+              <a:t>5/18/2018</a:t>
             </a:fld>
             <a:endParaRPr lang="en-US"/>
           </a:p>
@@ -1844,7 +1852,7 @@
           <a:p>
             <a:fld id="{0BC610E4-0AD4-4B2C-A1AF-CEC06808CA2D}" type="datetimeFigureOut">
               <a:rPr lang="en-US" smtClean="0"/>
-              <a:t>5/15/2018</a:t>
+              <a:t>5/18/2018</a:t>
             </a:fld>
             <a:endParaRPr lang="en-US"/>
           </a:p>
@@ -1993,7 +2001,7 @@
           <a:p>
             <a:fld id="{0BC610E4-0AD4-4B2C-A1AF-CEC06808CA2D}" type="datetimeFigureOut">
               <a:rPr lang="en-US" smtClean="0"/>
-              <a:t>5/15/2018</a:t>
+              <a:t>5/18/2018</a:t>
             </a:fld>
             <a:endParaRPr lang="en-US"/>
           </a:p>
@@ -2114,7 +2122,7 @@
           <a:p>
             <a:fld id="{0BC610E4-0AD4-4B2C-A1AF-CEC06808CA2D}" type="datetimeFigureOut">
               <a:rPr lang="en-US" smtClean="0"/>
-              <a:t>5/15/2018</a:t>
+              <a:t>5/18/2018</a:t>
             </a:fld>
             <a:endParaRPr lang="en-US"/>
           </a:p>
@@ -2433,7 +2441,7 @@
           <a:p>
             <a:fld id="{0BC610E4-0AD4-4B2C-A1AF-CEC06808CA2D}" type="datetimeFigureOut">
               <a:rPr lang="en-US" smtClean="0"/>
-              <a:t>5/15/2018</a:t>
+              <a:t>5/18/2018</a:t>
             </a:fld>
             <a:endParaRPr lang="en-US"/>
           </a:p>
@@ -2729,7 +2737,7 @@
           <a:p>
             <a:fld id="{0BC610E4-0AD4-4B2C-A1AF-CEC06808CA2D}" type="datetimeFigureOut">
               <a:rPr lang="en-US" smtClean="0"/>
-              <a:t>5/15/2018</a:t>
+              <a:t>5/18/2018</a:t>
             </a:fld>
             <a:endParaRPr lang="en-US"/>
           </a:p>
@@ -3482,9 +3490,974 @@
       </p:grpSpPr>
       <p:sp>
         <p:nvSpPr>
+          <p:cNvPr id="2" name="Title 1"/>
+          <p:cNvSpPr>
+            <a:spLocks noGrp="1"/>
+          </p:cNvSpPr>
+          <p:nvPr>
+            <p:ph type="title"/>
+          </p:nvPr>
+        </p:nvSpPr>
+        <p:spPr/>
+        <p:txBody>
+          <a:bodyPr/>
+          <a:lstStyle/>
+          <a:p>
+            <a:r>
+              <a:rPr lang="en-US" dirty="0" smtClean="0"/>
+              <a:t>Problem</a:t>
+            </a:r>
+            <a:endParaRPr lang="en-US" dirty="0"/>
+          </a:p>
+        </p:txBody>
+      </p:sp>
+      <p:sp>
+        <p:nvSpPr>
+          <p:cNvPr id="3" name="Content Placeholder 2"/>
+          <p:cNvSpPr>
+            <a:spLocks noGrp="1"/>
+          </p:cNvSpPr>
+          <p:nvPr>
+            <p:ph idx="1"/>
+          </p:nvPr>
+        </p:nvSpPr>
+        <p:spPr/>
+        <p:txBody>
+          <a:bodyPr>
+            <a:normAutofit fontScale="92500"/>
+          </a:bodyPr>
+          <a:lstStyle/>
+          <a:p>
+            <a:r>
+              <a:rPr lang="en-US" dirty="0" smtClean="0"/>
+              <a:t>Simulated a small neural column</a:t>
+            </a:r>
+          </a:p>
+          <a:p>
+            <a:r>
+              <a:rPr lang="en-US" dirty="0" smtClean="0"/>
+              <a:t>MATLAB model</a:t>
+            </a:r>
+          </a:p>
+          <a:p>
+            <a:pPr lvl="1"/>
+            <a:r>
+              <a:rPr lang="en-US" dirty="0" smtClean="0"/>
+              <a:t>Izhikevich dynamics, extended to support action potential propagation times</a:t>
+            </a:r>
+          </a:p>
+          <a:p>
+            <a:pPr lvl="1"/>
+            <a:r>
+              <a:rPr lang="en-US" dirty="0" smtClean="0"/>
+              <a:t>Column structure based on Maas</a:t>
+            </a:r>
+          </a:p>
+          <a:p>
+            <a:pPr lvl="1"/>
+            <a:r>
+              <a:rPr lang="en-US" dirty="0" smtClean="0"/>
+              <a:t>Distance-dependent connectivity based on Maas</a:t>
+            </a:r>
+          </a:p>
+          <a:p>
+            <a:r>
+              <a:rPr lang="en-US" dirty="0" smtClean="0"/>
+              <a:t>Demonstrated that neural model with delays retains basic properties of Izhikevich model</a:t>
+            </a:r>
+          </a:p>
+          <a:p>
+            <a:r>
+              <a:rPr lang="en-US" dirty="0" smtClean="0"/>
+              <a:t>Demonstrated that distance-dependent delays can be a critical parameter in synchronized firing</a:t>
+            </a:r>
+          </a:p>
+          <a:p>
+            <a:r>
+              <a:rPr lang="en-US" dirty="0" smtClean="0"/>
+              <a:t>Showed that the propagation speed of a population “wave” depends on the width of the neural column</a:t>
+            </a:r>
+          </a:p>
+          <a:p>
+            <a:r>
+              <a:rPr lang="en-US" dirty="0" smtClean="0"/>
+              <a:t>Showed that the neural circuit dynamics encode information about the input spike trains</a:t>
+            </a:r>
+          </a:p>
+        </p:txBody>
+      </p:sp>
+    </p:spTree>
+    <p:extLst>
+      <p:ext uri="{BB962C8B-B14F-4D97-AF65-F5344CB8AC3E}">
+        <p14:creationId xmlns:p14="http://schemas.microsoft.com/office/powerpoint/2010/main" val="3019683983"/>
+      </p:ext>
+    </p:extLst>
+  </p:cSld>
+  <p:clrMapOvr>
+    <a:masterClrMapping/>
+  </p:clrMapOvr>
+</p:sld>
+</file>
+
+<file path=ppt/slides/slide11.xml><?xml version="1.0" encoding="utf-8"?>
+<p:sld xmlns:a="http://schemas.openxmlformats.org/drawingml/2006/main" xmlns:r="http://schemas.openxmlformats.org/officeDocument/2006/relationships" xmlns:p="http://schemas.openxmlformats.org/presentationml/2006/main">
+  <p:cSld>
+    <p:spTree>
+      <p:nvGrpSpPr>
+        <p:cNvPr id="1" name=""/>
+        <p:cNvGrpSpPr/>
+        <p:nvPr/>
+      </p:nvGrpSpPr>
+      <p:grpSpPr>
+        <a:xfrm>
+          <a:off x="0" y="0"/>
+          <a:ext cx="0" cy="0"/>
+          <a:chOff x="0" y="0"/>
+          <a:chExt cx="0" cy="0"/>
+        </a:xfrm>
+      </p:grpSpPr>
+      <p:sp>
+        <p:nvSpPr>
           <p:cNvPr id="2" name="Title 1">
             <a:extLst>
               <a:ext uri="{FF2B5EF4-FFF2-40B4-BE49-F238E27FC236}">
+                <a16:creationId xmlns:a16="http://schemas.microsoft.com/office/drawing/2014/main" xmlns="" id="{2B4589EA-8981-4D8B-BFF9-EF6B5CEB43F6}"/>
+              </a:ext>
+            </a:extLst>
+          </p:cNvPr>
+          <p:cNvSpPr>
+            <a:spLocks noGrp="1"/>
+          </p:cNvSpPr>
+          <p:nvPr>
+            <p:ph type="title"/>
+          </p:nvPr>
+        </p:nvSpPr>
+        <p:spPr/>
+        <p:txBody>
+          <a:bodyPr/>
+          <a:lstStyle/>
+          <a:p>
+            <a:r>
+              <a:rPr lang="en-US" dirty="0" smtClean="0"/>
+              <a:t>Column model</a:t>
+            </a:r>
+            <a:endParaRPr lang="en-US" dirty="0"/>
+          </a:p>
+        </p:txBody>
+      </p:sp>
+      <mc:AlternateContent xmlns:mc="http://schemas.openxmlformats.org/markup-compatibility/2006">
+        <mc:Choice xmlns:a14="http://schemas.microsoft.com/office/drawing/2010/main" Requires="a14">
+          <p:sp>
+            <p:nvSpPr>
+              <p:cNvPr id="3" name="Content Placeholder 2">
+                <a:extLst>
+                  <a:ext uri="{FF2B5EF4-FFF2-40B4-BE49-F238E27FC236}">
+                    <a16:creationId xmlns:a16="http://schemas.microsoft.com/office/drawing/2014/main" xmlns="" id="{CEFBA1D3-8DC0-42EF-8053-6E8020733836}"/>
+                  </a:ext>
+                </a:extLst>
+              </p:cNvPr>
+              <p:cNvSpPr>
+                <a:spLocks noGrp="1"/>
+              </p:cNvSpPr>
+              <p:nvPr>
+                <p:ph idx="1"/>
+              </p:nvPr>
+            </p:nvSpPr>
+            <p:spPr>
+              <a:xfrm>
+                <a:off x="838200" y="1825625"/>
+                <a:ext cx="10515600" cy="1255326"/>
+              </a:xfrm>
+            </p:spPr>
+            <p:txBody>
+              <a:bodyPr>
+                <a:normAutofit/>
+              </a:bodyPr>
+              <a:lstStyle/>
+              <a:p>
+                <a:r>
+                  <a:rPr lang="en-US" dirty="0"/>
+                  <a:t>3x3x15 column on integer grid locations, 135 </a:t>
+                </a:r>
+                <a:r>
+                  <a:rPr lang="en-US" dirty="0" smtClean="0"/>
+                  <a:t>neurons</a:t>
+                </a:r>
+                <a:endParaRPr lang="en-US" dirty="0" smtClean="0"/>
+              </a:p>
+              <a:p>
+                <a:r>
+                  <a:rPr lang="en-US" dirty="0" smtClean="0"/>
+                  <a:t>Distance-dependent connectivity, </a:t>
+                </a:r>
+                <a14:m>
+                  <m:oMath xmlns:m="http://schemas.openxmlformats.org/officeDocument/2006/math">
+                    <m:sSub>
+                      <m:sSubPr>
+                        <m:ctrlPr>
+                          <a:rPr lang="en-US" i="1">
+                            <a:latin typeface="Cambria Math" panose="02040503050406030204" pitchFamily="18" charset="0"/>
+                          </a:rPr>
+                        </m:ctrlPr>
+                      </m:sSubPr>
+                      <m:e>
+                        <m:r>
+                          <a:rPr lang="en-US" i="1">
+                            <a:latin typeface="Cambria Math" panose="02040503050406030204" pitchFamily="18" charset="0"/>
+                          </a:rPr>
+                          <m:t>𝑃</m:t>
+                        </m:r>
+                      </m:e>
+                      <m:sub>
+                        <m:r>
+                          <a:rPr lang="en-US" i="1">
+                            <a:latin typeface="Cambria Math" panose="02040503050406030204" pitchFamily="18" charset="0"/>
+                          </a:rPr>
+                          <m:t>12</m:t>
+                        </m:r>
+                      </m:sub>
+                    </m:sSub>
+                    <m:r>
+                      <a:rPr lang="en-US" i="1">
+                        <a:latin typeface="Cambria Math" panose="02040503050406030204" pitchFamily="18" charset="0"/>
+                      </a:rPr>
+                      <m:t>=</m:t>
+                    </m:r>
+                    <m:sSup>
+                      <m:sSupPr>
+                        <m:ctrlPr>
+                          <a:rPr lang="en-US" i="1">
+                            <a:latin typeface="Cambria Math" panose="02040503050406030204" pitchFamily="18" charset="0"/>
+                          </a:rPr>
+                        </m:ctrlPr>
+                      </m:sSupPr>
+                      <m:e>
+                        <m:r>
+                          <a:rPr lang="en-US" i="1">
+                            <a:latin typeface="Cambria Math" panose="02040503050406030204" pitchFamily="18" charset="0"/>
+                          </a:rPr>
+                          <m:t>𝑒</m:t>
+                        </m:r>
+                      </m:e>
+                      <m:sup>
+                        <m:r>
+                          <a:rPr lang="en-US" i="1">
+                            <a:latin typeface="Cambria Math" panose="02040503050406030204" pitchFamily="18" charset="0"/>
+                          </a:rPr>
+                          <m:t>−</m:t>
+                        </m:r>
+                        <m:d>
+                          <m:dPr>
+                            <m:ctrlPr>
+                              <a:rPr lang="en-US" i="1">
+                                <a:latin typeface="Cambria Math" panose="02040503050406030204" pitchFamily="18" charset="0"/>
+                              </a:rPr>
+                            </m:ctrlPr>
+                          </m:dPr>
+                          <m:e>
+                            <m:f>
+                              <m:fPr>
+                                <m:type m:val="skw"/>
+                                <m:ctrlPr>
+                                  <a:rPr lang="en-US" i="1">
+                                    <a:latin typeface="Cambria Math" panose="02040503050406030204" pitchFamily="18" charset="0"/>
+                                  </a:rPr>
+                                </m:ctrlPr>
+                              </m:fPr>
+                              <m:num>
+                                <m:sSub>
+                                  <m:sSubPr>
+                                    <m:ctrlPr>
+                                      <a:rPr lang="en-US" i="1">
+                                        <a:latin typeface="Cambria Math" panose="02040503050406030204" pitchFamily="18" charset="0"/>
+                                      </a:rPr>
+                                    </m:ctrlPr>
+                                  </m:sSubPr>
+                                  <m:e>
+                                    <m:r>
+                                      <a:rPr lang="en-US" i="1">
+                                        <a:latin typeface="Cambria Math" panose="02040503050406030204" pitchFamily="18" charset="0"/>
+                                      </a:rPr>
+                                      <m:t>𝐷</m:t>
+                                    </m:r>
+                                  </m:e>
+                                  <m:sub>
+                                    <m:r>
+                                      <a:rPr lang="en-US" i="1">
+                                        <a:latin typeface="Cambria Math" panose="02040503050406030204" pitchFamily="18" charset="0"/>
+                                      </a:rPr>
+                                      <m:t>12</m:t>
+                                    </m:r>
+                                  </m:sub>
+                                </m:sSub>
+                              </m:num>
+                              <m:den>
+                                <m:r>
+                                  <m:rPr>
+                                    <m:nor/>
+                                  </m:rPr>
+                                  <a:rPr lang="el-GR" dirty="0"/>
+                                  <m:t>λ</m:t>
+                                </m:r>
+                              </m:den>
+                            </m:f>
+                          </m:e>
+                        </m:d>
+                        <m:r>
+                          <a:rPr lang="en-US" i="1">
+                            <a:latin typeface="Cambria Math" panose="02040503050406030204" pitchFamily="18" charset="0"/>
+                          </a:rPr>
+                          <m:t>2</m:t>
+                        </m:r>
+                      </m:sup>
+                    </m:sSup>
+                  </m:oMath>
+                </a14:m>
+                <a:endParaRPr lang="en-US" dirty="0"/>
+              </a:p>
+            </p:txBody>
+          </p:sp>
+        </mc:Choice>
+        <mc:Fallback>
+          <p:sp>
+            <p:nvSpPr>
+              <p:cNvPr id="3" name="Content Placeholder 2">
+                <a:extLst>
+                  <a:ext uri="{FF2B5EF4-FFF2-40B4-BE49-F238E27FC236}">
+                    <a16:creationId xmlns:a16="http://schemas.microsoft.com/office/drawing/2014/main" xmlns="" xmlns:a14="http://schemas.microsoft.com/office/drawing/2010/main" id="{CEFBA1D3-8DC0-42EF-8053-6E8020733836}"/>
+                  </a:ext>
+                </a:extLst>
+              </p:cNvPr>
+              <p:cNvSpPr>
+                <a:spLocks noGrp="1" noRot="1" noChangeAspect="1" noMove="1" noResize="1" noEditPoints="1" noAdjustHandles="1" noChangeArrowheads="1" noChangeShapeType="1" noTextEdit="1"/>
+              </p:cNvSpPr>
+              <p:nvPr>
+                <p:ph idx="1"/>
+              </p:nvPr>
+            </p:nvSpPr>
+            <p:spPr>
+              <a:xfrm>
+                <a:off x="838200" y="1825625"/>
+                <a:ext cx="10515600" cy="1255326"/>
+              </a:xfrm>
+              <a:blipFill rotWithShape="0">
+                <a:blip r:embed="rId2"/>
+                <a:stretch>
+                  <a:fillRect l="-812" t="-6796"/>
+                </a:stretch>
+              </a:blipFill>
+            </p:spPr>
+            <p:txBody>
+              <a:bodyPr/>
+              <a:lstStyle/>
+              <a:p>
+                <a:r>
+                  <a:rPr lang="en-US">
+                    <a:noFill/>
+                  </a:rPr>
+                  <a:t> </a:t>
+                </a:r>
+              </a:p>
+            </p:txBody>
+          </p:sp>
+        </mc:Fallback>
+      </mc:AlternateContent>
+      <p:grpSp>
+        <p:nvGrpSpPr>
+          <p:cNvPr id="11" name="Group 10">
+            <a:extLst>
+              <a:ext uri="{FF2B5EF4-FFF2-40B4-BE49-F238E27FC236}">
+                <a16:creationId xmlns:a16="http://schemas.microsoft.com/office/drawing/2014/main" xmlns="" id="{C27BBC6F-3490-477E-8494-21469B69C214}"/>
+              </a:ext>
+            </a:extLst>
+          </p:cNvPr>
+          <p:cNvGrpSpPr/>
+          <p:nvPr/>
+        </p:nvGrpSpPr>
+        <p:grpSpPr>
+          <a:xfrm>
+            <a:off x="4999660" y="3215888"/>
+            <a:ext cx="6720563" cy="3272496"/>
+            <a:chOff x="167802" y="2659872"/>
+            <a:chExt cx="8838725" cy="4019952"/>
+          </a:xfrm>
+        </p:grpSpPr>
+        <p:pic>
+          <p:nvPicPr>
+            <p:cNvPr id="4" name="Picture 3">
+              <a:extLst>
+                <a:ext uri="{FF2B5EF4-FFF2-40B4-BE49-F238E27FC236}">
+                  <a16:creationId xmlns:a16="http://schemas.microsoft.com/office/drawing/2014/main" xmlns="" id="{2586738C-618A-4C35-98F4-DE8DD67C07DC}"/>
+                </a:ext>
+              </a:extLst>
+            </p:cNvPr>
+            <p:cNvPicPr>
+              <a:picLocks noChangeAspect="1"/>
+            </p:cNvPicPr>
+            <p:nvPr/>
+          </p:nvPicPr>
+          <p:blipFill>
+            <a:blip r:embed="rId3" cstate="print">
+              <a:extLst>
+                <a:ext uri="{28A0092B-C50C-407E-A947-70E740481C1C}">
+                  <a14:useLocalDpi xmlns:a14="http://schemas.microsoft.com/office/drawing/2010/main" val="0"/>
+                </a:ext>
+              </a:extLst>
+            </a:blip>
+            <a:stretch>
+              <a:fillRect/>
+            </a:stretch>
+          </p:blipFill>
+          <p:spPr>
+            <a:xfrm>
+              <a:off x="167802" y="2667787"/>
+              <a:ext cx="3009028" cy="4012037"/>
+            </a:xfrm>
+            <a:prstGeom prst="rect">
+              <a:avLst/>
+            </a:prstGeom>
+          </p:spPr>
+        </p:pic>
+        <p:pic>
+          <p:nvPicPr>
+            <p:cNvPr id="6" name="Picture 5">
+              <a:extLst>
+                <a:ext uri="{FF2B5EF4-FFF2-40B4-BE49-F238E27FC236}">
+                  <a16:creationId xmlns:a16="http://schemas.microsoft.com/office/drawing/2014/main" xmlns="" id="{6FDD1A8E-7A14-4A69-A89F-C48D23E58495}"/>
+                </a:ext>
+              </a:extLst>
+            </p:cNvPr>
+            <p:cNvPicPr>
+              <a:picLocks noChangeAspect="1"/>
+            </p:cNvPicPr>
+            <p:nvPr/>
+          </p:nvPicPr>
+          <p:blipFill>
+            <a:blip r:embed="rId4" cstate="print">
+              <a:extLst>
+                <a:ext uri="{28A0092B-C50C-407E-A947-70E740481C1C}">
+                  <a14:useLocalDpi xmlns:a14="http://schemas.microsoft.com/office/drawing/2010/main" val="0"/>
+                </a:ext>
+              </a:extLst>
+            </a:blip>
+            <a:stretch>
+              <a:fillRect/>
+            </a:stretch>
+          </p:blipFill>
+          <p:spPr>
+            <a:xfrm>
+              <a:off x="3124922" y="2667786"/>
+              <a:ext cx="3009028" cy="4012037"/>
+            </a:xfrm>
+            <a:prstGeom prst="rect">
+              <a:avLst/>
+            </a:prstGeom>
+          </p:spPr>
+        </p:pic>
+        <p:pic>
+          <p:nvPicPr>
+            <p:cNvPr id="8" name="Picture 7">
+              <a:extLst>
+                <a:ext uri="{FF2B5EF4-FFF2-40B4-BE49-F238E27FC236}">
+                  <a16:creationId xmlns:a16="http://schemas.microsoft.com/office/drawing/2014/main" xmlns="" id="{10EB060F-ED99-45D3-9BB2-BF5E00DF35DD}"/>
+                </a:ext>
+              </a:extLst>
+            </p:cNvPr>
+            <p:cNvPicPr>
+              <a:picLocks noChangeAspect="1"/>
+            </p:cNvPicPr>
+            <p:nvPr/>
+          </p:nvPicPr>
+          <p:blipFill>
+            <a:blip r:embed="rId5" cstate="print">
+              <a:extLst>
+                <a:ext uri="{28A0092B-C50C-407E-A947-70E740481C1C}">
+                  <a14:useLocalDpi xmlns:a14="http://schemas.microsoft.com/office/drawing/2010/main" val="0"/>
+                </a:ext>
+              </a:extLst>
+            </a:blip>
+            <a:stretch>
+              <a:fillRect/>
+            </a:stretch>
+          </p:blipFill>
+          <p:spPr>
+            <a:xfrm>
+              <a:off x="6082042" y="2659872"/>
+              <a:ext cx="2924485" cy="3955490"/>
+            </a:xfrm>
+            <a:prstGeom prst="rect">
+              <a:avLst/>
+            </a:prstGeom>
+          </p:spPr>
+        </p:pic>
+      </p:grpSp>
+      <p:pic>
+        <p:nvPicPr>
+          <p:cNvPr id="5" name="Picture 4"/>
+          <p:cNvPicPr>
+            <a:picLocks noChangeAspect="1"/>
+          </p:cNvPicPr>
+          <p:nvPr/>
+        </p:nvPicPr>
+        <p:blipFill rotWithShape="1">
+          <a:blip r:embed="rId6">
+            <a:extLst>
+              <a:ext uri="{28A0092B-C50C-407E-A947-70E740481C1C}">
+                <a14:useLocalDpi xmlns:a14="http://schemas.microsoft.com/office/drawing/2010/main" val="0"/>
+              </a:ext>
+            </a:extLst>
+          </a:blip>
+          <a:srcRect l="3272" r="5623"/>
+          <a:stretch/>
+        </p:blipFill>
+        <p:spPr>
+          <a:xfrm>
+            <a:off x="389905" y="3269240"/>
+            <a:ext cx="4349072" cy="3219144"/>
+          </a:xfrm>
+          <a:prstGeom prst="rect">
+            <a:avLst/>
+          </a:prstGeom>
+        </p:spPr>
+      </p:pic>
+    </p:spTree>
+    <p:extLst>
+      <p:ext uri="{BB962C8B-B14F-4D97-AF65-F5344CB8AC3E}">
+        <p14:creationId xmlns:p14="http://schemas.microsoft.com/office/powerpoint/2010/main" val="2915437618"/>
+      </p:ext>
+    </p:extLst>
+  </p:cSld>
+  <p:clrMapOvr>
+    <a:masterClrMapping/>
+  </p:clrMapOvr>
+</p:sld>
+</file>
+
+<file path=ppt/slides/slide12.xml><?xml version="1.0" encoding="utf-8"?>
+<p:sld xmlns:a="http://schemas.openxmlformats.org/drawingml/2006/main" xmlns:r="http://schemas.openxmlformats.org/officeDocument/2006/relationships" xmlns:p="http://schemas.openxmlformats.org/presentationml/2006/main">
+  <p:cSld>
+    <p:spTree>
+      <p:nvGrpSpPr>
+        <p:cNvPr id="1" name=""/>
+        <p:cNvGrpSpPr/>
+        <p:nvPr/>
+      </p:nvGrpSpPr>
+      <p:grpSpPr>
+        <a:xfrm>
+          <a:off x="0" y="0"/>
+          <a:ext cx="0" cy="0"/>
+          <a:chOff x="0" y="0"/>
+          <a:chExt cx="0" cy="0"/>
+        </a:xfrm>
+      </p:grpSpPr>
+      <p:sp>
+        <p:nvSpPr>
+          <p:cNvPr id="2" name="Title 1">
+            <a:extLst>
+              <a:ext uri="{FF2B5EF4-FFF2-40B4-BE49-F238E27FC236}">
+                <a16:creationId xmlns:a16="http://schemas.microsoft.com/office/drawing/2014/main" xmlns="" id="{62B12E8E-4104-45CA-BF80-CCAE1A31ACF7}"/>
+              </a:ext>
+            </a:extLst>
+          </p:cNvPr>
+          <p:cNvSpPr>
+            <a:spLocks noGrp="1"/>
+          </p:cNvSpPr>
+          <p:nvPr>
+            <p:ph type="title"/>
+          </p:nvPr>
+        </p:nvSpPr>
+        <p:spPr/>
+        <p:txBody>
+          <a:bodyPr/>
+          <a:lstStyle/>
+          <a:p>
+            <a:r>
+              <a:rPr lang="en-US" dirty="0"/>
+              <a:t>Neural connectivity</a:t>
+            </a:r>
+          </a:p>
+        </p:txBody>
+      </p:sp>
+      <p:sp>
+        <p:nvSpPr>
+          <p:cNvPr id="3" name="Content Placeholder 2">
+            <a:extLst>
+              <a:ext uri="{FF2B5EF4-FFF2-40B4-BE49-F238E27FC236}">
+                <a16:creationId xmlns:a16="http://schemas.microsoft.com/office/drawing/2014/main" xmlns="" id="{1ECC2F40-9D0A-4B2B-8EBC-6C6B50E3F5E7}"/>
+              </a:ext>
+            </a:extLst>
+          </p:cNvPr>
+          <p:cNvSpPr>
+            <a:spLocks noGrp="1"/>
+          </p:cNvSpPr>
+          <p:nvPr>
+            <p:ph idx="1"/>
+          </p:nvPr>
+        </p:nvSpPr>
+        <p:spPr>
+          <a:xfrm>
+            <a:off x="838199" y="1825625"/>
+            <a:ext cx="10892481" cy="4351338"/>
+          </a:xfrm>
+        </p:spPr>
+        <p:txBody>
+          <a:bodyPr/>
+          <a:lstStyle/>
+          <a:p>
+            <a:r>
+              <a:rPr lang="en-US" dirty="0"/>
+              <a:t>Original LSM paper (Maas 2002) found best performance for </a:t>
+            </a:r>
+            <a:r>
+              <a:rPr lang="el-GR" dirty="0"/>
+              <a:t>λ</a:t>
+            </a:r>
+            <a:r>
+              <a:rPr lang="en-US" dirty="0"/>
+              <a:t>=2</a:t>
+            </a:r>
+          </a:p>
+          <a:p>
+            <a:r>
+              <a:rPr lang="en-US" dirty="0"/>
+              <a:t>This work will explore how spatial organization </a:t>
+            </a:r>
+            <a:r>
+              <a:rPr lang="en-US" dirty="0" smtClean="0"/>
+              <a:t>and connectivity of </a:t>
+            </a:r>
+            <a:r>
+              <a:rPr lang="en-US" dirty="0"/>
+              <a:t>the columns effect performance</a:t>
+            </a:r>
+          </a:p>
+          <a:p>
+            <a:endParaRPr lang="en-US" dirty="0"/>
+          </a:p>
+        </p:txBody>
+      </p:sp>
+      <p:pic>
+        <p:nvPicPr>
+          <p:cNvPr id="16" name="Picture 15">
+            <a:extLst>
+              <a:ext uri="{FF2B5EF4-FFF2-40B4-BE49-F238E27FC236}">
+                <a16:creationId xmlns:a16="http://schemas.microsoft.com/office/drawing/2014/main" xmlns="" id="{5927E8A9-79EC-4192-BA10-E750069FCBEA}"/>
+              </a:ext>
+            </a:extLst>
+          </p:cNvPr>
+          <p:cNvPicPr>
+            <a:picLocks noChangeAspect="1"/>
+          </p:cNvPicPr>
+          <p:nvPr/>
+        </p:nvPicPr>
+        <p:blipFill rotWithShape="1">
+          <a:blip r:embed="rId2"/>
+          <a:srcRect l="40816" t="17845" r="42368" b="54604"/>
+          <a:stretch/>
+        </p:blipFill>
+        <p:spPr>
+          <a:xfrm>
+            <a:off x="3672710" y="3374382"/>
+            <a:ext cx="3192244" cy="2802581"/>
+          </a:xfrm>
+          <a:prstGeom prst="rect">
+            <a:avLst/>
+          </a:prstGeom>
+        </p:spPr>
+      </p:pic>
+      <p:sp>
+        <p:nvSpPr>
+          <p:cNvPr id="5" name="TextBox 4">
+            <a:extLst>
+              <a:ext uri="{FF2B5EF4-FFF2-40B4-BE49-F238E27FC236}">
+                <a16:creationId xmlns:a16="http://schemas.microsoft.com/office/drawing/2014/main" xmlns="" id="{51B686F4-A933-4AB7-89BE-72C1BCE4F7F0}"/>
+              </a:ext>
+            </a:extLst>
+          </p:cNvPr>
+          <p:cNvSpPr txBox="1"/>
+          <p:nvPr/>
+        </p:nvSpPr>
+        <p:spPr>
+          <a:xfrm>
+            <a:off x="2268812" y="6173400"/>
+            <a:ext cx="6512150" cy="276999"/>
+          </a:xfrm>
+          <a:prstGeom prst="rect">
+            <a:avLst/>
+          </a:prstGeom>
+          <a:noFill/>
+        </p:spPr>
+        <p:txBody>
+          <a:bodyPr wrap="square" rtlCol="0">
+            <a:spAutoFit/>
+          </a:bodyPr>
+          <a:lstStyle/>
+          <a:p>
+            <a:r>
+              <a:rPr lang="en-US" sz="1200" b="1" i="1" dirty="0" smtClean="0"/>
+              <a:t>The liquid neural network performed best with a mix of local and global connectivity (Maas 2002)</a:t>
+            </a:r>
+            <a:endParaRPr lang="en-US" sz="1200" b="1" i="1" dirty="0"/>
+          </a:p>
+        </p:txBody>
+      </p:sp>
+    </p:spTree>
+    <p:extLst>
+      <p:ext uri="{BB962C8B-B14F-4D97-AF65-F5344CB8AC3E}">
+        <p14:creationId xmlns:p14="http://schemas.microsoft.com/office/powerpoint/2010/main" val="2125980966"/>
+      </p:ext>
+    </p:extLst>
+  </p:cSld>
+  <p:clrMapOvr>
+    <a:masterClrMapping/>
+  </p:clrMapOvr>
+</p:sld>
+</file>
+
+<file path=ppt/slides/slide13.xml><?xml version="1.0" encoding="utf-8"?>
+<p:sld xmlns:a="http://schemas.openxmlformats.org/drawingml/2006/main" xmlns:r="http://schemas.openxmlformats.org/officeDocument/2006/relationships" xmlns:p="http://schemas.openxmlformats.org/presentationml/2006/main">
+  <p:cSld>
+    <p:spTree>
+      <p:nvGrpSpPr>
+        <p:cNvPr id="1" name=""/>
+        <p:cNvGrpSpPr/>
+        <p:nvPr/>
+      </p:nvGrpSpPr>
+      <p:grpSpPr>
+        <a:xfrm>
+          <a:off x="0" y="0"/>
+          <a:ext cx="0" cy="0"/>
+          <a:chOff x="0" y="0"/>
+          <a:chExt cx="0" cy="0"/>
+        </a:xfrm>
+      </p:grpSpPr>
+      <p:sp>
+        <p:nvSpPr>
+          <p:cNvPr id="2" name="Title 1">
+            <a:extLst>
+              <a:ext uri="{FF2B5EF4-FFF2-40B4-BE49-F238E27FC236}">
+                <a16:creationId xmlns:a16="http://schemas.microsoft.com/office/drawing/2014/main" xmlns="" id="{03536115-048F-4F60-B353-3AEE9BB69F11}"/>
+              </a:ext>
+            </a:extLst>
+          </p:cNvPr>
+          <p:cNvSpPr>
+            <a:spLocks noGrp="1"/>
+          </p:cNvSpPr>
+          <p:nvPr>
+            <p:ph type="title"/>
+          </p:nvPr>
+        </p:nvSpPr>
+        <p:spPr/>
+        <p:txBody>
+          <a:bodyPr/>
+          <a:lstStyle/>
+          <a:p>
+            <a:r>
+              <a:rPr lang="en-US" dirty="0"/>
+              <a:t>Neural models</a:t>
+            </a:r>
+          </a:p>
+        </p:txBody>
+      </p:sp>
+      <p:sp>
+        <p:nvSpPr>
+          <p:cNvPr id="3" name="Content Placeholder 2">
+            <a:extLst>
+              <a:ext uri="{FF2B5EF4-FFF2-40B4-BE49-F238E27FC236}">
+                <a16:creationId xmlns:a16="http://schemas.microsoft.com/office/drawing/2014/main" xmlns="" id="{C16B18B1-8E66-4478-AF65-BE72EA7F4CBD}"/>
+              </a:ext>
+            </a:extLst>
+          </p:cNvPr>
+          <p:cNvSpPr>
+            <a:spLocks noGrp="1"/>
+          </p:cNvSpPr>
+          <p:nvPr>
+            <p:ph idx="1"/>
+          </p:nvPr>
+        </p:nvSpPr>
+        <p:spPr>
+          <a:xfrm>
+            <a:off x="838200" y="1610941"/>
+            <a:ext cx="10515600" cy="4351338"/>
+          </a:xfrm>
+        </p:spPr>
+        <p:txBody>
+          <a:bodyPr/>
+          <a:lstStyle/>
+          <a:p>
+            <a:r>
+              <a:rPr lang="en-US" dirty="0" smtClean="0"/>
+              <a:t>Original LSM set all propagation delays to 1.5 </a:t>
+            </a:r>
+            <a:r>
+              <a:rPr lang="en-US" dirty="0" err="1" smtClean="0"/>
+              <a:t>ms</a:t>
+            </a:r>
+            <a:r>
+              <a:rPr lang="en-US" dirty="0" smtClean="0"/>
+              <a:t> regardless of position</a:t>
+            </a:r>
+          </a:p>
+          <a:p>
+            <a:r>
+              <a:rPr lang="en-US" dirty="0" smtClean="0"/>
+              <a:t>We extended </a:t>
+            </a:r>
+            <a:r>
+              <a:rPr lang="en-US" dirty="0"/>
+              <a:t>Izhikevich simulation to include propagation delay</a:t>
+            </a:r>
+          </a:p>
+          <a:p>
+            <a:r>
+              <a:rPr lang="en-US" dirty="0"/>
+              <a:t>Our model retains basic behavior of the Izhikevich model</a:t>
+            </a:r>
+          </a:p>
+        </p:txBody>
+      </p:sp>
+      <p:pic>
+        <p:nvPicPr>
+          <p:cNvPr id="5" name="Picture 4">
+            <a:extLst>
+              <a:ext uri="{FF2B5EF4-FFF2-40B4-BE49-F238E27FC236}">
+                <a16:creationId xmlns:a16="http://schemas.microsoft.com/office/drawing/2014/main" xmlns="" id="{B1A82E9A-EA27-40E8-AD4F-BFB478797B41}"/>
+              </a:ext>
+            </a:extLst>
+          </p:cNvPr>
+          <p:cNvPicPr>
+            <a:picLocks noChangeAspect="1"/>
+          </p:cNvPicPr>
+          <p:nvPr/>
+        </p:nvPicPr>
+        <p:blipFill>
+          <a:blip r:embed="rId2">
+            <a:extLst>
+              <a:ext uri="{28A0092B-C50C-407E-A947-70E740481C1C}">
+                <a14:useLocalDpi xmlns:a14="http://schemas.microsoft.com/office/drawing/2010/main" val="0"/>
+              </a:ext>
+            </a:extLst>
+          </a:blip>
+          <a:stretch>
+            <a:fillRect/>
+          </a:stretch>
+        </p:blipFill>
+        <p:spPr>
+          <a:xfrm>
+            <a:off x="5425292" y="3005422"/>
+            <a:ext cx="3899939" cy="3037910"/>
+          </a:xfrm>
+          <a:prstGeom prst="rect">
+            <a:avLst/>
+          </a:prstGeom>
+        </p:spPr>
+      </p:pic>
+      <p:pic>
+        <p:nvPicPr>
+          <p:cNvPr id="7" name="Picture 6">
+            <a:extLst>
+              <a:ext uri="{FF2B5EF4-FFF2-40B4-BE49-F238E27FC236}">
+                <a16:creationId xmlns:a16="http://schemas.microsoft.com/office/drawing/2014/main" xmlns="" id="{CC26EFDE-91EF-41FB-8EEE-22A802F51C21}"/>
+              </a:ext>
+            </a:extLst>
+          </p:cNvPr>
+          <p:cNvPicPr>
+            <a:picLocks noChangeAspect="1"/>
+          </p:cNvPicPr>
+          <p:nvPr/>
+        </p:nvPicPr>
+        <p:blipFill>
+          <a:blip r:embed="rId3">
+            <a:extLst>
+              <a:ext uri="{28A0092B-C50C-407E-A947-70E740481C1C}">
+                <a14:useLocalDpi xmlns:a14="http://schemas.microsoft.com/office/drawing/2010/main" val="0"/>
+              </a:ext>
+            </a:extLst>
+          </a:blip>
+          <a:stretch>
+            <a:fillRect/>
+          </a:stretch>
+        </p:blipFill>
+        <p:spPr>
+          <a:xfrm>
+            <a:off x="1567416" y="3005422"/>
+            <a:ext cx="3887218" cy="3037910"/>
+          </a:xfrm>
+          <a:prstGeom prst="rect">
+            <a:avLst/>
+          </a:prstGeom>
+        </p:spPr>
+      </p:pic>
+      <p:sp>
+        <p:nvSpPr>
+          <p:cNvPr id="8" name="TextBox 7">
+            <a:extLst>
+              <a:ext uri="{FF2B5EF4-FFF2-40B4-BE49-F238E27FC236}">
+                <a16:creationId xmlns:a16="http://schemas.microsoft.com/office/drawing/2014/main" xmlns="" id="{51B686F4-A933-4AB7-89BE-72C1BCE4F7F0}"/>
+              </a:ext>
+            </a:extLst>
+          </p:cNvPr>
+          <p:cNvSpPr txBox="1"/>
+          <p:nvPr/>
+        </p:nvSpPr>
+        <p:spPr>
+          <a:xfrm>
+            <a:off x="1338509" y="6067405"/>
+            <a:ext cx="8534399" cy="461665"/>
+          </a:xfrm>
+          <a:prstGeom prst="rect">
+            <a:avLst/>
+          </a:prstGeom>
+          <a:noFill/>
+        </p:spPr>
+        <p:txBody>
+          <a:bodyPr wrap="square" rtlCol="0">
+            <a:spAutoFit/>
+          </a:bodyPr>
+          <a:lstStyle/>
+          <a:p>
+            <a:r>
+              <a:rPr lang="en-US" sz="1200" b="1" i="1" dirty="0"/>
+              <a:t>The original Izhikevich model (left) and our extended model with random delays (right) both show synchronization in response to randomized “thalamic” input (Izhikevich 2003, https://www.izhikevich.org/publications/spikes.htm)</a:t>
+            </a:r>
+          </a:p>
+        </p:txBody>
+      </p:sp>
+    </p:spTree>
+    <p:extLst>
+      <p:ext uri="{BB962C8B-B14F-4D97-AF65-F5344CB8AC3E}">
+        <p14:creationId xmlns:p14="http://schemas.microsoft.com/office/powerpoint/2010/main" val="1492137427"/>
+      </p:ext>
+    </p:extLst>
+  </p:cSld>
+  <p:clrMapOvr>
+    <a:masterClrMapping/>
+  </p:clrMapOvr>
+</p:sld>
+</file>
+
+<file path=ppt/slides/slide14.xml><?xml version="1.0" encoding="utf-8"?>
+<p:sld xmlns:a="http://schemas.openxmlformats.org/drawingml/2006/main" xmlns:r="http://schemas.openxmlformats.org/officeDocument/2006/relationships" xmlns:p="http://schemas.openxmlformats.org/presentationml/2006/main">
+  <p:cSld>
+    <p:spTree>
+      <p:nvGrpSpPr>
+        <p:cNvPr id="1" name=""/>
+        <p:cNvGrpSpPr/>
+        <p:nvPr/>
+      </p:nvGrpSpPr>
+      <p:grpSpPr>
+        <a:xfrm>
+          <a:off x="0" y="0"/>
+          <a:ext cx="0" cy="0"/>
+          <a:chOff x="0" y="0"/>
+          <a:chExt cx="0" cy="0"/>
+        </a:xfrm>
+      </p:grpSpPr>
+      <p:sp>
+        <p:nvSpPr>
+          <p:cNvPr id="2" name="Title 1">
+            <a:extLst>
+              <a:ext uri="{FF2B5EF4-FFF2-40B4-BE49-F238E27FC236}">
                 <a16:creationId xmlns:a16="http://schemas.microsoft.com/office/drawing/2014/main" xmlns="" id="{77757203-94A7-4004-A2A3-B20DFB274FDA}"/>
               </a:ext>
             </a:extLst>
@@ -3496,15 +4469,21 @@
             <p:ph type="title"/>
           </p:nvPr>
         </p:nvSpPr>
-        <p:spPr/>
-        <p:txBody>
-          <a:bodyPr/>
-          <a:lstStyle/>
-          <a:p>
-            <a:r>
-              <a:rPr lang="en-US" dirty="0"/>
-              <a:t>Column simulation</a:t>
-            </a:r>
+        <p:spPr>
+          <a:xfrm>
+            <a:off x="838200" y="365125"/>
+            <a:ext cx="8210384" cy="1325563"/>
+          </a:xfrm>
+        </p:spPr>
+        <p:txBody>
+          <a:bodyPr/>
+          <a:lstStyle/>
+          <a:p>
+            <a:r>
+              <a:rPr lang="en-US" dirty="0" smtClean="0"/>
+              <a:t>Delay-induced synchronization</a:t>
+            </a:r>
+            <a:endParaRPr lang="en-US" dirty="0"/>
           </a:p>
         </p:txBody>
       </p:sp>
@@ -3535,14 +4514,12 @@
           <a:lstStyle/>
           <a:p>
             <a:r>
+              <a:rPr lang="en-US" dirty="0" smtClean="0"/>
+              <a:t>Stimulated </a:t>
+            </a:r>
+            <a:r>
               <a:rPr lang="en-US" dirty="0"/>
-              <a:t>Created column models similar to Maas</a:t>
-            </a:r>
-          </a:p>
-          <a:p>
-            <a:r>
-              <a:rPr lang="en-US" dirty="0"/>
-              <a:t>Stimulated neurons in bottom 25% with random background, observed wavelike propagation up the column</a:t>
+              <a:t>neurons in bottom 25% with random background, observed wavelike propagation up the column</a:t>
             </a:r>
           </a:p>
           <a:p>
@@ -3619,7 +4596,7 @@
         </p:blipFill>
         <p:spPr>
           <a:xfrm>
-            <a:off x="762966" y="3850814"/>
+            <a:off x="755276" y="3531531"/>
             <a:ext cx="3103548" cy="2780369"/>
           </a:xfrm>
           <a:prstGeom prst="rect">
@@ -3641,8 +4618,8 @@
         </p:nvSpPr>
         <p:spPr>
           <a:xfrm>
-            <a:off x="3677043" y="4325028"/>
-            <a:ext cx="4173616" cy="276999"/>
+            <a:off x="3726470" y="4001294"/>
+            <a:ext cx="4622399" cy="276999"/>
           </a:xfrm>
           <a:prstGeom prst="rect">
             <a:avLst/>
@@ -3656,7 +4633,7 @@
           <a:lstStyle/>
           <a:p>
             <a:r>
-              <a:rPr lang="en-US" sz="1200" dirty="0"/>
+              <a:rPr lang="en-US" sz="1200" b="1" i="1" dirty="0"/>
               <a:t>Column with random propagation delays, no synchronized firing</a:t>
             </a:r>
           </a:p>
@@ -3676,7 +4653,7 @@
         </p:nvSpPr>
         <p:spPr>
           <a:xfrm>
-            <a:off x="3726471" y="5630238"/>
+            <a:off x="3751262" y="5304235"/>
             <a:ext cx="3654632" cy="461665"/>
           </a:xfrm>
           <a:prstGeom prst="rect">
@@ -3691,7 +4668,7 @@
           <a:lstStyle/>
           <a:p>
             <a:r>
-              <a:rPr lang="en-US" sz="1200" dirty="0"/>
+              <a:rPr lang="en-US" sz="1200" b="1" i="1" dirty="0"/>
               <a:t>Identical column with distance-dependent delays, we see synchronized firing that propagates up the column</a:t>
             </a:r>
           </a:p>
@@ -3845,7 +4822,7 @@
 </p:sld>
 </file>
 
-<file path=ppt/slides/slide11.xml><?xml version="1.0" encoding="utf-8"?>
+<file path=ppt/slides/slide15.xml><?xml version="1.0" encoding="utf-8"?>
 <p:sld xmlns:a="http://schemas.openxmlformats.org/drawingml/2006/main" xmlns:r="http://schemas.openxmlformats.org/officeDocument/2006/relationships" xmlns:p="http://schemas.openxmlformats.org/presentationml/2006/main">
   <p:cSld>
     <p:spTree>
@@ -3884,82 +4861,77 @@
           <a:lstStyle/>
           <a:p>
             <a:r>
+              <a:rPr lang="en-US" dirty="0" smtClean="0"/>
+              <a:t>Propagation velocity</a:t>
+            </a:r>
+            <a:endParaRPr lang="en-US" dirty="0"/>
+          </a:p>
+        </p:txBody>
+      </p:sp>
+      <p:sp>
+        <p:nvSpPr>
+          <p:cNvPr id="3" name="Content Placeholder 2">
+            <a:extLst>
+              <a:ext uri="{FF2B5EF4-FFF2-40B4-BE49-F238E27FC236}">
+                <a16:creationId xmlns:a16="http://schemas.microsoft.com/office/drawing/2014/main" xmlns="" id="{2574168F-51F4-49A4-B7B6-FCFC156CD676}"/>
+              </a:ext>
+            </a:extLst>
+          </p:cNvPr>
+          <p:cNvSpPr>
+            <a:spLocks noGrp="1"/>
+          </p:cNvSpPr>
+          <p:nvPr>
+            <p:ph idx="1"/>
+          </p:nvPr>
+        </p:nvSpPr>
+        <p:spPr>
+          <a:xfrm>
+            <a:off x="838200" y="1825625"/>
+            <a:ext cx="10436750" cy="1760413"/>
+          </a:xfrm>
+        </p:spPr>
+        <p:txBody>
+          <a:bodyPr>
+            <a:normAutofit fontScale="92500" lnSpcReduction="10000"/>
+          </a:bodyPr>
+          <a:lstStyle/>
+          <a:p>
+            <a:r>
+              <a:rPr lang="en-US" dirty="0" smtClean="0"/>
+              <a:t>Propagating waves in neural circuits have been proposed as a mechanism for neural synchronization (Keane and Gong)</a:t>
+            </a:r>
+          </a:p>
+          <a:p>
+            <a:r>
+              <a:rPr lang="en-US" dirty="0" smtClean="0"/>
+              <a:t>Neural </a:t>
+            </a:r>
+            <a:r>
               <a:rPr lang="en-US" dirty="0"/>
-              <a:t>Other results</a:t>
-            </a:r>
-          </a:p>
-        </p:txBody>
-      </p:sp>
-      <p:sp>
-        <p:nvSpPr>
-          <p:cNvPr id="3" name="Content Placeholder 2">
-            <a:extLst>
-              <a:ext uri="{FF2B5EF4-FFF2-40B4-BE49-F238E27FC236}">
-                <a16:creationId xmlns:a16="http://schemas.microsoft.com/office/drawing/2014/main" xmlns="" id="{2574168F-51F4-49A4-B7B6-FCFC156CD676}"/>
-              </a:ext>
-            </a:extLst>
-          </p:cNvPr>
-          <p:cNvSpPr>
-            <a:spLocks noGrp="1"/>
-          </p:cNvSpPr>
-          <p:nvPr>
-            <p:ph idx="1"/>
-          </p:nvPr>
-        </p:nvSpPr>
-        <p:spPr/>
-        <p:txBody>
-          <a:bodyPr/>
-          <a:lstStyle/>
-          <a:p>
-            <a:r>
-              <a:rPr lang="en-US" dirty="0"/>
-              <a:t>Neural column width affects effective propagation velocity</a:t>
-            </a:r>
-          </a:p>
-          <a:p>
-            <a:r>
-              <a:rPr lang="en-US" dirty="0"/>
-              <a:t>Liquid state distance increases with input spike train distance</a:t>
-            </a:r>
-          </a:p>
-        </p:txBody>
-      </p:sp>
-      <p:pic>
-        <p:nvPicPr>
-          <p:cNvPr id="6" name="Picture 5">
-            <a:extLst>
-              <a:ext uri="{FF2B5EF4-FFF2-40B4-BE49-F238E27FC236}">
-                <a16:creationId xmlns:a16="http://schemas.microsoft.com/office/drawing/2014/main" xmlns="" id="{A1F7AC49-2C48-402C-B878-35AD5F1C88E8}"/>
-              </a:ext>
-            </a:extLst>
-          </p:cNvPr>
-          <p:cNvPicPr>
-            <a:picLocks noChangeAspect="1"/>
-          </p:cNvPicPr>
-          <p:nvPr/>
-        </p:nvPicPr>
-        <p:blipFill>
-          <a:blip r:embed="rId2">
-            <a:extLst>
-              <a:ext uri="{28A0092B-C50C-407E-A947-70E740481C1C}">
-                <a14:useLocalDpi xmlns:a14="http://schemas.microsoft.com/office/drawing/2010/main" val="0"/>
-              </a:ext>
-            </a:extLst>
-          </a:blip>
-          <a:stretch>
-            <a:fillRect/>
-          </a:stretch>
-        </p:blipFill>
-        <p:spPr>
-          <a:xfrm>
-            <a:off x="5677534" y="3244373"/>
-            <a:ext cx="4265535" cy="3204303"/>
-          </a:xfrm>
-          <a:prstGeom prst="rect">
-            <a:avLst/>
-          </a:prstGeom>
-        </p:spPr>
-      </p:pic>
+              <a:t>column width affects effective propagation </a:t>
+            </a:r>
+            <a:r>
+              <a:rPr lang="en-US" dirty="0" smtClean="0"/>
+              <a:t>speed</a:t>
+            </a:r>
+          </a:p>
+          <a:p>
+            <a:r>
+              <a:rPr lang="en-US" dirty="0" smtClean="0"/>
+              <a:t>Our group (J. </a:t>
+            </a:r>
+            <a:r>
+              <a:rPr lang="en-US" dirty="0" err="1" smtClean="0"/>
+              <a:t>Tumulty</a:t>
+            </a:r>
+            <a:r>
+              <a:rPr lang="en-US" dirty="0" smtClean="0"/>
+              <a:t>) has shown interesting synchronization phases in realistic neural networks with artificially slow propagation</a:t>
+            </a:r>
+            <a:endParaRPr lang="en-US" dirty="0" smtClean="0"/>
+          </a:p>
+        </p:txBody>
+      </p:sp>
       <p:pic>
         <p:nvPicPr>
           <p:cNvPr id="4" name="Picture 3"/>
@@ -3969,7 +4941,7 @@
           <p:nvPr/>
         </p:nvPicPr>
         <p:blipFill rotWithShape="1">
-          <a:blip r:embed="rId3">
+          <a:blip r:embed="rId2">
             <a:extLst>
               <a:ext uri="{28A0092B-C50C-407E-A947-70E740481C1C}">
                 <a14:useLocalDpi xmlns:a14="http://schemas.microsoft.com/office/drawing/2010/main" val="0"/>
@@ -3981,18 +4953,680 @@
         </p:blipFill>
         <p:spPr>
           <a:xfrm>
-            <a:off x="1166444" y="3244373"/>
-            <a:ext cx="3986002" cy="3323404"/>
+            <a:off x="6000838" y="3720975"/>
+            <a:ext cx="3206774" cy="2673708"/>
           </a:xfrm>
           <a:prstGeom prst="rect">
             <a:avLst/>
           </a:prstGeom>
         </p:spPr>
       </p:pic>
+      <p:pic>
+        <p:nvPicPr>
+          <p:cNvPr id="8" name="Picture 7"/>
+          <p:cNvPicPr>
+            <a:picLocks noChangeAspect="1"/>
+          </p:cNvPicPr>
+          <p:nvPr/>
+        </p:nvPicPr>
+        <p:blipFill>
+          <a:blip r:embed="rId3"/>
+          <a:stretch>
+            <a:fillRect/>
+          </a:stretch>
+        </p:blipFill>
+        <p:spPr>
+          <a:xfrm>
+            <a:off x="1696330" y="3888326"/>
+            <a:ext cx="2287274" cy="2286599"/>
+          </a:xfrm>
+          <a:prstGeom prst="rect">
+            <a:avLst/>
+          </a:prstGeom>
+        </p:spPr>
+      </p:pic>
+      <p:sp>
+        <p:nvSpPr>
+          <p:cNvPr id="9" name="TextBox 8"/>
+          <p:cNvSpPr txBox="1"/>
+          <p:nvPr/>
+        </p:nvSpPr>
+        <p:spPr>
+          <a:xfrm>
+            <a:off x="1481644" y="6229942"/>
+            <a:ext cx="3010844" cy="461665"/>
+          </a:xfrm>
+          <a:prstGeom prst="rect">
+            <a:avLst/>
+          </a:prstGeom>
+          <a:noFill/>
+        </p:spPr>
+        <p:txBody>
+          <a:bodyPr wrap="square" rtlCol="0">
+            <a:spAutoFit/>
+          </a:bodyPr>
+          <a:lstStyle/>
+          <a:p>
+            <a:r>
+              <a:rPr lang="en-US" sz="1200" b="1" i="1" dirty="0" smtClean="0"/>
+              <a:t>Waves in a two-dimensional neural network (Keane and Gong)</a:t>
+            </a:r>
+            <a:endParaRPr lang="en-US" sz="1200" b="1" i="1" dirty="0"/>
+          </a:p>
+        </p:txBody>
+      </p:sp>
+      <p:sp>
+        <p:nvSpPr>
+          <p:cNvPr id="10" name="TextBox 9"/>
+          <p:cNvSpPr txBox="1"/>
+          <p:nvPr/>
+        </p:nvSpPr>
+        <p:spPr>
+          <a:xfrm>
+            <a:off x="5880955" y="6376006"/>
+            <a:ext cx="4153591" cy="276999"/>
+          </a:xfrm>
+          <a:prstGeom prst="rect">
+            <a:avLst/>
+          </a:prstGeom>
+          <a:noFill/>
+        </p:spPr>
+        <p:txBody>
+          <a:bodyPr wrap="square" rtlCol="0">
+            <a:spAutoFit/>
+          </a:bodyPr>
+          <a:lstStyle/>
+          <a:p>
+            <a:r>
+              <a:rPr lang="en-US" sz="1200" b="1" i="1" dirty="0" smtClean="0"/>
+              <a:t>Thinner columns exhibit slower effective propagation speed</a:t>
+            </a:r>
+            <a:endParaRPr lang="en-US" sz="1200" b="1" i="1" dirty="0"/>
+          </a:p>
+        </p:txBody>
+      </p:sp>
     </p:spTree>
     <p:extLst>
       <p:ext uri="{BB962C8B-B14F-4D97-AF65-F5344CB8AC3E}">
         <p14:creationId xmlns:p14="http://schemas.microsoft.com/office/powerpoint/2010/main" val="1397563622"/>
+      </p:ext>
+    </p:extLst>
+  </p:cSld>
+  <p:clrMapOvr>
+    <a:masterClrMapping/>
+  </p:clrMapOvr>
+</p:sld>
+</file>
+
+<file path=ppt/slides/slide16.xml><?xml version="1.0" encoding="utf-8"?>
+<p:sld xmlns:a="http://schemas.openxmlformats.org/drawingml/2006/main" xmlns:r="http://schemas.openxmlformats.org/officeDocument/2006/relationships" xmlns:p="http://schemas.openxmlformats.org/presentationml/2006/main">
+  <p:cSld>
+    <p:spTree>
+      <p:nvGrpSpPr>
+        <p:cNvPr id="1" name=""/>
+        <p:cNvGrpSpPr/>
+        <p:nvPr/>
+      </p:nvGrpSpPr>
+      <p:grpSpPr>
+        <a:xfrm>
+          <a:off x="0" y="0"/>
+          <a:ext cx="0" cy="0"/>
+          <a:chOff x="0" y="0"/>
+          <a:chExt cx="0" cy="0"/>
+        </a:xfrm>
+      </p:grpSpPr>
+      <p:sp>
+        <p:nvSpPr>
+          <p:cNvPr id="2" name="Title 1"/>
+          <p:cNvSpPr>
+            <a:spLocks noGrp="1"/>
+          </p:cNvSpPr>
+          <p:nvPr>
+            <p:ph type="title"/>
+          </p:nvPr>
+        </p:nvSpPr>
+        <p:spPr/>
+        <p:txBody>
+          <a:bodyPr/>
+          <a:lstStyle/>
+          <a:p>
+            <a:r>
+              <a:rPr lang="en-US" dirty="0" smtClean="0"/>
+              <a:t>Distance metrics</a:t>
+            </a:r>
+            <a:endParaRPr lang="en-US" dirty="0"/>
+          </a:p>
+        </p:txBody>
+      </p:sp>
+      <p:sp>
+        <p:nvSpPr>
+          <p:cNvPr id="3" name="Content Placeholder 2"/>
+          <p:cNvSpPr>
+            <a:spLocks noGrp="1"/>
+          </p:cNvSpPr>
+          <p:nvPr>
+            <p:ph idx="1"/>
+          </p:nvPr>
+        </p:nvSpPr>
+        <p:spPr/>
+        <p:txBody>
+          <a:bodyPr/>
+          <a:lstStyle/>
+          <a:p>
+            <a:r>
+              <a:rPr lang="en-US" dirty="0" smtClean="0"/>
+              <a:t>Input distance vs. liquid state distance</a:t>
+            </a:r>
+            <a:endParaRPr lang="en-US" dirty="0"/>
+          </a:p>
+        </p:txBody>
+      </p:sp>
+      <p:pic>
+        <p:nvPicPr>
+          <p:cNvPr id="4" name="Picture 3"/>
+          <p:cNvPicPr>
+            <a:picLocks noChangeAspect="1"/>
+          </p:cNvPicPr>
+          <p:nvPr/>
+        </p:nvPicPr>
+        <p:blipFill>
+          <a:blip r:embed="rId2">
+            <a:extLst>
+              <a:ext uri="{28A0092B-C50C-407E-A947-70E740481C1C}">
+                <a14:useLocalDpi xmlns:a14="http://schemas.microsoft.com/office/drawing/2010/main" val="0"/>
+              </a:ext>
+            </a:extLst>
+          </a:blip>
+          <a:stretch>
+            <a:fillRect/>
+          </a:stretch>
+        </p:blipFill>
+        <p:spPr>
+          <a:xfrm>
+            <a:off x="6342719" y="2711823"/>
+            <a:ext cx="4718571" cy="3538929"/>
+          </a:xfrm>
+          <a:prstGeom prst="rect">
+            <a:avLst/>
+          </a:prstGeom>
+        </p:spPr>
+      </p:pic>
+      <p:pic>
+        <p:nvPicPr>
+          <p:cNvPr id="5" name="Picture 4"/>
+          <p:cNvPicPr>
+            <a:picLocks noChangeAspect="1"/>
+          </p:cNvPicPr>
+          <p:nvPr/>
+        </p:nvPicPr>
+        <p:blipFill>
+          <a:blip r:embed="rId3">
+            <a:extLst>
+              <a:ext uri="{28A0092B-C50C-407E-A947-70E740481C1C}">
+                <a14:useLocalDpi xmlns:a14="http://schemas.microsoft.com/office/drawing/2010/main" val="0"/>
+              </a:ext>
+            </a:extLst>
+          </a:blip>
+          <a:stretch>
+            <a:fillRect/>
+          </a:stretch>
+        </p:blipFill>
+        <p:spPr>
+          <a:xfrm>
+            <a:off x="769905" y="2743199"/>
+            <a:ext cx="4676737" cy="3507553"/>
+          </a:xfrm>
+          <a:prstGeom prst="rect">
+            <a:avLst/>
+          </a:prstGeom>
+        </p:spPr>
+      </p:pic>
+      <p:sp>
+        <p:nvSpPr>
+          <p:cNvPr id="6" name="TextBox 5"/>
+          <p:cNvSpPr txBox="1"/>
+          <p:nvPr/>
+        </p:nvSpPr>
+        <p:spPr>
+          <a:xfrm>
+            <a:off x="1389341" y="3019950"/>
+            <a:ext cx="458780" cy="369332"/>
+          </a:xfrm>
+          <a:prstGeom prst="rect">
+            <a:avLst/>
+          </a:prstGeom>
+          <a:solidFill>
+            <a:schemeClr val="bg1"/>
+          </a:solidFill>
+        </p:spPr>
+        <p:txBody>
+          <a:bodyPr wrap="none" rtlCol="0">
+            <a:spAutoFit/>
+          </a:bodyPr>
+          <a:lstStyle/>
+          <a:p>
+            <a:r>
+              <a:rPr lang="en-US" dirty="0" smtClean="0"/>
+              <a:t>(A)</a:t>
+            </a:r>
+            <a:endParaRPr lang="en-US" dirty="0"/>
+          </a:p>
+        </p:txBody>
+      </p:sp>
+      <p:sp>
+        <p:nvSpPr>
+          <p:cNvPr id="7" name="TextBox 6"/>
+          <p:cNvSpPr txBox="1"/>
+          <p:nvPr/>
+        </p:nvSpPr>
+        <p:spPr>
+          <a:xfrm>
+            <a:off x="1389341" y="4645297"/>
+            <a:ext cx="450764" cy="369332"/>
+          </a:xfrm>
+          <a:prstGeom prst="rect">
+            <a:avLst/>
+          </a:prstGeom>
+          <a:solidFill>
+            <a:schemeClr val="bg1"/>
+          </a:solidFill>
+        </p:spPr>
+        <p:txBody>
+          <a:bodyPr wrap="none" rtlCol="0">
+            <a:spAutoFit/>
+          </a:bodyPr>
+          <a:lstStyle/>
+          <a:p>
+            <a:r>
+              <a:rPr lang="en-US" dirty="0" smtClean="0"/>
+              <a:t>(B)</a:t>
+            </a:r>
+            <a:endParaRPr lang="en-US" dirty="0"/>
+          </a:p>
+        </p:txBody>
+      </p:sp>
+      <p:sp>
+        <p:nvSpPr>
+          <p:cNvPr id="8" name="TextBox 7"/>
+          <p:cNvSpPr txBox="1"/>
+          <p:nvPr/>
+        </p:nvSpPr>
+        <p:spPr>
+          <a:xfrm>
+            <a:off x="1389341" y="6223560"/>
+            <a:ext cx="3139064" cy="276999"/>
+          </a:xfrm>
+          <a:prstGeom prst="rect">
+            <a:avLst/>
+          </a:prstGeom>
+          <a:noFill/>
+        </p:spPr>
+        <p:txBody>
+          <a:bodyPr wrap="none" rtlCol="0">
+            <a:spAutoFit/>
+          </a:bodyPr>
+          <a:lstStyle/>
+          <a:p>
+            <a:r>
+              <a:rPr lang="en-US" sz="1200" b="1" i="1" dirty="0" smtClean="0"/>
+              <a:t>Typical stimulus (A) and reservoir response (B)</a:t>
+            </a:r>
+            <a:endParaRPr lang="en-US" sz="1200" b="1" i="1" dirty="0"/>
+          </a:p>
+        </p:txBody>
+      </p:sp>
+      <p:sp>
+        <p:nvSpPr>
+          <p:cNvPr id="9" name="TextBox 8"/>
+          <p:cNvSpPr txBox="1"/>
+          <p:nvPr/>
+        </p:nvSpPr>
+        <p:spPr>
+          <a:xfrm>
+            <a:off x="6096000" y="6311900"/>
+            <a:ext cx="5300016" cy="276999"/>
+          </a:xfrm>
+          <a:prstGeom prst="rect">
+            <a:avLst/>
+          </a:prstGeom>
+          <a:noFill/>
+        </p:spPr>
+        <p:txBody>
+          <a:bodyPr wrap="square" rtlCol="0">
+            <a:spAutoFit/>
+          </a:bodyPr>
+          <a:lstStyle/>
+          <a:p>
+            <a:r>
+              <a:rPr lang="en-US" sz="1200" b="1" i="1" dirty="0" smtClean="0"/>
+              <a:t>The distance between the input spike trains is reflected in the reservoir response</a:t>
+            </a:r>
+            <a:endParaRPr lang="en-US" sz="1200" b="1" i="1" dirty="0"/>
+          </a:p>
+        </p:txBody>
+      </p:sp>
+    </p:spTree>
+    <p:extLst>
+      <p:ext uri="{BB962C8B-B14F-4D97-AF65-F5344CB8AC3E}">
+        <p14:creationId xmlns:p14="http://schemas.microsoft.com/office/powerpoint/2010/main" val="171772195"/>
+      </p:ext>
+    </p:extLst>
+  </p:cSld>
+  <p:clrMapOvr>
+    <a:masterClrMapping/>
+  </p:clrMapOvr>
+</p:sld>
+</file>
+
+<file path=ppt/slides/slide17.xml><?xml version="1.0" encoding="utf-8"?>
+<p:sld xmlns:a="http://schemas.openxmlformats.org/drawingml/2006/main" xmlns:r="http://schemas.openxmlformats.org/officeDocument/2006/relationships" xmlns:p="http://schemas.openxmlformats.org/presentationml/2006/main">
+  <p:cSld>
+    <p:spTree>
+      <p:nvGrpSpPr>
+        <p:cNvPr id="1" name=""/>
+        <p:cNvGrpSpPr/>
+        <p:nvPr/>
+      </p:nvGrpSpPr>
+      <p:grpSpPr>
+        <a:xfrm>
+          <a:off x="0" y="0"/>
+          <a:ext cx="0" cy="0"/>
+          <a:chOff x="0" y="0"/>
+          <a:chExt cx="0" cy="0"/>
+        </a:xfrm>
+      </p:grpSpPr>
+      <p:sp>
+        <p:nvSpPr>
+          <p:cNvPr id="2" name="Title 1">
+            <a:extLst>
+              <a:ext uri="{FF2B5EF4-FFF2-40B4-BE49-F238E27FC236}">
+                <a16:creationId xmlns:a16="http://schemas.microsoft.com/office/drawing/2014/main" xmlns="" id="{DD49139E-AFFE-46F8-B928-3AB424E80F71}"/>
+              </a:ext>
+            </a:extLst>
+          </p:cNvPr>
+          <p:cNvSpPr>
+            <a:spLocks noGrp="1"/>
+          </p:cNvSpPr>
+          <p:nvPr>
+            <p:ph type="title"/>
+          </p:nvPr>
+        </p:nvSpPr>
+        <p:spPr/>
+        <p:txBody>
+          <a:bodyPr/>
+          <a:lstStyle/>
+          <a:p>
+            <a:r>
+              <a:rPr lang="en-US" dirty="0" smtClean="0"/>
+              <a:t>Directions for future research</a:t>
+            </a:r>
+            <a:endParaRPr lang="en-US" dirty="0"/>
+          </a:p>
+        </p:txBody>
+      </p:sp>
+      <p:sp>
+        <p:nvSpPr>
+          <p:cNvPr id="3" name="Text Placeholder 2">
+            <a:extLst>
+              <a:ext uri="{FF2B5EF4-FFF2-40B4-BE49-F238E27FC236}">
+                <a16:creationId xmlns:a16="http://schemas.microsoft.com/office/drawing/2014/main" xmlns="" id="{E1DC7A49-D55C-4745-A092-1B3307C9D230}"/>
+              </a:ext>
+            </a:extLst>
+          </p:cNvPr>
+          <p:cNvSpPr>
+            <a:spLocks noGrp="1"/>
+          </p:cNvSpPr>
+          <p:nvPr>
+            <p:ph type="body" idx="1"/>
+          </p:nvPr>
+        </p:nvSpPr>
+        <p:spPr/>
+        <p:txBody>
+          <a:bodyPr/>
+          <a:lstStyle/>
+          <a:p>
+            <a:endParaRPr lang="en-US"/>
+          </a:p>
+        </p:txBody>
+      </p:sp>
+    </p:spTree>
+    <p:extLst>
+      <p:ext uri="{BB962C8B-B14F-4D97-AF65-F5344CB8AC3E}">
+        <p14:creationId xmlns:p14="http://schemas.microsoft.com/office/powerpoint/2010/main" val="3529120404"/>
+      </p:ext>
+    </p:extLst>
+  </p:cSld>
+  <p:clrMapOvr>
+    <a:masterClrMapping/>
+  </p:clrMapOvr>
+</p:sld>
+</file>
+
+<file path=ppt/slides/slide18.xml><?xml version="1.0" encoding="utf-8"?>
+<p:sld xmlns:a="http://schemas.openxmlformats.org/drawingml/2006/main" xmlns:r="http://schemas.openxmlformats.org/officeDocument/2006/relationships" xmlns:p="http://schemas.openxmlformats.org/presentationml/2006/main">
+  <p:cSld>
+    <p:spTree>
+      <p:nvGrpSpPr>
+        <p:cNvPr id="1" name=""/>
+        <p:cNvGrpSpPr/>
+        <p:nvPr/>
+      </p:nvGrpSpPr>
+      <p:grpSpPr>
+        <a:xfrm>
+          <a:off x="0" y="0"/>
+          <a:ext cx="0" cy="0"/>
+          <a:chOff x="0" y="0"/>
+          <a:chExt cx="0" cy="0"/>
+        </a:xfrm>
+      </p:grpSpPr>
+      <p:sp>
+        <p:nvSpPr>
+          <p:cNvPr id="2" name="Title 1"/>
+          <p:cNvSpPr>
+            <a:spLocks noGrp="1"/>
+          </p:cNvSpPr>
+          <p:nvPr>
+            <p:ph type="title"/>
+          </p:nvPr>
+        </p:nvSpPr>
+        <p:spPr/>
+        <p:txBody>
+          <a:bodyPr/>
+          <a:lstStyle/>
+          <a:p>
+            <a:r>
+              <a:rPr lang="en-US" dirty="0" smtClean="0"/>
+              <a:t>Further work</a:t>
+            </a:r>
+            <a:endParaRPr lang="en-US" dirty="0"/>
+          </a:p>
+        </p:txBody>
+      </p:sp>
+      <p:sp>
+        <p:nvSpPr>
+          <p:cNvPr id="3" name="Content Placeholder 2"/>
+          <p:cNvSpPr>
+            <a:spLocks noGrp="1"/>
+          </p:cNvSpPr>
+          <p:nvPr>
+            <p:ph idx="1"/>
+          </p:nvPr>
+        </p:nvSpPr>
+        <p:spPr/>
+        <p:txBody>
+          <a:bodyPr/>
+          <a:lstStyle/>
+          <a:p>
+            <a:r>
+              <a:rPr lang="en-US" dirty="0" smtClean="0"/>
+              <a:t>LSM classifier based on current column model</a:t>
+            </a:r>
+          </a:p>
+          <a:p>
+            <a:pPr lvl="1"/>
+            <a:r>
+              <a:rPr lang="en-US" dirty="0" smtClean="0"/>
+              <a:t>Speech classifier based on TI46 speech corpus</a:t>
+            </a:r>
+          </a:p>
+          <a:p>
+            <a:pPr lvl="1"/>
+            <a:r>
+              <a:rPr lang="en-US" dirty="0" smtClean="0"/>
+              <a:t>Commercial data sets</a:t>
+            </a:r>
+          </a:p>
+          <a:p>
+            <a:r>
+              <a:rPr lang="en-US" dirty="0" smtClean="0"/>
+              <a:t>Further dynamics investigations</a:t>
+            </a:r>
+          </a:p>
+          <a:p>
+            <a:pPr lvl="1"/>
+            <a:r>
+              <a:rPr lang="en-US" dirty="0" smtClean="0"/>
+              <a:t>Neuron dynamics, especially delayed firing near a bifurcation for slow propagation</a:t>
+            </a:r>
+          </a:p>
+          <a:p>
+            <a:pPr lvl="1"/>
+            <a:r>
+              <a:rPr lang="en-US" dirty="0" smtClean="0"/>
+              <a:t>Spatial organization effect, especially </a:t>
+            </a:r>
+            <a:r>
+              <a:rPr lang="en-US" dirty="0" err="1" smtClean="0"/>
+              <a:t>microcolumn</a:t>
+            </a:r>
+            <a:r>
+              <a:rPr lang="en-US" dirty="0" smtClean="0"/>
+              <a:t> structures</a:t>
+            </a:r>
+          </a:p>
+          <a:p>
+            <a:r>
+              <a:rPr lang="en-US" dirty="0" smtClean="0"/>
+              <a:t>Highly realistic simulation</a:t>
+            </a:r>
+          </a:p>
+          <a:p>
+            <a:pPr lvl="1"/>
+            <a:r>
+              <a:rPr lang="en-US" dirty="0" smtClean="0"/>
+              <a:t>NEURON simulator with validated biological parameters</a:t>
+            </a:r>
+          </a:p>
+          <a:p>
+            <a:r>
+              <a:rPr lang="en-US" dirty="0" smtClean="0"/>
+              <a:t>Efficient hardware implementation of LSM</a:t>
+            </a:r>
+          </a:p>
+          <a:p>
+            <a:pPr lvl="1"/>
+            <a:r>
+              <a:rPr lang="en-US" dirty="0" smtClean="0"/>
+              <a:t>Concepts for application-specific integrated circuits</a:t>
+            </a:r>
+          </a:p>
+          <a:p>
+            <a:pPr lvl="1"/>
+            <a:r>
+              <a:rPr lang="en-US" dirty="0" smtClean="0"/>
+              <a:t>Photonic implementation (</a:t>
+            </a:r>
+            <a:r>
+              <a:rPr lang="en-US" dirty="0" err="1" smtClean="0"/>
+              <a:t>Prucnal</a:t>
+            </a:r>
+            <a:r>
+              <a:rPr lang="en-US" dirty="0" smtClean="0"/>
+              <a:t> group at Princeton)</a:t>
+            </a:r>
+          </a:p>
+          <a:p>
+            <a:pPr lvl="1"/>
+            <a:endParaRPr lang="en-US" dirty="0"/>
+          </a:p>
+        </p:txBody>
+      </p:sp>
+    </p:spTree>
+    <p:extLst>
+      <p:ext uri="{BB962C8B-B14F-4D97-AF65-F5344CB8AC3E}">
+        <p14:creationId xmlns:p14="http://schemas.microsoft.com/office/powerpoint/2010/main" val="3030734017"/>
+      </p:ext>
+    </p:extLst>
+  </p:cSld>
+  <p:clrMapOvr>
+    <a:masterClrMapping/>
+  </p:clrMapOvr>
+</p:sld>
+</file>
+
+<file path=ppt/slides/slide19.xml><?xml version="1.0" encoding="utf-8"?>
+<p:sld xmlns:a="http://schemas.openxmlformats.org/drawingml/2006/main" xmlns:r="http://schemas.openxmlformats.org/officeDocument/2006/relationships" xmlns:p="http://schemas.openxmlformats.org/presentationml/2006/main">
+  <p:cSld>
+    <p:spTree>
+      <p:nvGrpSpPr>
+        <p:cNvPr id="1" name=""/>
+        <p:cNvGrpSpPr/>
+        <p:nvPr/>
+      </p:nvGrpSpPr>
+      <p:grpSpPr>
+        <a:xfrm>
+          <a:off x="0" y="0"/>
+          <a:ext cx="0" cy="0"/>
+          <a:chOff x="0" y="0"/>
+          <a:chExt cx="0" cy="0"/>
+        </a:xfrm>
+      </p:grpSpPr>
+      <p:sp>
+        <p:nvSpPr>
+          <p:cNvPr id="2" name="Title 1"/>
+          <p:cNvSpPr>
+            <a:spLocks noGrp="1"/>
+          </p:cNvSpPr>
+          <p:nvPr>
+            <p:ph type="title"/>
+          </p:nvPr>
+        </p:nvSpPr>
+        <p:spPr/>
+        <p:txBody>
+          <a:bodyPr/>
+          <a:lstStyle/>
+          <a:p>
+            <a:r>
+              <a:rPr lang="en-US" dirty="0" smtClean="0"/>
+              <a:t>References</a:t>
+            </a:r>
+            <a:endParaRPr lang="en-US" dirty="0"/>
+          </a:p>
+        </p:txBody>
+      </p:sp>
+      <p:sp>
+        <p:nvSpPr>
+          <p:cNvPr id="3" name="Content Placeholder 2"/>
+          <p:cNvSpPr>
+            <a:spLocks noGrp="1"/>
+          </p:cNvSpPr>
+          <p:nvPr>
+            <p:ph idx="1"/>
+          </p:nvPr>
+        </p:nvSpPr>
+        <p:spPr/>
+        <p:txBody>
+          <a:bodyPr/>
+          <a:lstStyle/>
+          <a:p>
+            <a:endParaRPr lang="en-US"/>
+          </a:p>
+        </p:txBody>
+      </p:sp>
+    </p:spTree>
+    <p:extLst>
+      <p:ext uri="{BB962C8B-B14F-4D97-AF65-F5344CB8AC3E}">
+        <p14:creationId xmlns:p14="http://schemas.microsoft.com/office/powerpoint/2010/main" val="3178639159"/>
       </p:ext>
     </p:extLst>
   </p:cSld>
@@ -4131,13 +5765,7 @@
       </p:grpSpPr>
       <p:sp>
         <p:nvSpPr>
-          <p:cNvPr id="2" name="Title 1">
-            <a:extLst>
-              <a:ext uri="{FF2B5EF4-FFF2-40B4-BE49-F238E27FC236}">
-                <a16:creationId xmlns:a16="http://schemas.microsoft.com/office/drawing/2014/main" xmlns="" id="{E26B021A-EED9-436A-A0DE-2465435F540B}"/>
-              </a:ext>
-            </a:extLst>
-          </p:cNvPr>
+          <p:cNvPr id="2" name="Title 1"/>
           <p:cNvSpPr>
             <a:spLocks noGrp="1"/>
           </p:cNvSpPr>
@@ -4151,21 +5779,16 @@
           <a:lstStyle/>
           <a:p>
             <a:r>
-              <a:rPr lang="en-US" dirty="0"/>
-              <a:t>Liquid State Machines</a:t>
-            </a:r>
-          </a:p>
-        </p:txBody>
-      </p:sp>
-      <p:sp>
-        <p:nvSpPr>
-          <p:cNvPr id="3" name="Content Placeholder 2">
-            <a:extLst>
-              <a:ext uri="{FF2B5EF4-FFF2-40B4-BE49-F238E27FC236}">
-                <a16:creationId xmlns:a16="http://schemas.microsoft.com/office/drawing/2014/main" xmlns="" id="{A12394C0-40B2-4333-8604-D0F03675FDF1}"/>
-              </a:ext>
-            </a:extLst>
-          </p:cNvPr>
+              <a:rPr lang="en-US" dirty="0" smtClean="0"/>
+              <a:t>Impact</a:t>
+            </a:r>
+            <a:endParaRPr lang="en-US" dirty="0"/>
+          </a:p>
+        </p:txBody>
+      </p:sp>
+      <p:sp>
+        <p:nvSpPr>
+          <p:cNvPr id="3" name="Content Placeholder 2"/>
           <p:cNvSpPr>
             <a:spLocks noGrp="1"/>
           </p:cNvSpPr>
@@ -4173,113 +5796,72 @@
             <p:ph idx="1"/>
           </p:nvPr>
         </p:nvSpPr>
-        <p:spPr>
-          <a:xfrm>
-            <a:off x="838200" y="1748623"/>
-            <a:ext cx="10515600" cy="4351338"/>
-          </a:xfrm>
-        </p:spPr>
-        <p:txBody>
-          <a:bodyPr/>
-          <a:lstStyle/>
-          <a:p>
-            <a:r>
-              <a:rPr lang="en-US" dirty="0"/>
-              <a:t>Nonlinear “liquid” with fading memory is driven by an input</a:t>
-            </a:r>
-          </a:p>
-          <a:p>
-            <a:r>
-              <a:rPr lang="en-US" dirty="0"/>
-              <a:t>The input evokes complex dynamics in the liquid</a:t>
-            </a:r>
-          </a:p>
-          <a:p>
-            <a:r>
-              <a:rPr lang="en-US" dirty="0"/>
-              <a:t>A linear readout map extracts the desired data from the liquid</a:t>
-            </a:r>
-          </a:p>
-          <a:p>
-            <a:r>
-              <a:rPr lang="en-US" dirty="0"/>
-              <a:t>Multiple readouts can be trained with simple regression to extract different information from the same untrained liquid</a:t>
-            </a:r>
-          </a:p>
-        </p:txBody>
-      </p:sp>
-      <p:pic>
-        <p:nvPicPr>
-          <p:cNvPr id="4" name="Picture 3">
-            <a:extLst>
-              <a:ext uri="{FF2B5EF4-FFF2-40B4-BE49-F238E27FC236}">
-                <a16:creationId xmlns:a16="http://schemas.microsoft.com/office/drawing/2014/main" xmlns="" id="{CF740A40-3F2D-48AF-906D-7DB8DD6458B1}"/>
-              </a:ext>
-            </a:extLst>
-          </p:cNvPr>
-          <p:cNvPicPr>
-            <a:picLocks noChangeAspect="1"/>
-          </p:cNvPicPr>
-          <p:nvPr/>
-        </p:nvPicPr>
-        <p:blipFill rotWithShape="1">
-          <a:blip r:embed="rId2"/>
-          <a:srcRect l="26132" t="12688" r="25632" b="62707"/>
-          <a:stretch/>
-        </p:blipFill>
-        <p:spPr>
-          <a:xfrm>
-            <a:off x="1395663" y="3971340"/>
-            <a:ext cx="8797491" cy="2404552"/>
-          </a:xfrm>
-          <a:prstGeom prst="rect">
-            <a:avLst/>
-          </a:prstGeom>
-        </p:spPr>
-      </p:pic>
-      <p:sp>
-        <p:nvSpPr>
-          <p:cNvPr id="5" name="TextBox 4">
-            <a:extLst>
-              <a:ext uri="{FF2B5EF4-FFF2-40B4-BE49-F238E27FC236}">
-                <a16:creationId xmlns:a16="http://schemas.microsoft.com/office/drawing/2014/main" xmlns="" id="{4D37DA81-C6A4-44FC-A631-E3C82791D1B6}"/>
-              </a:ext>
-            </a:extLst>
-          </p:cNvPr>
-          <p:cNvSpPr txBox="1"/>
-          <p:nvPr/>
-        </p:nvSpPr>
-        <p:spPr>
-          <a:xfrm>
-            <a:off x="4018787" y="6142820"/>
-            <a:ext cx="2929392" cy="369332"/>
-          </a:xfrm>
-          <a:prstGeom prst="rect">
-            <a:avLst/>
-          </a:prstGeom>
-          <a:noFill/>
-        </p:spPr>
-        <p:txBody>
-          <a:bodyPr wrap="none" rtlCol="0">
-            <a:spAutoFit/>
-          </a:bodyPr>
-          <a:lstStyle/>
-          <a:p>
-            <a:r>
-              <a:rPr lang="en-US" dirty="0" err="1"/>
-              <a:t>Lukosevicius</a:t>
-            </a:r>
-            <a:r>
-              <a:rPr lang="en-US" dirty="0"/>
-              <a:t> and Jaeger 2009</a:t>
-            </a:r>
+        <p:spPr/>
+        <p:txBody>
+          <a:bodyPr/>
+          <a:lstStyle/>
+          <a:p>
+            <a:r>
+              <a:rPr lang="en-US" dirty="0" smtClean="0"/>
+              <a:t>Deeper understanding of biological neural circuits</a:t>
+            </a:r>
+          </a:p>
+          <a:p>
+            <a:pPr lvl="1"/>
+            <a:r>
+              <a:rPr lang="en-US" dirty="0" smtClean="0"/>
+              <a:t>Creates new measures of computational </a:t>
+            </a:r>
+            <a:r>
+              <a:rPr lang="en-US" dirty="0" smtClean="0"/>
+              <a:t>capability for biological networks</a:t>
+            </a:r>
+            <a:endParaRPr lang="en-US" dirty="0" smtClean="0"/>
+          </a:p>
+          <a:p>
+            <a:pPr lvl="1"/>
+            <a:r>
+              <a:rPr lang="en-US" dirty="0" smtClean="0"/>
+              <a:t>Biologically plausible adaptation mechanisms</a:t>
+            </a:r>
+          </a:p>
+          <a:p>
+            <a:pPr lvl="1"/>
+            <a:r>
+              <a:rPr lang="en-US" dirty="0" smtClean="0"/>
+              <a:t>New understanding of the role of neural dynamics in cognition</a:t>
+            </a:r>
+          </a:p>
+          <a:p>
+            <a:r>
+              <a:rPr lang="en-US" dirty="0" smtClean="0"/>
+              <a:t>Improved liquid state machines for machine learning</a:t>
+            </a:r>
+          </a:p>
+          <a:p>
+            <a:pPr lvl="1"/>
+            <a:r>
+              <a:rPr lang="en-US" dirty="0" smtClean="0"/>
+              <a:t>Improved computational properties inspired by biological neuron dynamics</a:t>
+            </a:r>
+          </a:p>
+          <a:p>
+            <a:pPr lvl="1"/>
+            <a:r>
+              <a:rPr lang="en-US" dirty="0" smtClean="0"/>
+              <a:t>Fast implementation on application-specific hardware</a:t>
+            </a:r>
+          </a:p>
+          <a:p>
+            <a:pPr lvl="1"/>
+            <a:endParaRPr lang="en-US" dirty="0"/>
           </a:p>
         </p:txBody>
       </p:sp>
     </p:spTree>
     <p:extLst>
       <p:ext uri="{BB962C8B-B14F-4D97-AF65-F5344CB8AC3E}">
-        <p14:creationId xmlns:p14="http://schemas.microsoft.com/office/powerpoint/2010/main" val="1741913845"/>
+        <p14:creationId xmlns:p14="http://schemas.microsoft.com/office/powerpoint/2010/main" val="3782515186"/>
       </p:ext>
     </p:extLst>
   </p:cSld>
@@ -4311,7 +5893,7 @@
           <p:cNvPr id="2" name="Title 1">
             <a:extLst>
               <a:ext uri="{FF2B5EF4-FFF2-40B4-BE49-F238E27FC236}">
-                <a16:creationId xmlns:a16="http://schemas.microsoft.com/office/drawing/2014/main" xmlns="" id="{287C7871-7EAB-498D-A07B-8A690D612FDD}"/>
+                <a16:creationId xmlns:a16="http://schemas.microsoft.com/office/drawing/2014/main" xmlns="" id="{E26B021A-EED9-436A-A0DE-2465435F540B}"/>
               </a:ext>
             </a:extLst>
           </p:cNvPr>
@@ -4329,7 +5911,7 @@
           <a:p>
             <a:r>
               <a:rPr lang="en-US" dirty="0"/>
-              <a:t>Fading memory</a:t>
+              <a:t>Liquid State Machines</a:t>
             </a:r>
           </a:p>
         </p:txBody>
@@ -4339,7 +5921,7 @@
           <p:cNvPr id="3" name="Content Placeholder 2">
             <a:extLst>
               <a:ext uri="{FF2B5EF4-FFF2-40B4-BE49-F238E27FC236}">
-                <a16:creationId xmlns:a16="http://schemas.microsoft.com/office/drawing/2014/main" xmlns="" id="{5F6D47C8-A8A0-4D56-87C4-965976FE8911}"/>
+                <a16:creationId xmlns:a16="http://schemas.microsoft.com/office/drawing/2014/main" xmlns="" id="{A12394C0-40B2-4333-8604-D0F03675FDF1}"/>
               </a:ext>
             </a:extLst>
           </p:cNvPr>
@@ -4352,8 +5934,8 @@
         </p:nvSpPr>
         <p:spPr>
           <a:xfrm>
-            <a:off x="838199" y="1825625"/>
-            <a:ext cx="9879227" cy="2070872"/>
+            <a:off x="838200" y="1748623"/>
+            <a:ext cx="10515600" cy="4351338"/>
           </a:xfrm>
         </p:spPr>
         <p:txBody>
@@ -4362,29 +5944,64 @@
           <a:p>
             <a:r>
               <a:rPr lang="en-US" dirty="0"/>
-              <a:t>Maas et al showed that a reservoir with fading memory retains information about time history in its dynamic state</a:t>
+              <a:t>Nonlinear “liquid” with fading memory is driven by an input</a:t>
             </a:r>
           </a:p>
           <a:p>
             <a:r>
               <a:rPr lang="en-US" dirty="0"/>
-              <a:t>LSM was able to classify all 4 segments in a 1 second sequence based only on the liquid state at t=1 second</a:t>
-            </a:r>
-          </a:p>
-          <a:p>
-            <a:endParaRPr lang="en-US" dirty="0"/>
-          </a:p>
-          <a:p>
-            <a:endParaRPr lang="en-US" dirty="0"/>
-          </a:p>
-        </p:txBody>
-      </p:sp>
+              <a:t>The input evokes complex dynamics in the liquid</a:t>
+            </a:r>
+          </a:p>
+          <a:p>
+            <a:r>
+              <a:rPr lang="en-US" dirty="0"/>
+              <a:t>A linear readout map extracts the desired data from the liquid</a:t>
+            </a:r>
+          </a:p>
+          <a:p>
+            <a:r>
+              <a:rPr lang="en-US" dirty="0"/>
+              <a:t>Multiple readouts can be trained with simple regression to extract different information from the same untrained liquid</a:t>
+            </a:r>
+          </a:p>
+        </p:txBody>
+      </p:sp>
+      <p:pic>
+        <p:nvPicPr>
+          <p:cNvPr id="4" name="Picture 3">
+            <a:extLst>
+              <a:ext uri="{FF2B5EF4-FFF2-40B4-BE49-F238E27FC236}">
+                <a16:creationId xmlns:a16="http://schemas.microsoft.com/office/drawing/2014/main" xmlns="" id="{CF740A40-3F2D-48AF-906D-7DB8DD6458B1}"/>
+              </a:ext>
+            </a:extLst>
+          </p:cNvPr>
+          <p:cNvPicPr>
+            <a:picLocks noChangeAspect="1"/>
+          </p:cNvPicPr>
+          <p:nvPr/>
+        </p:nvPicPr>
+        <p:blipFill rotWithShape="1">
+          <a:blip r:embed="rId2"/>
+          <a:srcRect l="26132" t="12688" r="25632" b="62707"/>
+          <a:stretch/>
+        </p:blipFill>
+        <p:spPr>
+          <a:xfrm>
+            <a:off x="1395663" y="3971340"/>
+            <a:ext cx="8797491" cy="2404552"/>
+          </a:xfrm>
+          <a:prstGeom prst="rect">
+            <a:avLst/>
+          </a:prstGeom>
+        </p:spPr>
+      </p:pic>
       <p:sp>
         <p:nvSpPr>
           <p:cNvPr id="5" name="TextBox 4">
             <a:extLst>
               <a:ext uri="{FF2B5EF4-FFF2-40B4-BE49-F238E27FC236}">
-                <a16:creationId xmlns:a16="http://schemas.microsoft.com/office/drawing/2014/main" xmlns="" id="{502CC89A-7DB2-4E47-9A57-AF20541BECFA}"/>
+                <a16:creationId xmlns:a16="http://schemas.microsoft.com/office/drawing/2014/main" xmlns="" id="{4D37DA81-C6A4-44FC-A631-E3C82791D1B6}"/>
               </a:ext>
             </a:extLst>
           </p:cNvPr>
@@ -4393,8 +6010,8 @@
         </p:nvSpPr>
         <p:spPr>
           <a:xfrm>
-            <a:off x="1969916" y="6192833"/>
-            <a:ext cx="7161375" cy="461665"/>
+            <a:off x="4018787" y="6142820"/>
+            <a:ext cx="2929392" cy="369332"/>
           </a:xfrm>
           <a:prstGeom prst="rect">
             <a:avLst/>
@@ -4402,44 +6019,186 @@
           <a:noFill/>
         </p:spPr>
         <p:txBody>
+          <a:bodyPr wrap="none" rtlCol="0">
+            <a:spAutoFit/>
+          </a:bodyPr>
+          <a:lstStyle/>
+          <a:p>
+            <a:r>
+              <a:rPr lang="en-US" dirty="0" err="1"/>
+              <a:t>Lukosevicius</a:t>
+            </a:r>
+            <a:r>
+              <a:rPr lang="en-US" dirty="0"/>
+              <a:t> and Jaeger 2009</a:t>
+            </a:r>
+          </a:p>
+        </p:txBody>
+      </p:sp>
+    </p:spTree>
+    <p:extLst>
+      <p:ext uri="{BB962C8B-B14F-4D97-AF65-F5344CB8AC3E}">
+        <p14:creationId xmlns:p14="http://schemas.microsoft.com/office/powerpoint/2010/main" val="1741913845"/>
+      </p:ext>
+    </p:extLst>
+  </p:cSld>
+  <p:clrMapOvr>
+    <a:masterClrMapping/>
+  </p:clrMapOvr>
+</p:sld>
+</file>
+
+<file path=ppt/slides/slide5.xml><?xml version="1.0" encoding="utf-8"?>
+<p:sld xmlns:a="http://schemas.openxmlformats.org/drawingml/2006/main" xmlns:r="http://schemas.openxmlformats.org/officeDocument/2006/relationships" xmlns:p="http://schemas.openxmlformats.org/presentationml/2006/main">
+  <p:cSld>
+    <p:spTree>
+      <p:nvGrpSpPr>
+        <p:cNvPr id="1" name=""/>
+        <p:cNvGrpSpPr/>
+        <p:nvPr/>
+      </p:nvGrpSpPr>
+      <p:grpSpPr>
+        <a:xfrm>
+          <a:off x="0" y="0"/>
+          <a:ext cx="0" cy="0"/>
+          <a:chOff x="0" y="0"/>
+          <a:chExt cx="0" cy="0"/>
+        </a:xfrm>
+      </p:grpSpPr>
+      <p:sp>
+        <p:nvSpPr>
+          <p:cNvPr id="2" name="Title 1">
+            <a:extLst>
+              <a:ext uri="{FF2B5EF4-FFF2-40B4-BE49-F238E27FC236}">
+                <a16:creationId xmlns:a16="http://schemas.microsoft.com/office/drawing/2014/main" xmlns="" id="{287C7871-7EAB-498D-A07B-8A690D612FDD}"/>
+              </a:ext>
+            </a:extLst>
+          </p:cNvPr>
+          <p:cNvSpPr>
+            <a:spLocks noGrp="1"/>
+          </p:cNvSpPr>
+          <p:nvPr>
+            <p:ph type="title"/>
+          </p:nvPr>
+        </p:nvSpPr>
+        <p:spPr/>
+        <p:txBody>
+          <a:bodyPr/>
+          <a:lstStyle/>
+          <a:p>
+            <a:r>
+              <a:rPr lang="en-US" dirty="0"/>
+              <a:t>Fading memory</a:t>
+            </a:r>
+          </a:p>
+        </p:txBody>
+      </p:sp>
+      <p:sp>
+        <p:nvSpPr>
+          <p:cNvPr id="3" name="Content Placeholder 2">
+            <a:extLst>
+              <a:ext uri="{FF2B5EF4-FFF2-40B4-BE49-F238E27FC236}">
+                <a16:creationId xmlns:a16="http://schemas.microsoft.com/office/drawing/2014/main" xmlns="" id="{5F6D47C8-A8A0-4D56-87C4-965976FE8911}"/>
+              </a:ext>
+            </a:extLst>
+          </p:cNvPr>
+          <p:cNvSpPr>
+            <a:spLocks noGrp="1"/>
+          </p:cNvSpPr>
+          <p:nvPr>
+            <p:ph idx="1"/>
+          </p:nvPr>
+        </p:nvSpPr>
+        <p:spPr>
+          <a:xfrm>
+            <a:off x="838199" y="1825625"/>
+            <a:ext cx="9879227" cy="2070872"/>
+          </a:xfrm>
+        </p:spPr>
+        <p:txBody>
+          <a:bodyPr/>
+          <a:lstStyle/>
+          <a:p>
+            <a:r>
+              <a:rPr lang="en-US" dirty="0"/>
+              <a:t>Maas et al showed that a reservoir with fading memory retains information about time history in its dynamic state</a:t>
+            </a:r>
+          </a:p>
+          <a:p>
+            <a:r>
+              <a:rPr lang="en-US" dirty="0"/>
+              <a:t>LSM was able to classify all 4 segments in a 1 second sequence based only on the liquid state at t=1 second</a:t>
+            </a:r>
+          </a:p>
+          <a:p>
+            <a:endParaRPr lang="en-US" dirty="0"/>
+          </a:p>
+          <a:p>
+            <a:endParaRPr lang="en-US" dirty="0"/>
+          </a:p>
+        </p:txBody>
+      </p:sp>
+      <p:sp>
+        <p:nvSpPr>
+          <p:cNvPr id="5" name="TextBox 4">
+            <a:extLst>
+              <a:ext uri="{FF2B5EF4-FFF2-40B4-BE49-F238E27FC236}">
+                <a16:creationId xmlns:a16="http://schemas.microsoft.com/office/drawing/2014/main" xmlns="" id="{502CC89A-7DB2-4E47-9A57-AF20541BECFA}"/>
+              </a:ext>
+            </a:extLst>
+          </p:cNvPr>
+          <p:cNvSpPr txBox="1"/>
+          <p:nvPr/>
+        </p:nvSpPr>
+        <p:spPr>
+          <a:xfrm>
+            <a:off x="1622066" y="6192833"/>
+            <a:ext cx="7509225" cy="461665"/>
+          </a:xfrm>
+          <a:prstGeom prst="rect">
+            <a:avLst/>
+          </a:prstGeom>
+          <a:noFill/>
+        </p:spPr>
+        <p:txBody>
           <a:bodyPr wrap="square" rtlCol="0">
             <a:spAutoFit/>
           </a:bodyPr>
           <a:lstStyle/>
           <a:p>
             <a:r>
-              <a:rPr lang="en-US" sz="1200" dirty="0"/>
+              <a:rPr lang="en-US" sz="1200" b="1" i="1" dirty="0"/>
               <a:t>Maas2002 demonstrated that </a:t>
             </a:r>
             <a:r>
-              <a:rPr lang="en-US" sz="1200" dirty="0" smtClean="0"/>
+              <a:rPr lang="en-US" sz="1200" b="1" i="1" dirty="0" smtClean="0"/>
               <a:t>fading memory created by dynamic </a:t>
             </a:r>
             <a:r>
-              <a:rPr lang="en-US" sz="1200" dirty="0"/>
+              <a:rPr lang="en-US" sz="1200" b="1" i="1" dirty="0"/>
               <a:t>synapses (right, top) </a:t>
             </a:r>
             <a:r>
-              <a:rPr lang="en-US" sz="1200" dirty="0" smtClean="0"/>
+              <a:rPr lang="en-US" sz="1200" b="1" i="1" dirty="0" smtClean="0"/>
               <a:t>can recognize past events in a time series. The network with </a:t>
             </a:r>
             <a:r>
-              <a:rPr lang="en-US" sz="1200" dirty="0"/>
+              <a:rPr lang="en-US" sz="1200" b="1" i="1" dirty="0"/>
               <a:t>s</a:t>
             </a:r>
             <a:r>
-              <a:rPr lang="en-US" sz="1200" dirty="0" smtClean="0"/>
+              <a:rPr lang="en-US" sz="1200" b="1" i="1" dirty="0" smtClean="0"/>
               <a:t>tatic </a:t>
             </a:r>
             <a:r>
-              <a:rPr lang="en-US" sz="1200" dirty="0"/>
+              <a:rPr lang="en-US" sz="1200" b="1" i="1" dirty="0"/>
               <a:t>synapses (right, bottom) </a:t>
             </a:r>
             <a:r>
-              <a:rPr lang="en-US" sz="1200" dirty="0" smtClean="0"/>
+              <a:rPr lang="en-US" sz="1200" b="1" i="1" dirty="0" smtClean="0"/>
               <a:t>showed limited memory.</a:t>
             </a:r>
-            <a:endParaRPr lang="en-US" sz="1200" dirty="0"/>
+            <a:endParaRPr lang="en-US" sz="1200" b="1" i="1" dirty="0"/>
           </a:p>
         </p:txBody>
       </p:sp>
@@ -4541,432 +6300,6 @@
 </p:sld>
 </file>
 
-<file path=ppt/slides/slide5.xml><?xml version="1.0" encoding="utf-8"?>
-<p:sld xmlns:a="http://schemas.openxmlformats.org/drawingml/2006/main" xmlns:r="http://schemas.openxmlformats.org/officeDocument/2006/relationships" xmlns:p="http://schemas.openxmlformats.org/presentationml/2006/main">
-  <p:cSld>
-    <p:spTree>
-      <p:nvGrpSpPr>
-        <p:cNvPr id="1" name=""/>
-        <p:cNvGrpSpPr/>
-        <p:nvPr/>
-      </p:nvGrpSpPr>
-      <p:grpSpPr>
-        <a:xfrm>
-          <a:off x="0" y="0"/>
-          <a:ext cx="0" cy="0"/>
-          <a:chOff x="0" y="0"/>
-          <a:chExt cx="0" cy="0"/>
-        </a:xfrm>
-      </p:grpSpPr>
-      <p:sp>
-        <p:nvSpPr>
-          <p:cNvPr id="2" name="Title 1">
-            <a:extLst>
-              <a:ext uri="{FF2B5EF4-FFF2-40B4-BE49-F238E27FC236}">
-                <a16:creationId xmlns:a16="http://schemas.microsoft.com/office/drawing/2014/main" xmlns="" id="{2B4589EA-8981-4D8B-BFF9-EF6B5CEB43F6}"/>
-              </a:ext>
-            </a:extLst>
-          </p:cNvPr>
-          <p:cNvSpPr>
-            <a:spLocks noGrp="1"/>
-          </p:cNvSpPr>
-          <p:nvPr>
-            <p:ph type="title"/>
-          </p:nvPr>
-        </p:nvSpPr>
-        <p:spPr/>
-        <p:txBody>
-          <a:bodyPr/>
-          <a:lstStyle/>
-          <a:p>
-            <a:r>
-              <a:rPr lang="en-US" dirty="0"/>
-              <a:t>Neural connectivity</a:t>
-            </a:r>
-          </a:p>
-        </p:txBody>
-      </p:sp>
-      <mc:AlternateContent xmlns:mc="http://schemas.openxmlformats.org/markup-compatibility/2006" xmlns:a14="http://schemas.microsoft.com/office/drawing/2010/main">
-        <mc:Choice Requires="a14">
-          <p:sp>
-            <p:nvSpPr>
-              <p:cNvPr id="3" name="Content Placeholder 2">
-                <a:extLst>
-                  <a:ext uri="{FF2B5EF4-FFF2-40B4-BE49-F238E27FC236}">
-                    <a16:creationId xmlns:a16="http://schemas.microsoft.com/office/drawing/2014/main" xmlns="" id="{CEFBA1D3-8DC0-42EF-8053-6E8020733836}"/>
-                  </a:ext>
-                </a:extLst>
-              </p:cNvPr>
-              <p:cNvSpPr>
-                <a:spLocks noGrp="1"/>
-              </p:cNvSpPr>
-              <p:nvPr>
-                <p:ph idx="1"/>
-              </p:nvPr>
-            </p:nvSpPr>
-            <p:spPr>
-              <a:xfrm>
-                <a:off x="838200" y="1825625"/>
-                <a:ext cx="10515600" cy="1255326"/>
-              </a:xfrm>
-            </p:spPr>
-            <p:txBody>
-              <a:bodyPr/>
-              <a:lstStyle/>
-              <a:p>
-                <a:r>
-                  <a:rPr lang="en-US" dirty="0"/>
-                  <a:t>Connection probability depends on neuron distance, </a:t>
-                </a:r>
-                <a14:m>
-                  <m:oMath xmlns:m="http://schemas.openxmlformats.org/officeDocument/2006/math">
-                    <m:sSub>
-                      <m:sSubPr>
-                        <m:ctrlPr>
-                          <a:rPr lang="en-US" i="1">
-                            <a:latin typeface="Cambria Math" panose="02040503050406030204" pitchFamily="18" charset="0"/>
-                          </a:rPr>
-                        </m:ctrlPr>
-                      </m:sSubPr>
-                      <m:e>
-                        <m:r>
-                          <a:rPr lang="en-US" i="1">
-                            <a:latin typeface="Cambria Math" panose="02040503050406030204" pitchFamily="18" charset="0"/>
-                          </a:rPr>
-                          <m:t>𝑃</m:t>
-                        </m:r>
-                      </m:e>
-                      <m:sub>
-                        <m:r>
-                          <a:rPr lang="en-US" i="1">
-                            <a:latin typeface="Cambria Math" panose="02040503050406030204" pitchFamily="18" charset="0"/>
-                          </a:rPr>
-                          <m:t>12</m:t>
-                        </m:r>
-                      </m:sub>
-                    </m:sSub>
-                    <m:r>
-                      <a:rPr lang="en-US" i="1">
-                        <a:latin typeface="Cambria Math" panose="02040503050406030204" pitchFamily="18" charset="0"/>
-                      </a:rPr>
-                      <m:t>=</m:t>
-                    </m:r>
-                    <m:sSup>
-                      <m:sSupPr>
-                        <m:ctrlPr>
-                          <a:rPr lang="en-US" i="1">
-                            <a:latin typeface="Cambria Math" panose="02040503050406030204" pitchFamily="18" charset="0"/>
-                          </a:rPr>
-                        </m:ctrlPr>
-                      </m:sSupPr>
-                      <m:e>
-                        <m:r>
-                          <a:rPr lang="en-US" i="1">
-                            <a:latin typeface="Cambria Math" panose="02040503050406030204" pitchFamily="18" charset="0"/>
-                          </a:rPr>
-                          <m:t>𝑒</m:t>
-                        </m:r>
-                      </m:e>
-                      <m:sup>
-                        <m:r>
-                          <a:rPr lang="en-US" i="1">
-                            <a:latin typeface="Cambria Math" panose="02040503050406030204" pitchFamily="18" charset="0"/>
-                          </a:rPr>
-                          <m:t>−</m:t>
-                        </m:r>
-                        <m:d>
-                          <m:dPr>
-                            <m:ctrlPr>
-                              <a:rPr lang="en-US" i="1">
-                                <a:latin typeface="Cambria Math" panose="02040503050406030204" pitchFamily="18" charset="0"/>
-                              </a:rPr>
-                            </m:ctrlPr>
-                          </m:dPr>
-                          <m:e>
-                            <m:f>
-                              <m:fPr>
-                                <m:type m:val="skw"/>
-                                <m:ctrlPr>
-                                  <a:rPr lang="en-US" i="1">
-                                    <a:latin typeface="Cambria Math" panose="02040503050406030204" pitchFamily="18" charset="0"/>
-                                  </a:rPr>
-                                </m:ctrlPr>
-                              </m:fPr>
-                              <m:num>
-                                <m:sSub>
-                                  <m:sSubPr>
-                                    <m:ctrlPr>
-                                      <a:rPr lang="en-US" i="1">
-                                        <a:latin typeface="Cambria Math" panose="02040503050406030204" pitchFamily="18" charset="0"/>
-                                      </a:rPr>
-                                    </m:ctrlPr>
-                                  </m:sSubPr>
-                                  <m:e>
-                                    <m:r>
-                                      <a:rPr lang="en-US" i="1">
-                                        <a:latin typeface="Cambria Math" panose="02040503050406030204" pitchFamily="18" charset="0"/>
-                                      </a:rPr>
-                                      <m:t>𝐷</m:t>
-                                    </m:r>
-                                  </m:e>
-                                  <m:sub>
-                                    <m:r>
-                                      <a:rPr lang="en-US" i="1">
-                                        <a:latin typeface="Cambria Math" panose="02040503050406030204" pitchFamily="18" charset="0"/>
-                                      </a:rPr>
-                                      <m:t>12</m:t>
-                                    </m:r>
-                                  </m:sub>
-                                </m:sSub>
-                              </m:num>
-                              <m:den>
-                                <m:r>
-                                  <m:rPr>
-                                    <m:nor/>
-                                  </m:rPr>
-                                  <a:rPr lang="el-GR" dirty="0"/>
-                                  <m:t>λ</m:t>
-                                </m:r>
-                              </m:den>
-                            </m:f>
-                          </m:e>
-                        </m:d>
-                        <m:r>
-                          <a:rPr lang="en-US" i="1">
-                            <a:latin typeface="Cambria Math" panose="02040503050406030204" pitchFamily="18" charset="0"/>
-                          </a:rPr>
-                          <m:t>2</m:t>
-                        </m:r>
-                      </m:sup>
-                    </m:sSup>
-                  </m:oMath>
-                </a14:m>
-                <a:endParaRPr lang="en-US" dirty="0"/>
-              </a:p>
-              <a:p>
-                <a:r>
-                  <a:rPr lang="en-US" dirty="0"/>
-                  <a:t>3x3x15 column on integer grid locations, 135 neurons</a:t>
-                </a:r>
-              </a:p>
-            </p:txBody>
-          </p:sp>
-        </mc:Choice>
-        <mc:Fallback xmlns="">
-          <p:sp>
-            <p:nvSpPr>
-              <p:cNvPr id="3" name="Content Placeholder 2">
-                <a:extLst>
-                  <a:ext uri="{FF2B5EF4-FFF2-40B4-BE49-F238E27FC236}">
-                    <a16:creationId xmlns:a16="http://schemas.microsoft.com/office/drawing/2014/main" id="{CEFBA1D3-8DC0-42EF-8053-6E8020733836}"/>
-                  </a:ext>
-                </a:extLst>
-              </p:cNvPr>
-              <p:cNvSpPr>
-                <a:spLocks noGrp="1" noRot="1" noChangeAspect="1" noMove="1" noResize="1" noEditPoints="1" noAdjustHandles="1" noChangeArrowheads="1" noChangeShapeType="1" noTextEdit="1"/>
-              </p:cNvSpPr>
-              <p:nvPr>
-                <p:ph idx="1"/>
-              </p:nvPr>
-            </p:nvSpPr>
-            <p:spPr>
-              <a:xfrm>
-                <a:off x="838200" y="1825625"/>
-                <a:ext cx="10515600" cy="1255326"/>
-              </a:xfrm>
-              <a:blipFill>
-                <a:blip r:embed="rId2"/>
-                <a:stretch>
-                  <a:fillRect l="-812"/>
-                </a:stretch>
-              </a:blipFill>
-            </p:spPr>
-            <p:txBody>
-              <a:bodyPr/>
-              <a:lstStyle/>
-              <a:p>
-                <a:r>
-                  <a:rPr lang="en-US">
-                    <a:noFill/>
-                  </a:rPr>
-                  <a:t> </a:t>
-                </a:r>
-              </a:p>
-            </p:txBody>
-          </p:sp>
-        </mc:Fallback>
-      </mc:AlternateContent>
-      <p:grpSp>
-        <p:nvGrpSpPr>
-          <p:cNvPr id="11" name="Group 10">
-            <a:extLst>
-              <a:ext uri="{FF2B5EF4-FFF2-40B4-BE49-F238E27FC236}">
-                <a16:creationId xmlns:a16="http://schemas.microsoft.com/office/drawing/2014/main" xmlns="" id="{C27BBC6F-3490-477E-8494-21469B69C214}"/>
-              </a:ext>
-            </a:extLst>
-          </p:cNvPr>
-          <p:cNvGrpSpPr/>
-          <p:nvPr/>
-        </p:nvGrpSpPr>
-        <p:grpSpPr>
-          <a:xfrm>
-            <a:off x="838200" y="3080951"/>
-            <a:ext cx="6465323" cy="3083249"/>
-            <a:chOff x="167802" y="2659872"/>
-            <a:chExt cx="8838725" cy="4019952"/>
-          </a:xfrm>
-        </p:grpSpPr>
-        <p:pic>
-          <p:nvPicPr>
-            <p:cNvPr id="4" name="Picture 3">
-              <a:extLst>
-                <a:ext uri="{FF2B5EF4-FFF2-40B4-BE49-F238E27FC236}">
-                  <a16:creationId xmlns:a16="http://schemas.microsoft.com/office/drawing/2014/main" xmlns="" id="{2586738C-618A-4C35-98F4-DE8DD67C07DC}"/>
-                </a:ext>
-              </a:extLst>
-            </p:cNvPr>
-            <p:cNvPicPr>
-              <a:picLocks noChangeAspect="1"/>
-            </p:cNvPicPr>
-            <p:nvPr/>
-          </p:nvPicPr>
-          <p:blipFill>
-            <a:blip r:embed="rId3" cstate="print">
-              <a:extLst>
-                <a:ext uri="{28A0092B-C50C-407E-A947-70E740481C1C}">
-                  <a14:useLocalDpi xmlns:a14="http://schemas.microsoft.com/office/drawing/2010/main" val="0"/>
-                </a:ext>
-              </a:extLst>
-            </a:blip>
-            <a:stretch>
-              <a:fillRect/>
-            </a:stretch>
-          </p:blipFill>
-          <p:spPr>
-            <a:xfrm>
-              <a:off x="167802" y="2667787"/>
-              <a:ext cx="3009028" cy="4012037"/>
-            </a:xfrm>
-            <a:prstGeom prst="rect">
-              <a:avLst/>
-            </a:prstGeom>
-          </p:spPr>
-        </p:pic>
-        <p:pic>
-          <p:nvPicPr>
-            <p:cNvPr id="6" name="Picture 5">
-              <a:extLst>
-                <a:ext uri="{FF2B5EF4-FFF2-40B4-BE49-F238E27FC236}">
-                  <a16:creationId xmlns:a16="http://schemas.microsoft.com/office/drawing/2014/main" xmlns="" id="{6FDD1A8E-7A14-4A69-A89F-C48D23E58495}"/>
-                </a:ext>
-              </a:extLst>
-            </p:cNvPr>
-            <p:cNvPicPr>
-              <a:picLocks noChangeAspect="1"/>
-            </p:cNvPicPr>
-            <p:nvPr/>
-          </p:nvPicPr>
-          <p:blipFill>
-            <a:blip r:embed="rId4" cstate="print">
-              <a:extLst>
-                <a:ext uri="{28A0092B-C50C-407E-A947-70E740481C1C}">
-                  <a14:useLocalDpi xmlns:a14="http://schemas.microsoft.com/office/drawing/2010/main" val="0"/>
-                </a:ext>
-              </a:extLst>
-            </a:blip>
-            <a:stretch>
-              <a:fillRect/>
-            </a:stretch>
-          </p:blipFill>
-          <p:spPr>
-            <a:xfrm>
-              <a:off x="3124922" y="2667786"/>
-              <a:ext cx="3009028" cy="4012037"/>
-            </a:xfrm>
-            <a:prstGeom prst="rect">
-              <a:avLst/>
-            </a:prstGeom>
-          </p:spPr>
-        </p:pic>
-        <p:pic>
-          <p:nvPicPr>
-            <p:cNvPr id="8" name="Picture 7">
-              <a:extLst>
-                <a:ext uri="{FF2B5EF4-FFF2-40B4-BE49-F238E27FC236}">
-                  <a16:creationId xmlns:a16="http://schemas.microsoft.com/office/drawing/2014/main" xmlns="" id="{10EB060F-ED99-45D3-9BB2-BF5E00DF35DD}"/>
-                </a:ext>
-              </a:extLst>
-            </p:cNvPr>
-            <p:cNvPicPr>
-              <a:picLocks noChangeAspect="1"/>
-            </p:cNvPicPr>
-            <p:nvPr/>
-          </p:nvPicPr>
-          <p:blipFill>
-            <a:blip r:embed="rId5" cstate="print">
-              <a:extLst>
-                <a:ext uri="{28A0092B-C50C-407E-A947-70E740481C1C}">
-                  <a14:useLocalDpi xmlns:a14="http://schemas.microsoft.com/office/drawing/2010/main" val="0"/>
-                </a:ext>
-              </a:extLst>
-            </a:blip>
-            <a:stretch>
-              <a:fillRect/>
-            </a:stretch>
-          </p:blipFill>
-          <p:spPr>
-            <a:xfrm>
-              <a:off x="6082042" y="2659872"/>
-              <a:ext cx="2924485" cy="3955490"/>
-            </a:xfrm>
-            <a:prstGeom prst="rect">
-              <a:avLst/>
-            </a:prstGeom>
-          </p:spPr>
-        </p:pic>
-      </p:grpSp>
-      <p:pic>
-        <p:nvPicPr>
-          <p:cNvPr id="5" name="Picture 4"/>
-          <p:cNvPicPr>
-            <a:picLocks noChangeAspect="1"/>
-          </p:cNvPicPr>
-          <p:nvPr/>
-        </p:nvPicPr>
-        <p:blipFill rotWithShape="1">
-          <a:blip r:embed="rId6">
-            <a:extLst>
-              <a:ext uri="{28A0092B-C50C-407E-A947-70E740481C1C}">
-                <a14:useLocalDpi xmlns:a14="http://schemas.microsoft.com/office/drawing/2010/main" val="0"/>
-              </a:ext>
-            </a:extLst>
-          </a:blip>
-          <a:srcRect l="3272" r="5623"/>
-          <a:stretch/>
-        </p:blipFill>
-        <p:spPr>
-          <a:xfrm>
-            <a:off x="7582819" y="3215888"/>
-            <a:ext cx="3954524" cy="2927103"/>
-          </a:xfrm>
-          <a:prstGeom prst="rect">
-            <a:avLst/>
-          </a:prstGeom>
-        </p:spPr>
-      </p:pic>
-    </p:spTree>
-    <p:extLst>
-      <p:ext uri="{BB962C8B-B14F-4D97-AF65-F5344CB8AC3E}">
-        <p14:creationId xmlns:p14="http://schemas.microsoft.com/office/powerpoint/2010/main" val="2915437618"/>
-      </p:ext>
-    </p:extLst>
-  </p:cSld>
-  <p:clrMapOvr>
-    <a:masterClrMapping/>
-  </p:clrMapOvr>
-</p:sld>
-</file>
-
 <file path=ppt/slides/slide6.xml><?xml version="1.0" encoding="utf-8"?>
 <p:sld xmlns:a="http://schemas.openxmlformats.org/drawingml/2006/main" xmlns:r="http://schemas.openxmlformats.org/officeDocument/2006/relationships" xmlns:p="http://schemas.openxmlformats.org/presentationml/2006/main">
   <p:cSld>
@@ -4989,7 +6322,7 @@
           <p:cNvPr id="2" name="Title 1">
             <a:extLst>
               <a:ext uri="{FF2B5EF4-FFF2-40B4-BE49-F238E27FC236}">
-                <a16:creationId xmlns:a16="http://schemas.microsoft.com/office/drawing/2014/main" xmlns="" id="{62B12E8E-4104-45CA-BF80-CCAE1A31ACF7}"/>
+                <a16:creationId xmlns:a16="http://schemas.microsoft.com/office/drawing/2014/main" xmlns="" id="{0B2F3FFF-8E2C-4B7F-9726-3B4DE9C5C9F2}"/>
               </a:ext>
             </a:extLst>
           </p:cNvPr>
@@ -5007,17 +6340,17 @@
           <a:p>
             <a:r>
               <a:rPr lang="en-US" dirty="0"/>
-              <a:t>Neural connectivity</a:t>
-            </a:r>
-          </a:p>
-        </p:txBody>
-      </p:sp>
-      <p:sp>
-        <p:nvSpPr>
-          <p:cNvPr id="3" name="Content Placeholder 2">
-            <a:extLst>
-              <a:ext uri="{FF2B5EF4-FFF2-40B4-BE49-F238E27FC236}">
-                <a16:creationId xmlns:a16="http://schemas.microsoft.com/office/drawing/2014/main" xmlns="" id="{1ECC2F40-9D0A-4B2B-8EBC-6C6B50E3F5E7}"/>
+              <a:t>Neural models</a:t>
+            </a:r>
+          </a:p>
+        </p:txBody>
+      </p:sp>
+      <p:sp>
+        <p:nvSpPr>
+          <p:cNvPr id="5" name="Content Placeholder 4">
+            <a:extLst>
+              <a:ext uri="{FF2B5EF4-FFF2-40B4-BE49-F238E27FC236}">
+                <a16:creationId xmlns:a16="http://schemas.microsoft.com/office/drawing/2014/main" xmlns="" id="{D8CB21F4-1B9F-436B-BEBC-ADD994CCABDF}"/>
               </a:ext>
             </a:extLst>
           </p:cNvPr>
@@ -5028,33 +6361,26 @@
             <p:ph idx="1"/>
           </p:nvPr>
         </p:nvSpPr>
-        <p:spPr>
-          <a:xfrm>
-            <a:off x="838199" y="1825625"/>
-            <a:ext cx="10892481" cy="4351338"/>
-          </a:xfrm>
-        </p:spPr>
+        <p:spPr/>
         <p:txBody>
           <a:bodyPr/>
           <a:lstStyle/>
           <a:p>
             <a:r>
               <a:rPr lang="en-US" dirty="0"/>
-              <a:t>Original LSM paper (Maas 2002) found best performance for </a:t>
-            </a:r>
-            <a:r>
-              <a:rPr lang="el-GR" dirty="0"/>
-              <a:t>λ</a:t>
-            </a:r>
+              <a:t>Neural dynamics play an important role in temporal response</a:t>
+            </a:r>
+          </a:p>
+          <a:p>
             <a:r>
               <a:rPr lang="en-US" dirty="0"/>
-              <a:t>=2</a:t>
+              <a:t>We start with the Izhikevich model, a simplified 2D dynamic system</a:t>
             </a:r>
           </a:p>
           <a:p>
             <a:r>
               <a:rPr lang="en-US" dirty="0"/>
-              <a:t>This work will explore how spatial organization of the columns effect performance</a:t>
+              <a:t>Can explore nonlinear dynamics while retaining fast simulation</a:t>
             </a:r>
           </a:p>
           <a:p>
@@ -5064,10 +6390,10 @@
       </p:sp>
       <p:pic>
         <p:nvPicPr>
-          <p:cNvPr id="16" name="Picture 15">
-            <a:extLst>
-              <a:ext uri="{FF2B5EF4-FFF2-40B4-BE49-F238E27FC236}">
-                <a16:creationId xmlns:a16="http://schemas.microsoft.com/office/drawing/2014/main" xmlns="" id="{5927E8A9-79EC-4192-BA10-E750069FCBEA}"/>
+          <p:cNvPr id="4" name="Picture 3">
+            <a:extLst>
+              <a:ext uri="{FF2B5EF4-FFF2-40B4-BE49-F238E27FC236}">
+                <a16:creationId xmlns:a16="http://schemas.microsoft.com/office/drawing/2014/main" xmlns="" id="{B21A92C4-9CFA-4F73-BAD1-C3E8C6DB2BCA}"/>
               </a:ext>
             </a:extLst>
           </p:cNvPr>
@@ -5076,15 +6402,16 @@
           </p:cNvPicPr>
           <p:nvPr/>
         </p:nvPicPr>
-        <p:blipFill rotWithShape="1">
+        <p:blipFill>
           <a:blip r:embed="rId2"/>
-          <a:srcRect l="40816" t="17845" r="42368" b="54604"/>
-          <a:stretch/>
+          <a:stretch>
+            <a:fillRect/>
+          </a:stretch>
         </p:blipFill>
         <p:spPr>
           <a:xfrm>
-            <a:off x="3831736" y="3429000"/>
-            <a:ext cx="3192244" cy="2802581"/>
+            <a:off x="1126524" y="3451903"/>
+            <a:ext cx="8066903" cy="3040972"/>
           </a:xfrm>
           <a:prstGeom prst="rect">
             <a:avLst/>
@@ -5094,7 +6421,7 @@
     </p:spTree>
     <p:extLst>
       <p:ext uri="{BB962C8B-B14F-4D97-AF65-F5344CB8AC3E}">
-        <p14:creationId xmlns:p14="http://schemas.microsoft.com/office/powerpoint/2010/main" val="2125980966"/>
+        <p14:creationId xmlns:p14="http://schemas.microsoft.com/office/powerpoint/2010/main" val="1686370216"/>
       </p:ext>
     </p:extLst>
   </p:cSld>
@@ -5123,13 +6450,7 @@
       </p:grpSpPr>
       <p:sp>
         <p:nvSpPr>
-          <p:cNvPr id="2" name="Title 1">
-            <a:extLst>
-              <a:ext uri="{FF2B5EF4-FFF2-40B4-BE49-F238E27FC236}">
-                <a16:creationId xmlns:a16="http://schemas.microsoft.com/office/drawing/2014/main" xmlns="" id="{0B2F3FFF-8E2C-4B7F-9726-3B4DE9C5C9F2}"/>
-              </a:ext>
-            </a:extLst>
-          </p:cNvPr>
+          <p:cNvPr id="2" name="Title 1"/>
           <p:cNvSpPr>
             <a:spLocks noGrp="1"/>
           </p:cNvSpPr>
@@ -5143,21 +6464,16 @@
           <a:lstStyle/>
           <a:p>
             <a:r>
-              <a:rPr lang="en-US" dirty="0"/>
-              <a:t>Neural models</a:t>
-            </a:r>
-          </a:p>
-        </p:txBody>
-      </p:sp>
-      <p:sp>
-        <p:nvSpPr>
-          <p:cNvPr id="5" name="Content Placeholder 4">
-            <a:extLst>
-              <a:ext uri="{FF2B5EF4-FFF2-40B4-BE49-F238E27FC236}">
-                <a16:creationId xmlns:a16="http://schemas.microsoft.com/office/drawing/2014/main" xmlns="" id="{D8CB21F4-1B9F-436B-BEBC-ADD994CCABDF}"/>
-              </a:ext>
-            </a:extLst>
-          </p:cNvPr>
+              <a:rPr lang="en-US" dirty="0" smtClean="0"/>
+              <a:t>Izhikevich model</a:t>
+            </a:r>
+            <a:endParaRPr lang="en-US" dirty="0"/>
+          </a:p>
+        </p:txBody>
+      </p:sp>
+      <p:sp>
+        <p:nvSpPr>
+          <p:cNvPr id="3" name="Content Placeholder 2"/>
           <p:cNvSpPr>
             <a:spLocks noGrp="1"/>
           </p:cNvSpPr>
@@ -5165,42 +6481,39 @@
             <p:ph idx="1"/>
           </p:nvPr>
         </p:nvSpPr>
-        <p:spPr/>
-        <p:txBody>
-          <a:bodyPr/>
-          <a:lstStyle/>
-          <a:p>
-            <a:r>
-              <a:rPr lang="en-US" dirty="0"/>
-              <a:t>Neural dynamics play an important role in temporal response</a:t>
-            </a:r>
-          </a:p>
-          <a:p>
-            <a:r>
-              <a:rPr lang="en-US" dirty="0"/>
-              <a:t>We start with the Izhikevich model, a simplified 2D dynamic system</a:t>
-            </a:r>
-          </a:p>
-          <a:p>
-            <a:r>
-              <a:rPr lang="en-US" dirty="0"/>
-              <a:t>Can explore nonlinear dynamics while retaining fast simulation</a:t>
-            </a:r>
-          </a:p>
-          <a:p>
+        <p:spPr>
+          <a:xfrm>
+            <a:off x="838200" y="1825625"/>
+            <a:ext cx="5904506" cy="4351338"/>
+          </a:xfrm>
+        </p:spPr>
+        <p:txBody>
+          <a:bodyPr/>
+          <a:lstStyle/>
+          <a:p>
+            <a:r>
+              <a:rPr lang="en-US" dirty="0" smtClean="0"/>
+              <a:t>Differential equations with threshold and reset</a:t>
+            </a:r>
+          </a:p>
+          <a:p>
+            <a:r>
+              <a:rPr lang="en-US" dirty="0" smtClean="0"/>
+              <a:t>Simple system for exploring two-dimensional dynamics</a:t>
+            </a:r>
+          </a:p>
+          <a:p>
+            <a:r>
+              <a:rPr lang="en-US" dirty="0" smtClean="0"/>
+              <a:t>Provides dynamic degrees of freedom not seen in LIF neurons used in previous LSM work</a:t>
+            </a:r>
             <a:endParaRPr lang="en-US" dirty="0"/>
           </a:p>
         </p:txBody>
       </p:sp>
       <p:pic>
         <p:nvPicPr>
-          <p:cNvPr id="4" name="Picture 3">
-            <a:extLst>
-              <a:ext uri="{FF2B5EF4-FFF2-40B4-BE49-F238E27FC236}">
-                <a16:creationId xmlns:a16="http://schemas.microsoft.com/office/drawing/2014/main" xmlns="" id="{B21A92C4-9CFA-4F73-BAD1-C3E8C6DB2BCA}"/>
-              </a:ext>
-            </a:extLst>
-          </p:cNvPr>
+          <p:cNvPr id="4" name="Picture 3"/>
           <p:cNvPicPr>
             <a:picLocks noChangeAspect="1"/>
           </p:cNvPicPr>
@@ -5214,18 +6527,54 @@
         </p:blipFill>
         <p:spPr>
           <a:xfrm>
-            <a:off x="1126524" y="3451903"/>
-            <a:ext cx="8066903" cy="3040972"/>
+            <a:off x="7072438" y="2342486"/>
+            <a:ext cx="4598707" cy="3337596"/>
           </a:xfrm>
           <a:prstGeom prst="rect">
             <a:avLst/>
           </a:prstGeom>
         </p:spPr>
       </p:pic>
+      <p:sp>
+        <p:nvSpPr>
+          <p:cNvPr id="5" name="TextBox 4">
+            <a:extLst>
+              <a:ext uri="{FF2B5EF4-FFF2-40B4-BE49-F238E27FC236}">
+                <a16:creationId xmlns:a16="http://schemas.microsoft.com/office/drawing/2014/main" xmlns="" id="{502CC89A-7DB2-4E47-9A57-AF20541BECFA}"/>
+              </a:ext>
+            </a:extLst>
+          </p:cNvPr>
+          <p:cNvSpPr txBox="1"/>
+          <p:nvPr/>
+        </p:nvSpPr>
+        <p:spPr>
+          <a:xfrm>
+            <a:off x="7072438" y="5850235"/>
+            <a:ext cx="4655735" cy="461665"/>
+          </a:xfrm>
+          <a:prstGeom prst="rect">
+            <a:avLst/>
+          </a:prstGeom>
+          <a:noFill/>
+        </p:spPr>
+        <p:txBody>
+          <a:bodyPr wrap="square" rtlCol="0">
+            <a:spAutoFit/>
+          </a:bodyPr>
+          <a:lstStyle/>
+          <a:p>
+            <a:r>
+              <a:rPr lang="en-US" sz="1200" b="1" i="1" dirty="0" smtClean="0"/>
+              <a:t>The Izhikevich model can replicate common spiking patterns with the appropriate choice of parameters (Izhikevich 2003)</a:t>
+            </a:r>
+            <a:endParaRPr lang="en-US" sz="1200" b="1" i="1" dirty="0"/>
+          </a:p>
+        </p:txBody>
+      </p:sp>
     </p:spTree>
     <p:extLst>
       <p:ext uri="{BB962C8B-B14F-4D97-AF65-F5344CB8AC3E}">
-        <p14:creationId xmlns:p14="http://schemas.microsoft.com/office/powerpoint/2010/main" val="2811898759"/>
+        <p14:creationId xmlns:p14="http://schemas.microsoft.com/office/powerpoint/2010/main" val="2028951673"/>
       </p:ext>
     </p:extLst>
   </p:cSld>
@@ -5254,13 +6603,7 @@
       </p:grpSpPr>
       <p:sp>
         <p:nvSpPr>
-          <p:cNvPr id="2" name="Title 1">
-            <a:extLst>
-              <a:ext uri="{FF2B5EF4-FFF2-40B4-BE49-F238E27FC236}">
-                <a16:creationId xmlns:a16="http://schemas.microsoft.com/office/drawing/2014/main" xmlns="" id="{03536115-048F-4F60-B353-3AEE9BB69F11}"/>
-              </a:ext>
-            </a:extLst>
-          </p:cNvPr>
+          <p:cNvPr id="2" name="Title 1"/>
           <p:cNvSpPr>
             <a:spLocks noGrp="1"/>
           </p:cNvSpPr>
@@ -5274,21 +6617,16 @@
           <a:lstStyle/>
           <a:p>
             <a:r>
-              <a:rPr lang="en-US" dirty="0"/>
-              <a:t>Neural models</a:t>
-            </a:r>
-          </a:p>
-        </p:txBody>
-      </p:sp>
-      <p:sp>
-        <p:nvSpPr>
-          <p:cNvPr id="3" name="Content Placeholder 2">
-            <a:extLst>
-              <a:ext uri="{FF2B5EF4-FFF2-40B4-BE49-F238E27FC236}">
-                <a16:creationId xmlns:a16="http://schemas.microsoft.com/office/drawing/2014/main" xmlns="" id="{C16B18B1-8E66-4478-AF65-BE72EA7F4CBD}"/>
-              </a:ext>
-            </a:extLst>
-          </p:cNvPr>
+              <a:rPr lang="en-US" dirty="0" smtClean="0"/>
+              <a:t>Spatial organization</a:t>
+            </a:r>
+            <a:endParaRPr lang="en-US" dirty="0"/>
+          </a:p>
+        </p:txBody>
+      </p:sp>
+      <p:sp>
+        <p:nvSpPr>
+          <p:cNvPr id="3" name="Content Placeholder 2"/>
           <p:cNvSpPr>
             <a:spLocks noGrp="1"/>
           </p:cNvSpPr>
@@ -5302,129 +6640,27 @@
           <a:lstStyle/>
           <a:p>
             <a:r>
-              <a:rPr lang="en-US" dirty="0"/>
-              <a:t>Extended Izhikevich simulation to include propagation delay</a:t>
-            </a:r>
-          </a:p>
-          <a:p>
-            <a:r>
-              <a:rPr lang="en-US" dirty="0"/>
-              <a:t>Our model retains basic behavior of the Izhikevich model</a:t>
-            </a:r>
-          </a:p>
-        </p:txBody>
-      </p:sp>
-      <p:pic>
-        <p:nvPicPr>
-          <p:cNvPr id="5" name="Picture 4">
-            <a:extLst>
-              <a:ext uri="{FF2B5EF4-FFF2-40B4-BE49-F238E27FC236}">
-                <a16:creationId xmlns:a16="http://schemas.microsoft.com/office/drawing/2014/main" xmlns="" id="{B1A82E9A-EA27-40E8-AD4F-BFB478797B41}"/>
-              </a:ext>
-            </a:extLst>
-          </p:cNvPr>
-          <p:cNvPicPr>
-            <a:picLocks noChangeAspect="1"/>
-          </p:cNvPicPr>
-          <p:nvPr/>
-        </p:nvPicPr>
-        <p:blipFill>
-          <a:blip r:embed="rId2">
-            <a:extLst>
-              <a:ext uri="{28A0092B-C50C-407E-A947-70E740481C1C}">
-                <a14:useLocalDpi xmlns:a14="http://schemas.microsoft.com/office/drawing/2010/main" val="0"/>
-              </a:ext>
-            </a:extLst>
-          </a:blip>
-          <a:stretch>
-            <a:fillRect/>
-          </a:stretch>
-        </p:blipFill>
-        <p:spPr>
-          <a:xfrm>
-            <a:off x="5425292" y="3005422"/>
-            <a:ext cx="3899939" cy="3037910"/>
-          </a:xfrm>
-          <a:prstGeom prst="rect">
-            <a:avLst/>
-          </a:prstGeom>
-        </p:spPr>
-      </p:pic>
-      <p:pic>
-        <p:nvPicPr>
-          <p:cNvPr id="7" name="Picture 6">
-            <a:extLst>
-              <a:ext uri="{FF2B5EF4-FFF2-40B4-BE49-F238E27FC236}">
-                <a16:creationId xmlns:a16="http://schemas.microsoft.com/office/drawing/2014/main" xmlns="" id="{CC26EFDE-91EF-41FB-8EEE-22A802F51C21}"/>
-              </a:ext>
-            </a:extLst>
-          </p:cNvPr>
-          <p:cNvPicPr>
-            <a:picLocks noChangeAspect="1"/>
-          </p:cNvPicPr>
-          <p:nvPr/>
-        </p:nvPicPr>
-        <p:blipFill>
-          <a:blip r:embed="rId3">
-            <a:extLst>
-              <a:ext uri="{28A0092B-C50C-407E-A947-70E740481C1C}">
-                <a14:useLocalDpi xmlns:a14="http://schemas.microsoft.com/office/drawing/2010/main" val="0"/>
-              </a:ext>
-            </a:extLst>
-          </a:blip>
-          <a:stretch>
-            <a:fillRect/>
-          </a:stretch>
-        </p:blipFill>
-        <p:spPr>
-          <a:xfrm>
-            <a:off x="1567416" y="3005422"/>
-            <a:ext cx="3887218" cy="3037910"/>
-          </a:xfrm>
-          <a:prstGeom prst="rect">
-            <a:avLst/>
-          </a:prstGeom>
-        </p:spPr>
-      </p:pic>
-      <p:sp>
-        <p:nvSpPr>
-          <p:cNvPr id="8" name="TextBox 7">
-            <a:extLst>
-              <a:ext uri="{FF2B5EF4-FFF2-40B4-BE49-F238E27FC236}">
-                <a16:creationId xmlns:a16="http://schemas.microsoft.com/office/drawing/2014/main" xmlns="" id="{51B686F4-A933-4AB7-89BE-72C1BCE4F7F0}"/>
-              </a:ext>
-            </a:extLst>
-          </p:cNvPr>
-          <p:cNvSpPr txBox="1"/>
-          <p:nvPr/>
-        </p:nvSpPr>
-        <p:spPr>
-          <a:xfrm>
-            <a:off x="1187434" y="6150834"/>
-            <a:ext cx="8534399" cy="523220"/>
-          </a:xfrm>
-          <a:prstGeom prst="rect">
-            <a:avLst/>
-          </a:prstGeom>
-          <a:noFill/>
-        </p:spPr>
-        <p:txBody>
-          <a:bodyPr wrap="square" rtlCol="0">
-            <a:spAutoFit/>
-          </a:bodyPr>
-          <a:lstStyle/>
-          <a:p>
-            <a:r>
-              <a:rPr lang="en-US" sz="1400" dirty="0"/>
-              <a:t>The original Izhikevich model (left) and our extended model with random delays (right) both show synchronization in response to randomized “thalamic” input (Izhikevich 2003, https://www.izhikevich.org/publications/spikes.htm)</a:t>
-            </a:r>
+              <a:rPr lang="en-US" dirty="0" smtClean="0"/>
+              <a:t>Columns and proposed function</a:t>
+            </a:r>
+          </a:p>
+          <a:p>
+            <a:r>
+              <a:rPr lang="en-US" dirty="0" err="1" smtClean="0"/>
+              <a:t>Microcolumn</a:t>
+            </a:r>
+            <a:r>
+              <a:rPr lang="en-US" dirty="0" smtClean="0"/>
+              <a:t> structures and correlation to age-related decline in Rhesus monkeys</a:t>
+            </a:r>
+            <a:endParaRPr lang="en-US" dirty="0"/>
           </a:p>
         </p:txBody>
       </p:sp>
     </p:spTree>
     <p:extLst>
       <p:ext uri="{BB962C8B-B14F-4D97-AF65-F5344CB8AC3E}">
-        <p14:creationId xmlns:p14="http://schemas.microsoft.com/office/powerpoint/2010/main" val="2442328921"/>
+        <p14:creationId xmlns:p14="http://schemas.microsoft.com/office/powerpoint/2010/main" val="171325367"/>
       </p:ext>
     </p:extLst>
   </p:cSld>

</xml_diff>